<commit_message>
Minor spelling and grammer fixes in the PPTX.
</commit_message>
<xml_diff>
--- a/ProgrammingMB.pptx
+++ b/ProgrammingMB.pptx
@@ -1151,7 +1151,7 @@
           <a:p>
             <a:fld id="{2F09888F-BA9C-4D6F-A4EF-C2140F0FB5B5}" type="datetimeFigureOut">
               <a:rPr lang="en-US" smtClean="0"/>
-              <a:t>3/25/2020</a:t>
+              <a:t>7/10/2024</a:t>
             </a:fld>
             <a:endParaRPr lang="en-US"/>
           </a:p>
@@ -2521,7 +2521,7 @@
           <a:noFill/>
           <a:extLst>
             <a:ext uri="{909E8E84-426E-40dd-AFC4-6F175D3DCCD1}">
-              <a14:hiddenFill xmlns:a14="http://schemas.microsoft.com/office/drawing/2010/main" xmlns="">
+              <a14:hiddenFill xmlns="" xmlns:a14="http://schemas.microsoft.com/office/drawing/2010/main">
                 <a:solidFill>
                   <a:srgbClr val="FFFFFF"/>
                 </a:solidFill>
@@ -2580,7 +2580,7 @@
             </a:ln>
             <a:extLst>
               <a:ext uri="{91240B29-F687-4f45-9708-019B960494DF}">
-                <a14:hiddenLine xmlns:a14="http://schemas.microsoft.com/office/drawing/2010/main" xmlns="" w="9525">
+                <a14:hiddenLine xmlns="" xmlns:a14="http://schemas.microsoft.com/office/drawing/2010/main" w="9525">
                   <a:solidFill>
                     <a:srgbClr val="000000"/>
                   </a:solidFill>
@@ -2670,7 +2670,7 @@
             </a:ln>
             <a:extLst>
               <a:ext uri="{91240B29-F687-4f45-9708-019B960494DF}">
-                <a14:hiddenLine xmlns:a14="http://schemas.microsoft.com/office/drawing/2010/main" xmlns="" w="9525">
+                <a14:hiddenLine xmlns="" xmlns:a14="http://schemas.microsoft.com/office/drawing/2010/main" w="9525">
                   <a:solidFill>
                     <a:srgbClr val="000000"/>
                   </a:solidFill>
@@ -2760,7 +2760,7 @@
             </a:ln>
             <a:extLst>
               <a:ext uri="{91240B29-F687-4f45-9708-019B960494DF}">
-                <a14:hiddenLine xmlns:a14="http://schemas.microsoft.com/office/drawing/2010/main" xmlns="" w="9525">
+                <a14:hiddenLine xmlns="" xmlns:a14="http://schemas.microsoft.com/office/drawing/2010/main" w="9525">
                   <a:solidFill>
                     <a:srgbClr val="000000"/>
                   </a:solidFill>
@@ -2794,7 +2794,7 @@
             </a:ln>
             <a:extLst>
               <a:ext uri="{91240B29-F687-4f45-9708-019B960494DF}">
-                <a14:hiddenLine xmlns:a14="http://schemas.microsoft.com/office/drawing/2010/main" xmlns="" w="9525">
+                <a14:hiddenLine xmlns="" xmlns:a14="http://schemas.microsoft.com/office/drawing/2010/main" w="9525">
                   <a:solidFill>
                     <a:srgbClr val="000000"/>
                   </a:solidFill>
@@ -2884,7 +2884,7 @@
             </a:ln>
             <a:extLst>
               <a:ext uri="{91240B29-F687-4f45-9708-019B960494DF}">
-                <a14:hiddenLine xmlns:a14="http://schemas.microsoft.com/office/drawing/2010/main" xmlns="" w="9525">
+                <a14:hiddenLine xmlns="" xmlns:a14="http://schemas.microsoft.com/office/drawing/2010/main" w="9525">
                   <a:solidFill>
                     <a:srgbClr val="000000"/>
                   </a:solidFill>
@@ -2946,7 +2946,7 @@
             </a:ln>
             <a:extLst>
               <a:ext uri="{91240B29-F687-4f45-9708-019B960494DF}">
-                <a14:hiddenLine xmlns:a14="http://schemas.microsoft.com/office/drawing/2010/main" xmlns="" w="9525">
+                <a14:hiddenLine xmlns="" xmlns:a14="http://schemas.microsoft.com/office/drawing/2010/main" w="9525">
                   <a:solidFill>
                     <a:srgbClr val="000000"/>
                   </a:solidFill>
@@ -3008,7 +3008,7 @@
             </a:ln>
             <a:extLst>
               <a:ext uri="{91240B29-F687-4f45-9708-019B960494DF}">
-                <a14:hiddenLine xmlns:a14="http://schemas.microsoft.com/office/drawing/2010/main" xmlns="" w="9525">
+                <a14:hiddenLine xmlns="" xmlns:a14="http://schemas.microsoft.com/office/drawing/2010/main" w="9525">
                   <a:solidFill>
                     <a:srgbClr val="000000"/>
                   </a:solidFill>
@@ -3098,7 +3098,7 @@
             </a:ln>
             <a:extLst>
               <a:ext uri="{91240B29-F687-4f45-9708-019B960494DF}">
-                <a14:hiddenLine xmlns:a14="http://schemas.microsoft.com/office/drawing/2010/main" xmlns="" w="9525">
+                <a14:hiddenLine xmlns="" xmlns:a14="http://schemas.microsoft.com/office/drawing/2010/main" w="9525">
                   <a:solidFill>
                     <a:srgbClr val="000000"/>
                   </a:solidFill>
@@ -3160,7 +3160,7 @@
             </a:ln>
             <a:extLst>
               <a:ext uri="{91240B29-F687-4f45-9708-019B960494DF}">
-                <a14:hiddenLine xmlns:a14="http://schemas.microsoft.com/office/drawing/2010/main" xmlns="" w="9525">
+                <a14:hiddenLine xmlns="" xmlns:a14="http://schemas.microsoft.com/office/drawing/2010/main" w="9525">
                   <a:solidFill>
                     <a:srgbClr val="000000"/>
                   </a:solidFill>
@@ -3222,7 +3222,7 @@
             </a:ln>
             <a:extLst>
               <a:ext uri="{91240B29-F687-4f45-9708-019B960494DF}">
-                <a14:hiddenLine xmlns:a14="http://schemas.microsoft.com/office/drawing/2010/main" xmlns="" w="9525">
+                <a14:hiddenLine xmlns="" xmlns:a14="http://schemas.microsoft.com/office/drawing/2010/main" w="9525">
                   <a:solidFill>
                     <a:srgbClr val="000000"/>
                   </a:solidFill>
@@ -3312,7 +3312,7 @@
             </a:ln>
             <a:extLst>
               <a:ext uri="{91240B29-F687-4f45-9708-019B960494DF}">
-                <a14:hiddenLine xmlns:a14="http://schemas.microsoft.com/office/drawing/2010/main" xmlns="" w="9525">
+                <a14:hiddenLine xmlns="" xmlns:a14="http://schemas.microsoft.com/office/drawing/2010/main" w="9525">
                   <a:solidFill>
                     <a:srgbClr val="000000"/>
                   </a:solidFill>
@@ -3402,7 +3402,7 @@
             </a:ln>
             <a:extLst>
               <a:ext uri="{91240B29-F687-4f45-9708-019B960494DF}">
-                <a14:hiddenLine xmlns:a14="http://schemas.microsoft.com/office/drawing/2010/main" xmlns="" w="9525">
+                <a14:hiddenLine xmlns="" xmlns:a14="http://schemas.microsoft.com/office/drawing/2010/main" w="9525">
                   <a:solidFill>
                     <a:srgbClr val="000000"/>
                   </a:solidFill>
@@ -3464,7 +3464,7 @@
             </a:ln>
             <a:extLst>
               <a:ext uri="{91240B29-F687-4f45-9708-019B960494DF}">
-                <a14:hiddenLine xmlns:a14="http://schemas.microsoft.com/office/drawing/2010/main" xmlns="" w="9525">
+                <a14:hiddenLine xmlns="" xmlns:a14="http://schemas.microsoft.com/office/drawing/2010/main" w="9525">
                   <a:solidFill>
                     <a:srgbClr val="000000"/>
                   </a:solidFill>
@@ -3574,7 +3574,7 @@
             </a:ln>
             <a:extLst>
               <a:ext uri="{91240B29-F687-4f45-9708-019B960494DF}">
-                <a14:hiddenLine xmlns:a14="http://schemas.microsoft.com/office/drawing/2010/main" xmlns="" w="9525">
+                <a14:hiddenLine xmlns="" xmlns:a14="http://schemas.microsoft.com/office/drawing/2010/main" w="9525">
                   <a:solidFill>
                     <a:srgbClr val="000000"/>
                   </a:solidFill>
@@ -3636,7 +3636,7 @@
             </a:ln>
             <a:extLst>
               <a:ext uri="{91240B29-F687-4f45-9708-019B960494DF}">
-                <a14:hiddenLine xmlns:a14="http://schemas.microsoft.com/office/drawing/2010/main" xmlns="" w="9525">
+                <a14:hiddenLine xmlns="" xmlns:a14="http://schemas.microsoft.com/office/drawing/2010/main" w="9525">
                   <a:solidFill>
                     <a:srgbClr val="000000"/>
                   </a:solidFill>
@@ -3726,7 +3726,7 @@
             </a:ln>
             <a:extLst>
               <a:ext uri="{91240B29-F687-4f45-9708-019B960494DF}">
-                <a14:hiddenLine xmlns:a14="http://schemas.microsoft.com/office/drawing/2010/main" xmlns="" w="9525">
+                <a14:hiddenLine xmlns="" xmlns:a14="http://schemas.microsoft.com/office/drawing/2010/main" w="9525">
                   <a:solidFill>
                     <a:srgbClr val="000000"/>
                   </a:solidFill>
@@ -3816,7 +3816,7 @@
             </a:ln>
             <a:extLst>
               <a:ext uri="{91240B29-F687-4f45-9708-019B960494DF}">
-                <a14:hiddenLine xmlns:a14="http://schemas.microsoft.com/office/drawing/2010/main" xmlns="" w="9525">
+                <a14:hiddenLine xmlns="" xmlns:a14="http://schemas.microsoft.com/office/drawing/2010/main" w="9525">
                   <a:solidFill>
                     <a:srgbClr val="000000"/>
                   </a:solidFill>
@@ -3878,7 +3878,7 @@
             </a:ln>
             <a:extLst>
               <a:ext uri="{91240B29-F687-4f45-9708-019B960494DF}">
-                <a14:hiddenLine xmlns:a14="http://schemas.microsoft.com/office/drawing/2010/main" xmlns="" w="9525">
+                <a14:hiddenLine xmlns="" xmlns:a14="http://schemas.microsoft.com/office/drawing/2010/main" w="9525">
                   <a:solidFill>
                     <a:srgbClr val="000000"/>
                   </a:solidFill>
@@ -3968,7 +3968,7 @@
             </a:ln>
             <a:extLst>
               <a:ext uri="{91240B29-F687-4f45-9708-019B960494DF}">
-                <a14:hiddenLine xmlns:a14="http://schemas.microsoft.com/office/drawing/2010/main" xmlns="" w="9525">
+                <a14:hiddenLine xmlns="" xmlns:a14="http://schemas.microsoft.com/office/drawing/2010/main" w="9525">
                   <a:solidFill>
                     <a:srgbClr val="000000"/>
                   </a:solidFill>
@@ -4058,7 +4058,7 @@
             </a:ln>
             <a:extLst>
               <a:ext uri="{91240B29-F687-4f45-9708-019B960494DF}">
-                <a14:hiddenLine xmlns:a14="http://schemas.microsoft.com/office/drawing/2010/main" xmlns="" w="9525">
+                <a14:hiddenLine xmlns="" xmlns:a14="http://schemas.microsoft.com/office/drawing/2010/main" w="9525">
                   <a:solidFill>
                     <a:srgbClr val="000000"/>
                   </a:solidFill>
@@ -4114,7 +4114,7 @@
             </a:ln>
             <a:extLst>
               <a:ext uri="{91240B29-F687-4f45-9708-019B960494DF}">
-                <a14:hiddenLine xmlns:a14="http://schemas.microsoft.com/office/drawing/2010/main" xmlns="" w="9525">
+                <a14:hiddenLine xmlns="" xmlns:a14="http://schemas.microsoft.com/office/drawing/2010/main" w="9525">
                   <a:solidFill>
                     <a:srgbClr val="000000"/>
                   </a:solidFill>
@@ -4204,7 +4204,7 @@
             </a:ln>
             <a:extLst>
               <a:ext uri="{91240B29-F687-4f45-9708-019B960494DF}">
-                <a14:hiddenLine xmlns:a14="http://schemas.microsoft.com/office/drawing/2010/main" xmlns="" w="9525">
+                <a14:hiddenLine xmlns="" xmlns:a14="http://schemas.microsoft.com/office/drawing/2010/main" w="9525">
                   <a:solidFill>
                     <a:srgbClr val="000000"/>
                   </a:solidFill>
@@ -4260,7 +4260,7 @@
             </a:ln>
             <a:extLst>
               <a:ext uri="{91240B29-F687-4f45-9708-019B960494DF}">
-                <a14:hiddenLine xmlns:a14="http://schemas.microsoft.com/office/drawing/2010/main" xmlns="" w="9525">
+                <a14:hiddenLine xmlns="" xmlns:a14="http://schemas.microsoft.com/office/drawing/2010/main" w="9525">
                   <a:solidFill>
                     <a:srgbClr val="000000"/>
                   </a:solidFill>
@@ -4350,7 +4350,7 @@
             </a:ln>
             <a:extLst>
               <a:ext uri="{91240B29-F687-4f45-9708-019B960494DF}">
-                <a14:hiddenLine xmlns:a14="http://schemas.microsoft.com/office/drawing/2010/main" xmlns="" w="9525">
+                <a14:hiddenLine xmlns="" xmlns:a14="http://schemas.microsoft.com/office/drawing/2010/main" w="9525">
                   <a:solidFill>
                     <a:srgbClr val="000000"/>
                   </a:solidFill>
@@ -4418,7 +4418,7 @@
             </a:ln>
             <a:extLst>
               <a:ext uri="{91240B29-F687-4f45-9708-019B960494DF}">
-                <a14:hiddenLine xmlns:a14="http://schemas.microsoft.com/office/drawing/2010/main" xmlns="" w="9525">
+                <a14:hiddenLine xmlns="" xmlns:a14="http://schemas.microsoft.com/office/drawing/2010/main" w="9525">
                   <a:solidFill>
                     <a:srgbClr val="000000"/>
                   </a:solidFill>
@@ -4508,7 +4508,7 @@
             </a:ln>
             <a:extLst>
               <a:ext uri="{91240B29-F687-4f45-9708-019B960494DF}">
-                <a14:hiddenLine xmlns:a14="http://schemas.microsoft.com/office/drawing/2010/main" xmlns="" w="9525">
+                <a14:hiddenLine xmlns="" xmlns:a14="http://schemas.microsoft.com/office/drawing/2010/main" w="9525">
                   <a:solidFill>
                     <a:srgbClr val="000000"/>
                   </a:solidFill>
@@ -4576,7 +4576,7 @@
             </a:ln>
             <a:extLst>
               <a:ext uri="{91240B29-F687-4f45-9708-019B960494DF}">
-                <a14:hiddenLine xmlns:a14="http://schemas.microsoft.com/office/drawing/2010/main" xmlns="" w="9525">
+                <a14:hiddenLine xmlns="" xmlns:a14="http://schemas.microsoft.com/office/drawing/2010/main" w="9525">
                   <a:solidFill>
                     <a:srgbClr val="000000"/>
                   </a:solidFill>
@@ -4666,7 +4666,7 @@
             </a:ln>
             <a:extLst>
               <a:ext uri="{91240B29-F687-4f45-9708-019B960494DF}">
-                <a14:hiddenLine xmlns:a14="http://schemas.microsoft.com/office/drawing/2010/main" xmlns="" w="9525">
+                <a14:hiddenLine xmlns="" xmlns:a14="http://schemas.microsoft.com/office/drawing/2010/main" w="9525">
                   <a:solidFill>
                     <a:srgbClr val="000000"/>
                   </a:solidFill>
@@ -4700,7 +4700,7 @@
             </a:ln>
             <a:extLst>
               <a:ext uri="{91240B29-F687-4f45-9708-019B960494DF}">
-                <a14:hiddenLine xmlns:a14="http://schemas.microsoft.com/office/drawing/2010/main" xmlns="" w="9525">
+                <a14:hiddenLine xmlns="" xmlns:a14="http://schemas.microsoft.com/office/drawing/2010/main" w="9525">
                   <a:solidFill>
                     <a:srgbClr val="000000"/>
                   </a:solidFill>
@@ -4790,7 +4790,7 @@
             </a:ln>
             <a:extLst>
               <a:ext uri="{91240B29-F687-4f45-9708-019B960494DF}">
-                <a14:hiddenLine xmlns:a14="http://schemas.microsoft.com/office/drawing/2010/main" xmlns="" w="9525">
+                <a14:hiddenLine xmlns="" xmlns:a14="http://schemas.microsoft.com/office/drawing/2010/main" w="9525">
                   <a:solidFill>
                     <a:srgbClr val="000000"/>
                   </a:solidFill>
@@ -4852,7 +4852,7 @@
             </a:ln>
             <a:extLst>
               <a:ext uri="{91240B29-F687-4f45-9708-019B960494DF}">
-                <a14:hiddenLine xmlns:a14="http://schemas.microsoft.com/office/drawing/2010/main" xmlns="" w="9525">
+                <a14:hiddenLine xmlns="" xmlns:a14="http://schemas.microsoft.com/office/drawing/2010/main" w="9525">
                   <a:solidFill>
                     <a:srgbClr val="000000"/>
                   </a:solidFill>
@@ -4914,7 +4914,7 @@
             </a:ln>
             <a:extLst>
               <a:ext uri="{91240B29-F687-4f45-9708-019B960494DF}">
-                <a14:hiddenLine xmlns:a14="http://schemas.microsoft.com/office/drawing/2010/main" xmlns="" w="9525">
+                <a14:hiddenLine xmlns="" xmlns:a14="http://schemas.microsoft.com/office/drawing/2010/main" w="9525">
                   <a:solidFill>
                     <a:srgbClr val="000000"/>
                   </a:solidFill>
@@ -5004,7 +5004,7 @@
             </a:ln>
             <a:extLst>
               <a:ext uri="{91240B29-F687-4f45-9708-019B960494DF}">
-                <a14:hiddenLine xmlns:a14="http://schemas.microsoft.com/office/drawing/2010/main" xmlns="" w="9525">
+                <a14:hiddenLine xmlns="" xmlns:a14="http://schemas.microsoft.com/office/drawing/2010/main" w="9525">
                   <a:solidFill>
                     <a:srgbClr val="000000"/>
                   </a:solidFill>
@@ -5072,7 +5072,7 @@
             </a:ln>
             <a:extLst>
               <a:ext uri="{91240B29-F687-4f45-9708-019B960494DF}">
-                <a14:hiddenLine xmlns:a14="http://schemas.microsoft.com/office/drawing/2010/main" xmlns="" w="9525">
+                <a14:hiddenLine xmlns="" xmlns:a14="http://schemas.microsoft.com/office/drawing/2010/main" w="9525">
                   <a:solidFill>
                     <a:srgbClr val="000000"/>
                   </a:solidFill>
@@ -5134,7 +5134,7 @@
             </a:ln>
             <a:extLst>
               <a:ext uri="{91240B29-F687-4f45-9708-019B960494DF}">
-                <a14:hiddenLine xmlns:a14="http://schemas.microsoft.com/office/drawing/2010/main" xmlns="" w="9525">
+                <a14:hiddenLine xmlns="" xmlns:a14="http://schemas.microsoft.com/office/drawing/2010/main" w="9525">
                   <a:solidFill>
                     <a:srgbClr val="000000"/>
                   </a:solidFill>
@@ -5224,7 +5224,7 @@
             </a:ln>
             <a:extLst>
               <a:ext uri="{91240B29-F687-4f45-9708-019B960494DF}">
-                <a14:hiddenLine xmlns:a14="http://schemas.microsoft.com/office/drawing/2010/main" xmlns="" w="9525">
+                <a14:hiddenLine xmlns="" xmlns:a14="http://schemas.microsoft.com/office/drawing/2010/main" w="9525">
                   <a:solidFill>
                     <a:srgbClr val="000000"/>
                   </a:solidFill>
@@ -5286,7 +5286,7 @@
             </a:ln>
             <a:extLst>
               <a:ext uri="{91240B29-F687-4f45-9708-019B960494DF}">
-                <a14:hiddenLine xmlns:a14="http://schemas.microsoft.com/office/drawing/2010/main" xmlns="" w="9525">
+                <a14:hiddenLine xmlns="" xmlns:a14="http://schemas.microsoft.com/office/drawing/2010/main" w="9525">
                   <a:solidFill>
                     <a:srgbClr val="000000"/>
                   </a:solidFill>
@@ -5376,7 +5376,7 @@
             </a:ln>
             <a:extLst>
               <a:ext uri="{91240B29-F687-4f45-9708-019B960494DF}">
-                <a14:hiddenLine xmlns:a14="http://schemas.microsoft.com/office/drawing/2010/main" xmlns="" w="9525">
+                <a14:hiddenLine xmlns="" xmlns:a14="http://schemas.microsoft.com/office/drawing/2010/main" w="9525">
                   <a:solidFill>
                     <a:srgbClr val="000000"/>
                   </a:solidFill>
@@ -5438,7 +5438,7 @@
             </a:ln>
             <a:extLst>
               <a:ext uri="{91240B29-F687-4f45-9708-019B960494DF}">
-                <a14:hiddenLine xmlns:a14="http://schemas.microsoft.com/office/drawing/2010/main" xmlns="" w="9525">
+                <a14:hiddenLine xmlns="" xmlns:a14="http://schemas.microsoft.com/office/drawing/2010/main" w="9525">
                   <a:solidFill>
                     <a:srgbClr val="000000"/>
                   </a:solidFill>
@@ -5528,7 +5528,7 @@
             </a:ln>
             <a:extLst>
               <a:ext uri="{91240B29-F687-4f45-9708-019B960494DF}">
-                <a14:hiddenLine xmlns:a14="http://schemas.microsoft.com/office/drawing/2010/main" xmlns="" w="9525">
+                <a14:hiddenLine xmlns="" xmlns:a14="http://schemas.microsoft.com/office/drawing/2010/main" w="9525">
                   <a:solidFill>
                     <a:srgbClr val="000000"/>
                   </a:solidFill>
@@ -5562,7 +5562,7 @@
             </a:ln>
             <a:extLst>
               <a:ext uri="{91240B29-F687-4f45-9708-019B960494DF}">
-                <a14:hiddenLine xmlns:a14="http://schemas.microsoft.com/office/drawing/2010/main" xmlns="" w="9525">
+                <a14:hiddenLine xmlns="" xmlns:a14="http://schemas.microsoft.com/office/drawing/2010/main" w="9525">
                   <a:solidFill>
                     <a:srgbClr val="000000"/>
                   </a:solidFill>
@@ -5627,7 +5627,7 @@
             </a:ln>
             <a:extLst>
               <a:ext uri="{91240B29-F687-4f45-9708-019B960494DF}">
-                <a14:hiddenLine xmlns:a14="http://schemas.microsoft.com/office/drawing/2010/main" xmlns="" w="9525">
+                <a14:hiddenLine xmlns="" xmlns:a14="http://schemas.microsoft.com/office/drawing/2010/main" w="9525">
                   <a:solidFill>
                     <a:srgbClr val="000000"/>
                   </a:solidFill>
@@ -5717,7 +5717,7 @@
             </a:ln>
             <a:extLst>
               <a:ext uri="{91240B29-F687-4f45-9708-019B960494DF}">
-                <a14:hiddenLine xmlns:a14="http://schemas.microsoft.com/office/drawing/2010/main" xmlns="" w="9525">
+                <a14:hiddenLine xmlns="" xmlns:a14="http://schemas.microsoft.com/office/drawing/2010/main" w="9525">
                   <a:solidFill>
                     <a:srgbClr val="000000"/>
                   </a:solidFill>
@@ -5779,7 +5779,7 @@
             </a:ln>
             <a:extLst>
               <a:ext uri="{91240B29-F687-4f45-9708-019B960494DF}">
-                <a14:hiddenLine xmlns:a14="http://schemas.microsoft.com/office/drawing/2010/main" xmlns="" w="9525">
+                <a14:hiddenLine xmlns="" xmlns:a14="http://schemas.microsoft.com/office/drawing/2010/main" w="9525">
                   <a:solidFill>
                     <a:srgbClr val="000000"/>
                   </a:solidFill>
@@ -5869,7 +5869,7 @@
             </a:ln>
             <a:extLst>
               <a:ext uri="{91240B29-F687-4f45-9708-019B960494DF}">
-                <a14:hiddenLine xmlns:a14="http://schemas.microsoft.com/office/drawing/2010/main" xmlns="" w="9525">
+                <a14:hiddenLine xmlns="" xmlns:a14="http://schemas.microsoft.com/office/drawing/2010/main" w="9525">
                   <a:solidFill>
                     <a:srgbClr val="000000"/>
                   </a:solidFill>
@@ -5959,7 +5959,7 @@
             </a:ln>
             <a:extLst>
               <a:ext uri="{91240B29-F687-4f45-9708-019B960494DF}">
-                <a14:hiddenLine xmlns:a14="http://schemas.microsoft.com/office/drawing/2010/main" xmlns="" w="9525">
+                <a14:hiddenLine xmlns="" xmlns:a14="http://schemas.microsoft.com/office/drawing/2010/main" w="9525">
                   <a:solidFill>
                     <a:srgbClr val="000000"/>
                   </a:solidFill>
@@ -6024,7 +6024,7 @@
             </a:ln>
             <a:extLst>
               <a:ext uri="{91240B29-F687-4f45-9708-019B960494DF}">
-                <a14:hiddenLine xmlns:a14="http://schemas.microsoft.com/office/drawing/2010/main" xmlns="" w="9525">
+                <a14:hiddenLine xmlns="" xmlns:a14="http://schemas.microsoft.com/office/drawing/2010/main" w="9525">
                   <a:solidFill>
                     <a:srgbClr val="000000"/>
                   </a:solidFill>
@@ -6086,7 +6086,7 @@
             </a:ln>
             <a:extLst>
               <a:ext uri="{91240B29-F687-4f45-9708-019B960494DF}">
-                <a14:hiddenLine xmlns:a14="http://schemas.microsoft.com/office/drawing/2010/main" xmlns="" w="9525">
+                <a14:hiddenLine xmlns="" xmlns:a14="http://schemas.microsoft.com/office/drawing/2010/main" w="9525">
                   <a:solidFill>
                     <a:srgbClr val="000000"/>
                   </a:solidFill>
@@ -6176,7 +6176,7 @@
             </a:ln>
             <a:extLst>
               <a:ext uri="{91240B29-F687-4f45-9708-019B960494DF}">
-                <a14:hiddenLine xmlns:a14="http://schemas.microsoft.com/office/drawing/2010/main" xmlns="" w="9525">
+                <a14:hiddenLine xmlns="" xmlns:a14="http://schemas.microsoft.com/office/drawing/2010/main" w="9525">
                   <a:solidFill>
                     <a:srgbClr val="000000"/>
                   </a:solidFill>
@@ -6266,7 +6266,7 @@
             </a:ln>
             <a:extLst>
               <a:ext uri="{91240B29-F687-4f45-9708-019B960494DF}">
-                <a14:hiddenLine xmlns:a14="http://schemas.microsoft.com/office/drawing/2010/main" xmlns="" w="9525">
+                <a14:hiddenLine xmlns="" xmlns:a14="http://schemas.microsoft.com/office/drawing/2010/main" w="9525">
                   <a:solidFill>
                     <a:srgbClr val="000000"/>
                   </a:solidFill>
@@ -6328,7 +6328,7 @@
             </a:ln>
             <a:extLst>
               <a:ext uri="{91240B29-F687-4f45-9708-019B960494DF}">
-                <a14:hiddenLine xmlns:a14="http://schemas.microsoft.com/office/drawing/2010/main" xmlns="" w="9525">
+                <a14:hiddenLine xmlns="" xmlns:a14="http://schemas.microsoft.com/office/drawing/2010/main" w="9525">
                   <a:solidFill>
                     <a:srgbClr val="000000"/>
                   </a:solidFill>
@@ -6448,7 +6448,7 @@
             </a:ln>
             <a:extLst>
               <a:ext uri="{91240B29-F687-4f45-9708-019B960494DF}">
-                <a14:hiddenLine xmlns:a14="http://schemas.microsoft.com/office/drawing/2010/main" xmlns="" w="9525">
+                <a14:hiddenLine xmlns="" xmlns:a14="http://schemas.microsoft.com/office/drawing/2010/main" w="9525">
                   <a:solidFill>
                     <a:srgbClr val="000000"/>
                   </a:solidFill>
@@ -6516,7 +6516,7 @@
             </a:ln>
             <a:extLst>
               <a:ext uri="{91240B29-F687-4f45-9708-019B960494DF}">
-                <a14:hiddenLine xmlns:a14="http://schemas.microsoft.com/office/drawing/2010/main" xmlns="" w="9525">
+                <a14:hiddenLine xmlns="" xmlns:a14="http://schemas.microsoft.com/office/drawing/2010/main" w="9525">
                   <a:solidFill>
                     <a:srgbClr val="000000"/>
                   </a:solidFill>
@@ -6606,7 +6606,7 @@
             </a:ln>
             <a:extLst>
               <a:ext uri="{91240B29-F687-4f45-9708-019B960494DF}">
-                <a14:hiddenLine xmlns:a14="http://schemas.microsoft.com/office/drawing/2010/main" xmlns="" w="9525">
+                <a14:hiddenLine xmlns="" xmlns:a14="http://schemas.microsoft.com/office/drawing/2010/main" w="9525">
                   <a:solidFill>
                     <a:srgbClr val="000000"/>
                   </a:solidFill>
@@ -6746,7 +6746,7 @@
           <a:p>
             <a:fld id="{48A87A34-81AB-432B-8DAE-1953F412C126}" type="datetimeFigureOut">
               <a:rPr lang="en-US" dirty="0"/>
-              <a:t>3/25/2020</a:t>
+              <a:t>7/10/2024</a:t>
             </a:fld>
             <a:endParaRPr lang="en-US" dirty="0"/>
           </a:p>
@@ -7008,7 +7008,7 @@
           <a:p>
             <a:fld id="{48A87A34-81AB-432B-8DAE-1953F412C126}" type="datetimeFigureOut">
               <a:rPr lang="en-US" dirty="0"/>
-              <a:t>3/25/2020</a:t>
+              <a:t>7/10/2024</a:t>
             </a:fld>
             <a:endParaRPr lang="en-US" dirty="0"/>
           </a:p>
@@ -7199,7 +7199,7 @@
           <a:p>
             <a:fld id="{48A87A34-81AB-432B-8DAE-1953F412C126}" type="datetimeFigureOut">
               <a:rPr lang="en-US" dirty="0"/>
-              <a:t>3/25/2020</a:t>
+              <a:t>7/10/2024</a:t>
             </a:fld>
             <a:endParaRPr lang="en-US" dirty="0"/>
           </a:p>
@@ -7457,7 +7457,7 @@
           <a:p>
             <a:fld id="{48A87A34-81AB-432B-8DAE-1953F412C126}" type="datetimeFigureOut">
               <a:rPr lang="en-US" dirty="0"/>
-              <a:t>3/25/2020</a:t>
+              <a:t>7/10/2024</a:t>
             </a:fld>
             <a:endParaRPr lang="en-US" dirty="0"/>
           </a:p>
@@ -7886,7 +7886,7 @@
           <a:p>
             <a:fld id="{48A87A34-81AB-432B-8DAE-1953F412C126}" type="datetimeFigureOut">
               <a:rPr lang="en-US" dirty="0"/>
-              <a:t>3/25/2020</a:t>
+              <a:t>7/10/2024</a:t>
             </a:fld>
             <a:endParaRPr lang="en-US" dirty="0"/>
           </a:p>
@@ -8427,7 +8427,7 @@
           <a:p>
             <a:fld id="{48A87A34-81AB-432B-8DAE-1953F412C126}" type="datetimeFigureOut">
               <a:rPr lang="en-US" dirty="0"/>
-              <a:t>3/25/2020</a:t>
+              <a:t>7/10/2024</a:t>
             </a:fld>
             <a:endParaRPr lang="en-US" dirty="0"/>
           </a:p>
@@ -9142,7 +9142,7 @@
           <a:p>
             <a:fld id="{48A87A34-81AB-432B-8DAE-1953F412C126}" type="datetimeFigureOut">
               <a:rPr lang="en-US" dirty="0"/>
-              <a:t>3/25/2020</a:t>
+              <a:t>7/10/2024</a:t>
             </a:fld>
             <a:endParaRPr lang="en-US" dirty="0"/>
           </a:p>
@@ -9307,7 +9307,7 @@
           <a:p>
             <a:fld id="{48A87A34-81AB-432B-8DAE-1953F412C126}" type="datetimeFigureOut">
               <a:rPr lang="en-US" dirty="0"/>
-              <a:t>3/25/2020</a:t>
+              <a:t>7/10/2024</a:t>
             </a:fld>
             <a:endParaRPr lang="en-US" dirty="0"/>
           </a:p>
@@ -9482,7 +9482,7 @@
           <a:p>
             <a:fld id="{48A87A34-81AB-432B-8DAE-1953F412C126}" type="datetimeFigureOut">
               <a:rPr lang="en-US" dirty="0"/>
-              <a:t>3/25/2020</a:t>
+              <a:t>7/10/2024</a:t>
             </a:fld>
             <a:endParaRPr lang="en-US" dirty="0"/>
           </a:p>
@@ -9647,7 +9647,7 @@
           <a:p>
             <a:fld id="{48A87A34-81AB-432B-8DAE-1953F412C126}" type="datetimeFigureOut">
               <a:rPr lang="en-US" dirty="0"/>
-              <a:t>3/25/2020</a:t>
+              <a:t>7/10/2024</a:t>
             </a:fld>
             <a:endParaRPr lang="en-US" dirty="0"/>
           </a:p>
@@ -9892,7 +9892,7 @@
           <a:p>
             <a:fld id="{48A87A34-81AB-432B-8DAE-1953F412C126}" type="datetimeFigureOut">
               <a:rPr lang="en-US" dirty="0"/>
-              <a:t>3/25/2020</a:t>
+              <a:t>7/10/2024</a:t>
             </a:fld>
             <a:endParaRPr lang="en-US" dirty="0"/>
           </a:p>
@@ -10119,7 +10119,7 @@
           <a:p>
             <a:fld id="{48A87A34-81AB-432B-8DAE-1953F412C126}" type="datetimeFigureOut">
               <a:rPr lang="en-US" dirty="0"/>
-              <a:t>3/25/2020</a:t>
+              <a:t>7/10/2024</a:t>
             </a:fld>
             <a:endParaRPr lang="en-US" dirty="0"/>
           </a:p>
@@ -10495,7 +10495,7 @@
           <a:p>
             <a:fld id="{48A87A34-81AB-432B-8DAE-1953F412C126}" type="datetimeFigureOut">
               <a:rPr lang="en-US" dirty="0"/>
-              <a:t>3/25/2020</a:t>
+              <a:t>7/10/2024</a:t>
             </a:fld>
             <a:endParaRPr lang="en-US" dirty="0"/>
           </a:p>
@@ -10608,7 +10608,7 @@
           <a:p>
             <a:fld id="{48A87A34-81AB-432B-8DAE-1953F412C126}" type="datetimeFigureOut">
               <a:rPr lang="en-US" dirty="0"/>
-              <a:t>3/25/2020</a:t>
+              <a:t>7/10/2024</a:t>
             </a:fld>
             <a:endParaRPr lang="en-US" dirty="0"/>
           </a:p>
@@ -10698,7 +10698,7 @@
           <a:p>
             <a:fld id="{48A87A34-81AB-432B-8DAE-1953F412C126}" type="datetimeFigureOut">
               <a:rPr lang="en-US" dirty="0"/>
-              <a:t>3/25/2020</a:t>
+              <a:t>7/10/2024</a:t>
             </a:fld>
             <a:endParaRPr lang="en-US" dirty="0"/>
           </a:p>
@@ -10942,7 +10942,7 @@
           <a:p>
             <a:fld id="{48A87A34-81AB-432B-8DAE-1953F412C126}" type="datetimeFigureOut">
               <a:rPr lang="en-US" dirty="0"/>
-              <a:t>3/25/2020</a:t>
+              <a:t>7/10/2024</a:t>
             </a:fld>
             <a:endParaRPr lang="en-US" dirty="0"/>
           </a:p>
@@ -11217,7 +11217,7 @@
           <a:p>
             <a:fld id="{48A87A34-81AB-432B-8DAE-1953F412C126}" type="datetimeFigureOut">
               <a:rPr lang="en-US" dirty="0"/>
-              <a:t>3/25/2020</a:t>
+              <a:t>7/10/2024</a:t>
             </a:fld>
             <a:endParaRPr lang="en-US" dirty="0"/>
           </a:p>
@@ -11335,7 +11335,7 @@
           <a:noFill/>
           <a:extLst>
             <a:ext uri="{909E8E84-426E-40dd-AFC4-6F175D3DCCD1}">
-              <a14:hiddenFill xmlns:a14="http://schemas.microsoft.com/office/drawing/2010/main" xmlns="">
+              <a14:hiddenFill xmlns="" xmlns:a14="http://schemas.microsoft.com/office/drawing/2010/main">
                 <a:solidFill>
                   <a:srgbClr val="FFFFFF"/>
                 </a:solidFill>
@@ -11409,7 +11409,7 @@
               </a:ln>
               <a:extLst>
                 <a:ext uri="{91240B29-F687-4f45-9708-019B960494DF}">
-                  <a14:hiddenLine xmlns:a14="http://schemas.microsoft.com/office/drawing/2010/main" xmlns="" w="9525">
+                  <a14:hiddenLine xmlns="" xmlns:a14="http://schemas.microsoft.com/office/drawing/2010/main" w="9525">
                     <a:solidFill>
                       <a:srgbClr val="000000"/>
                     </a:solidFill>
@@ -11499,7 +11499,7 @@
               </a:ln>
               <a:extLst>
                 <a:ext uri="{91240B29-F687-4f45-9708-019B960494DF}">
-                  <a14:hiddenLine xmlns:a14="http://schemas.microsoft.com/office/drawing/2010/main" xmlns="" w="9525">
+                  <a14:hiddenLine xmlns="" xmlns:a14="http://schemas.microsoft.com/office/drawing/2010/main" w="9525">
                     <a:solidFill>
                       <a:srgbClr val="000000"/>
                     </a:solidFill>
@@ -11589,7 +11589,7 @@
               </a:ln>
               <a:extLst>
                 <a:ext uri="{91240B29-F687-4f45-9708-019B960494DF}">
-                  <a14:hiddenLine xmlns:a14="http://schemas.microsoft.com/office/drawing/2010/main" xmlns="" w="9525">
+                  <a14:hiddenLine xmlns="" xmlns:a14="http://schemas.microsoft.com/office/drawing/2010/main" w="9525">
                     <a:solidFill>
                       <a:srgbClr val="000000"/>
                     </a:solidFill>
@@ -11651,7 +11651,7 @@
               </a:ln>
               <a:extLst>
                 <a:ext uri="{91240B29-F687-4f45-9708-019B960494DF}">
-                  <a14:hiddenLine xmlns:a14="http://schemas.microsoft.com/office/drawing/2010/main" xmlns="" w="9525">
+                  <a14:hiddenLine xmlns="" xmlns:a14="http://schemas.microsoft.com/office/drawing/2010/main" w="9525">
                     <a:solidFill>
                       <a:srgbClr val="000000"/>
                     </a:solidFill>
@@ -11741,7 +11741,7 @@
               </a:ln>
               <a:extLst>
                 <a:ext uri="{91240B29-F687-4f45-9708-019B960494DF}">
-                  <a14:hiddenLine xmlns:a14="http://schemas.microsoft.com/office/drawing/2010/main" xmlns="" w="9525">
+                  <a14:hiddenLine xmlns="" xmlns:a14="http://schemas.microsoft.com/office/drawing/2010/main" w="9525">
                     <a:solidFill>
                       <a:srgbClr val="000000"/>
                     </a:solidFill>
@@ -11803,7 +11803,7 @@
               </a:ln>
               <a:extLst>
                 <a:ext uri="{91240B29-F687-4f45-9708-019B960494DF}">
-                  <a14:hiddenLine xmlns:a14="http://schemas.microsoft.com/office/drawing/2010/main" xmlns="" w="9525">
+                  <a14:hiddenLine xmlns="" xmlns:a14="http://schemas.microsoft.com/office/drawing/2010/main" w="9525">
                     <a:solidFill>
                       <a:srgbClr val="000000"/>
                     </a:solidFill>
@@ -11865,7 +11865,7 @@
               </a:ln>
               <a:extLst>
                 <a:ext uri="{91240B29-F687-4f45-9708-019B960494DF}">
-                  <a14:hiddenLine xmlns:a14="http://schemas.microsoft.com/office/drawing/2010/main" xmlns="" w="9525">
+                  <a14:hiddenLine xmlns="" xmlns:a14="http://schemas.microsoft.com/office/drawing/2010/main" w="9525">
                     <a:solidFill>
                       <a:srgbClr val="000000"/>
                     </a:solidFill>
@@ -11955,7 +11955,7 @@
               </a:ln>
               <a:extLst>
                 <a:ext uri="{91240B29-F687-4f45-9708-019B960494DF}">
-                  <a14:hiddenLine xmlns:a14="http://schemas.microsoft.com/office/drawing/2010/main" xmlns="" w="9525">
+                  <a14:hiddenLine xmlns="" xmlns:a14="http://schemas.microsoft.com/office/drawing/2010/main" w="9525">
                     <a:solidFill>
                       <a:srgbClr val="000000"/>
                     </a:solidFill>
@@ -12045,7 +12045,7 @@
               </a:ln>
               <a:extLst>
                 <a:ext uri="{91240B29-F687-4f45-9708-019B960494DF}">
-                  <a14:hiddenLine xmlns:a14="http://schemas.microsoft.com/office/drawing/2010/main" xmlns="" w="9525">
+                  <a14:hiddenLine xmlns="" xmlns:a14="http://schemas.microsoft.com/office/drawing/2010/main" w="9525">
                     <a:solidFill>
                       <a:srgbClr val="000000"/>
                     </a:solidFill>
@@ -12107,7 +12107,7 @@
               </a:ln>
               <a:extLst>
                 <a:ext uri="{91240B29-F687-4f45-9708-019B960494DF}">
-                  <a14:hiddenLine xmlns:a14="http://schemas.microsoft.com/office/drawing/2010/main" xmlns="" w="9525">
+                  <a14:hiddenLine xmlns="" xmlns:a14="http://schemas.microsoft.com/office/drawing/2010/main" w="9525">
                     <a:solidFill>
                       <a:srgbClr val="000000"/>
                     </a:solidFill>
@@ -12217,7 +12217,7 @@
               </a:ln>
               <a:extLst>
                 <a:ext uri="{91240B29-F687-4f45-9708-019B960494DF}">
-                  <a14:hiddenLine xmlns:a14="http://schemas.microsoft.com/office/drawing/2010/main" xmlns="" w="9525">
+                  <a14:hiddenLine xmlns="" xmlns:a14="http://schemas.microsoft.com/office/drawing/2010/main" w="9525">
                     <a:solidFill>
                       <a:srgbClr val="000000"/>
                     </a:solidFill>
@@ -12301,7 +12301,7 @@
               </a:ln>
               <a:extLst>
                 <a:ext uri="{91240B29-F687-4f45-9708-019B960494DF}">
-                  <a14:hiddenLine xmlns:a14="http://schemas.microsoft.com/office/drawing/2010/main" xmlns="" w="9525">
+                  <a14:hiddenLine xmlns="" xmlns:a14="http://schemas.microsoft.com/office/drawing/2010/main" w="9525">
                     <a:solidFill>
                       <a:srgbClr val="000000"/>
                     </a:solidFill>
@@ -12363,7 +12363,7 @@
               </a:ln>
               <a:extLst>
                 <a:ext uri="{91240B29-F687-4f45-9708-019B960494DF}">
-                  <a14:hiddenLine xmlns:a14="http://schemas.microsoft.com/office/drawing/2010/main" xmlns="" w="9525">
+                  <a14:hiddenLine xmlns="" xmlns:a14="http://schemas.microsoft.com/office/drawing/2010/main" w="9525">
                     <a:solidFill>
                       <a:srgbClr val="000000"/>
                     </a:solidFill>
@@ -12425,7 +12425,7 @@
               </a:ln>
               <a:extLst>
                 <a:ext uri="{91240B29-F687-4f45-9708-019B960494DF}">
-                  <a14:hiddenLine xmlns:a14="http://schemas.microsoft.com/office/drawing/2010/main" xmlns="" w="9525">
+                  <a14:hiddenLine xmlns="" xmlns:a14="http://schemas.microsoft.com/office/drawing/2010/main" w="9525">
                     <a:solidFill>
                       <a:srgbClr val="000000"/>
                     </a:solidFill>
@@ -12515,7 +12515,7 @@
               </a:ln>
               <a:extLst>
                 <a:ext uri="{91240B29-F687-4f45-9708-019B960494DF}">
-                  <a14:hiddenLine xmlns:a14="http://schemas.microsoft.com/office/drawing/2010/main" xmlns="" w="9525">
+                  <a14:hiddenLine xmlns="" xmlns:a14="http://schemas.microsoft.com/office/drawing/2010/main" w="9525">
                     <a:solidFill>
                       <a:srgbClr val="000000"/>
                     </a:solidFill>
@@ -12549,7 +12549,7 @@
               </a:ln>
               <a:extLst>
                 <a:ext uri="{91240B29-F687-4f45-9708-019B960494DF}">
-                  <a14:hiddenLine xmlns:a14="http://schemas.microsoft.com/office/drawing/2010/main" xmlns="" w="9525">
+                  <a14:hiddenLine xmlns="" xmlns:a14="http://schemas.microsoft.com/office/drawing/2010/main" w="9525">
                     <a:solidFill>
                       <a:srgbClr val="000000"/>
                     </a:solidFill>
@@ -12614,7 +12614,7 @@
               </a:ln>
               <a:extLst>
                 <a:ext uri="{91240B29-F687-4f45-9708-019B960494DF}">
-                  <a14:hiddenLine xmlns:a14="http://schemas.microsoft.com/office/drawing/2010/main" xmlns="" w="9525">
+                  <a14:hiddenLine xmlns="" xmlns:a14="http://schemas.microsoft.com/office/drawing/2010/main" w="9525">
                     <a:solidFill>
                       <a:srgbClr val="000000"/>
                     </a:solidFill>
@@ -12704,7 +12704,7 @@
               </a:ln>
               <a:extLst>
                 <a:ext uri="{91240B29-F687-4f45-9708-019B960494DF}">
-                  <a14:hiddenLine xmlns:a14="http://schemas.microsoft.com/office/drawing/2010/main" xmlns="" w="9525">
+                  <a14:hiddenLine xmlns="" xmlns:a14="http://schemas.microsoft.com/office/drawing/2010/main" w="9525">
                     <a:solidFill>
                       <a:srgbClr val="000000"/>
                     </a:solidFill>
@@ -12766,7 +12766,7 @@
               </a:ln>
               <a:extLst>
                 <a:ext uri="{91240B29-F687-4f45-9708-019B960494DF}">
-                  <a14:hiddenLine xmlns:a14="http://schemas.microsoft.com/office/drawing/2010/main" xmlns="" w="9525">
+                  <a14:hiddenLine xmlns="" xmlns:a14="http://schemas.microsoft.com/office/drawing/2010/main" w="9525">
                     <a:solidFill>
                       <a:srgbClr val="000000"/>
                     </a:solidFill>
@@ -12856,7 +12856,7 @@
               </a:ln>
               <a:extLst>
                 <a:ext uri="{91240B29-F687-4f45-9708-019B960494DF}">
-                  <a14:hiddenLine xmlns:a14="http://schemas.microsoft.com/office/drawing/2010/main" xmlns="" w="9525">
+                  <a14:hiddenLine xmlns="" xmlns:a14="http://schemas.microsoft.com/office/drawing/2010/main" w="9525">
                     <a:solidFill>
                       <a:srgbClr val="000000"/>
                     </a:solidFill>
@@ -12921,7 +12921,7 @@
               </a:ln>
               <a:extLst>
                 <a:ext uri="{91240B29-F687-4f45-9708-019B960494DF}">
-                  <a14:hiddenLine xmlns:a14="http://schemas.microsoft.com/office/drawing/2010/main" xmlns="" w="9525">
+                  <a14:hiddenLine xmlns="" xmlns:a14="http://schemas.microsoft.com/office/drawing/2010/main" w="9525">
                     <a:solidFill>
                       <a:srgbClr val="000000"/>
                     </a:solidFill>
@@ -12983,7 +12983,7 @@
               </a:ln>
               <a:extLst>
                 <a:ext uri="{91240B29-F687-4f45-9708-019B960494DF}">
-                  <a14:hiddenLine xmlns:a14="http://schemas.microsoft.com/office/drawing/2010/main" xmlns="" w="9525">
+                  <a14:hiddenLine xmlns="" xmlns:a14="http://schemas.microsoft.com/office/drawing/2010/main" w="9525">
                     <a:solidFill>
                       <a:srgbClr val="000000"/>
                     </a:solidFill>
@@ -13073,7 +13073,7 @@
               </a:ln>
               <a:extLst>
                 <a:ext uri="{91240B29-F687-4f45-9708-019B960494DF}">
-                  <a14:hiddenLine xmlns:a14="http://schemas.microsoft.com/office/drawing/2010/main" xmlns="" w="9525">
+                  <a14:hiddenLine xmlns="" xmlns:a14="http://schemas.microsoft.com/office/drawing/2010/main" w="9525">
                     <a:solidFill>
                       <a:srgbClr val="000000"/>
                     </a:solidFill>
@@ -13163,7 +13163,7 @@
               </a:ln>
               <a:extLst>
                 <a:ext uri="{91240B29-F687-4f45-9708-019B960494DF}">
-                  <a14:hiddenLine xmlns:a14="http://schemas.microsoft.com/office/drawing/2010/main" xmlns="" w="9525">
+                  <a14:hiddenLine xmlns="" xmlns:a14="http://schemas.microsoft.com/office/drawing/2010/main" w="9525">
                     <a:solidFill>
                       <a:srgbClr val="000000"/>
                     </a:solidFill>
@@ -13228,7 +13228,7 @@
               </a:ln>
               <a:extLst>
                 <a:ext uri="{91240B29-F687-4f45-9708-019B960494DF}">
-                  <a14:hiddenLine xmlns:a14="http://schemas.microsoft.com/office/drawing/2010/main" xmlns="" w="9525">
+                  <a14:hiddenLine xmlns="" xmlns:a14="http://schemas.microsoft.com/office/drawing/2010/main" w="9525">
                     <a:solidFill>
                       <a:srgbClr val="000000"/>
                     </a:solidFill>
@@ -13348,7 +13348,7 @@
               </a:ln>
               <a:extLst>
                 <a:ext uri="{91240B29-F687-4f45-9708-019B960494DF}">
-                  <a14:hiddenLine xmlns:a14="http://schemas.microsoft.com/office/drawing/2010/main" xmlns="" w="9525">
+                  <a14:hiddenLine xmlns="" xmlns:a14="http://schemas.microsoft.com/office/drawing/2010/main" w="9525">
                     <a:solidFill>
                       <a:srgbClr val="000000"/>
                     </a:solidFill>
@@ -13429,7 +13429,7 @@
               </a:ln>
               <a:extLst>
                 <a:ext uri="{91240B29-F687-4f45-9708-019B960494DF}">
-                  <a14:hiddenLine xmlns:a14="http://schemas.microsoft.com/office/drawing/2010/main" xmlns="" w="9525">
+                  <a14:hiddenLine xmlns="" xmlns:a14="http://schemas.microsoft.com/office/drawing/2010/main" w="9525">
                     <a:solidFill>
                       <a:srgbClr val="000000"/>
                     </a:solidFill>
@@ -13544,7 +13544,7 @@
               </a:ln>
               <a:extLst>
                 <a:ext uri="{91240B29-F687-4f45-9708-019B960494DF}">
-                  <a14:hiddenLine xmlns:a14="http://schemas.microsoft.com/office/drawing/2010/main" xmlns="" w="9525">
+                  <a14:hiddenLine xmlns="" xmlns:a14="http://schemas.microsoft.com/office/drawing/2010/main" w="9525">
                     <a:solidFill>
                       <a:srgbClr val="000000"/>
                     </a:solidFill>
@@ -13634,7 +13634,7 @@
               </a:ln>
               <a:extLst>
                 <a:ext uri="{91240B29-F687-4f45-9708-019B960494DF}">
-                  <a14:hiddenLine xmlns:a14="http://schemas.microsoft.com/office/drawing/2010/main" xmlns="" w="9525">
+                  <a14:hiddenLine xmlns="" xmlns:a14="http://schemas.microsoft.com/office/drawing/2010/main" w="9525">
                     <a:solidFill>
                       <a:srgbClr val="000000"/>
                     </a:solidFill>
@@ -13699,7 +13699,7 @@
               </a:ln>
               <a:extLst>
                 <a:ext uri="{91240B29-F687-4f45-9708-019B960494DF}">
-                  <a14:hiddenLine xmlns:a14="http://schemas.microsoft.com/office/drawing/2010/main" xmlns="" w="9525">
+                  <a14:hiddenLine xmlns="" xmlns:a14="http://schemas.microsoft.com/office/drawing/2010/main" w="9525">
                     <a:solidFill>
                       <a:srgbClr val="000000"/>
                     </a:solidFill>
@@ -13789,7 +13789,7 @@
               </a:ln>
               <a:extLst>
                 <a:ext uri="{91240B29-F687-4f45-9708-019B960494DF}">
-                  <a14:hiddenLine xmlns:a14="http://schemas.microsoft.com/office/drawing/2010/main" xmlns="" w="9525">
+                  <a14:hiddenLine xmlns="" xmlns:a14="http://schemas.microsoft.com/office/drawing/2010/main" w="9525">
                     <a:solidFill>
                       <a:srgbClr val="000000"/>
                     </a:solidFill>
@@ -13857,7 +13857,7 @@
               </a:ln>
               <a:extLst>
                 <a:ext uri="{91240B29-F687-4f45-9708-019B960494DF}">
-                  <a14:hiddenLine xmlns:a14="http://schemas.microsoft.com/office/drawing/2010/main" xmlns="" w="9525">
+                  <a14:hiddenLine xmlns="" xmlns:a14="http://schemas.microsoft.com/office/drawing/2010/main" w="9525">
                     <a:solidFill>
                       <a:srgbClr val="000000"/>
                     </a:solidFill>
@@ -13947,7 +13947,7 @@
               </a:ln>
               <a:extLst>
                 <a:ext uri="{91240B29-F687-4f45-9708-019B960494DF}">
-                  <a14:hiddenLine xmlns:a14="http://schemas.microsoft.com/office/drawing/2010/main" xmlns="" w="9525">
+                  <a14:hiddenLine xmlns="" xmlns:a14="http://schemas.microsoft.com/office/drawing/2010/main" w="9525">
                     <a:solidFill>
                       <a:srgbClr val="000000"/>
                     </a:solidFill>
@@ -14015,7 +14015,7 @@
               </a:ln>
               <a:extLst>
                 <a:ext uri="{91240B29-F687-4f45-9708-019B960494DF}">
-                  <a14:hiddenLine xmlns:a14="http://schemas.microsoft.com/office/drawing/2010/main" xmlns="" w="9525">
+                  <a14:hiddenLine xmlns="" xmlns:a14="http://schemas.microsoft.com/office/drawing/2010/main" w="9525">
                     <a:solidFill>
                       <a:srgbClr val="000000"/>
                     </a:solidFill>
@@ -14105,7 +14105,7 @@
               </a:ln>
               <a:extLst>
                 <a:ext uri="{91240B29-F687-4f45-9708-019B960494DF}">
-                  <a14:hiddenLine xmlns:a14="http://schemas.microsoft.com/office/drawing/2010/main" xmlns="" w="9525">
+                  <a14:hiddenLine xmlns="" xmlns:a14="http://schemas.microsoft.com/office/drawing/2010/main" w="9525">
                     <a:solidFill>
                       <a:srgbClr val="000000"/>
                     </a:solidFill>
@@ -14139,7 +14139,7 @@
               </a:ln>
               <a:extLst>
                 <a:ext uri="{91240B29-F687-4f45-9708-019B960494DF}">
-                  <a14:hiddenLine xmlns:a14="http://schemas.microsoft.com/office/drawing/2010/main" xmlns="" w="9525">
+                  <a14:hiddenLine xmlns="" xmlns:a14="http://schemas.microsoft.com/office/drawing/2010/main" w="9525">
                     <a:solidFill>
                       <a:srgbClr val="000000"/>
                     </a:solidFill>
@@ -14280,7 +14280,7 @@
             <a:fld id="{48A87A34-81AB-432B-8DAE-1953F412C126}" type="datetimeFigureOut">
               <a:rPr lang="en-US" dirty="0"/>
               <a:pPr/>
-              <a:t>3/25/2020</a:t>
+              <a:t>7/10/2024</a:t>
             </a:fld>
             <a:endParaRPr lang="en-US" dirty="0"/>
           </a:p>
@@ -16594,7 +16594,7 @@
             </a:pPr>
             <a:r>
               <a:rPr lang="en-US" sz="1800" dirty="0"/>
-              <a:t>Very few people ‘need’ to program is ASM</a:t>
+              <a:t>Very few people ‘need’ to program in ASM</a:t>
             </a:r>
           </a:p>
           <a:p>
@@ -18996,7 +18996,7 @@
           <a:noFill/>
           <a:extLst>
             <a:ext uri="{909E8E84-426E-40dd-AFC4-6F175D3DCCD1}">
-              <a14:hiddenFill xmlns="" xmlns:a16="http://schemas.microsoft.com/office/drawing/2014/main" xmlns:a14="http://schemas.microsoft.com/office/drawing/2010/main" xmlns:p14="http://schemas.microsoft.com/office/powerpoint/2010/main">
+              <a14:hiddenFill xmlns:p14="http://schemas.microsoft.com/office/powerpoint/2010/main" xmlns:a14="http://schemas.microsoft.com/office/drawing/2010/main" xmlns:a16="http://schemas.microsoft.com/office/drawing/2014/main" xmlns="">
                 <a:solidFill>
                   <a:srgbClr val="FFFFFF"/>
                 </a:solidFill>
@@ -19087,7 +19087,7 @@
             </a:ln>
             <a:extLst>
               <a:ext uri="{91240B29-F687-4f45-9708-019B960494DF}">
-                <a14:hiddenLine xmlns="" xmlns:a16="http://schemas.microsoft.com/office/drawing/2014/main" xmlns:a14="http://schemas.microsoft.com/office/drawing/2010/main" xmlns:p14="http://schemas.microsoft.com/office/powerpoint/2010/main" w="9525">
+                <a14:hiddenLine xmlns:p14="http://schemas.microsoft.com/office/powerpoint/2010/main" xmlns:a14="http://schemas.microsoft.com/office/drawing/2010/main" xmlns:a16="http://schemas.microsoft.com/office/drawing/2014/main" xmlns="" w="9525">
                   <a:solidFill>
                     <a:srgbClr val="000000"/>
                   </a:solidFill>
@@ -19098,6 +19098,13 @@
               </a:ext>
             </a:extLst>
           </p:spPr>
+          <p:txBody>
+            <a:bodyPr/>
+            <a:lstStyle/>
+            <a:p>
+              <a:endParaRPr lang="en-US"/>
+            </a:p>
+          </p:txBody>
         </p:sp>
         <p:sp>
           <p:nvSpPr>
@@ -19192,7 +19199,7 @@
             </a:ln>
             <a:extLst>
               <a:ext uri="{91240B29-F687-4f45-9708-019B960494DF}">
-                <a14:hiddenLine xmlns="" xmlns:a16="http://schemas.microsoft.com/office/drawing/2014/main" xmlns:a14="http://schemas.microsoft.com/office/drawing/2010/main" xmlns:p14="http://schemas.microsoft.com/office/powerpoint/2010/main" w="9525">
+                <a14:hiddenLine xmlns:p14="http://schemas.microsoft.com/office/powerpoint/2010/main" xmlns:a14="http://schemas.microsoft.com/office/drawing/2010/main" xmlns:a16="http://schemas.microsoft.com/office/drawing/2014/main" xmlns="" w="9525">
                   <a:solidFill>
                     <a:srgbClr val="000000"/>
                   </a:solidFill>
@@ -19203,6 +19210,13 @@
               </a:ext>
             </a:extLst>
           </p:spPr>
+          <p:txBody>
+            <a:bodyPr/>
+            <a:lstStyle/>
+            <a:p>
+              <a:endParaRPr lang="en-US"/>
+            </a:p>
+          </p:txBody>
         </p:sp>
         <p:sp>
           <p:nvSpPr>
@@ -19297,7 +19311,7 @@
             </a:ln>
             <a:extLst>
               <a:ext uri="{91240B29-F687-4f45-9708-019B960494DF}">
-                <a14:hiddenLine xmlns="" xmlns:a16="http://schemas.microsoft.com/office/drawing/2014/main" xmlns:a14="http://schemas.microsoft.com/office/drawing/2010/main" xmlns:p14="http://schemas.microsoft.com/office/powerpoint/2010/main" w="9525">
+                <a14:hiddenLine xmlns:p14="http://schemas.microsoft.com/office/powerpoint/2010/main" xmlns:a14="http://schemas.microsoft.com/office/drawing/2010/main" xmlns:a16="http://schemas.microsoft.com/office/drawing/2014/main" xmlns="" w="9525">
                   <a:solidFill>
                     <a:srgbClr val="000000"/>
                   </a:solidFill>
@@ -19308,6 +19322,13 @@
               </a:ext>
             </a:extLst>
           </p:spPr>
+          <p:txBody>
+            <a:bodyPr/>
+            <a:lstStyle/>
+            <a:p>
+              <a:endParaRPr lang="en-US"/>
+            </a:p>
+          </p:txBody>
         </p:sp>
         <p:sp>
           <p:nvSpPr>
@@ -19346,7 +19367,7 @@
             </a:ln>
             <a:extLst>
               <a:ext uri="{91240B29-F687-4f45-9708-019B960494DF}">
-                <a14:hiddenLine xmlns="" xmlns:a16="http://schemas.microsoft.com/office/drawing/2014/main" xmlns:a14="http://schemas.microsoft.com/office/drawing/2010/main" xmlns:p14="http://schemas.microsoft.com/office/powerpoint/2010/main" w="9525">
+                <a14:hiddenLine xmlns:p14="http://schemas.microsoft.com/office/powerpoint/2010/main" xmlns:a14="http://schemas.microsoft.com/office/drawing/2010/main" xmlns:a16="http://schemas.microsoft.com/office/drawing/2014/main" xmlns="" w="9525">
                   <a:solidFill>
                     <a:srgbClr val="000000"/>
                   </a:solidFill>
@@ -19357,6 +19378,13 @@
               </a:ext>
             </a:extLst>
           </p:spPr>
+          <p:txBody>
+            <a:bodyPr/>
+            <a:lstStyle/>
+            <a:p>
+              <a:endParaRPr lang="en-US"/>
+            </a:p>
+          </p:txBody>
         </p:sp>
         <p:sp>
           <p:nvSpPr>
@@ -19451,7 +19479,7 @@
             </a:ln>
             <a:extLst>
               <a:ext uri="{91240B29-F687-4f45-9708-019B960494DF}">
-                <a14:hiddenLine xmlns="" xmlns:a16="http://schemas.microsoft.com/office/drawing/2014/main" xmlns:a14="http://schemas.microsoft.com/office/drawing/2010/main" xmlns:p14="http://schemas.microsoft.com/office/powerpoint/2010/main" w="9525">
+                <a14:hiddenLine xmlns:p14="http://schemas.microsoft.com/office/powerpoint/2010/main" xmlns:a14="http://schemas.microsoft.com/office/drawing/2010/main" xmlns:a16="http://schemas.microsoft.com/office/drawing/2014/main" xmlns="" w="9525">
                   <a:solidFill>
                     <a:srgbClr val="000000"/>
                   </a:solidFill>
@@ -19462,6 +19490,13 @@
               </a:ext>
             </a:extLst>
           </p:spPr>
+          <p:txBody>
+            <a:bodyPr/>
+            <a:lstStyle/>
+            <a:p>
+              <a:endParaRPr lang="en-US"/>
+            </a:p>
+          </p:txBody>
         </p:sp>
         <p:sp>
           <p:nvSpPr>
@@ -19528,7 +19563,7 @@
             </a:ln>
             <a:extLst>
               <a:ext uri="{91240B29-F687-4f45-9708-019B960494DF}">
-                <a14:hiddenLine xmlns="" xmlns:a16="http://schemas.microsoft.com/office/drawing/2014/main" xmlns:a14="http://schemas.microsoft.com/office/drawing/2010/main" xmlns:p14="http://schemas.microsoft.com/office/powerpoint/2010/main" w="9525">
+                <a14:hiddenLine xmlns:p14="http://schemas.microsoft.com/office/powerpoint/2010/main" xmlns:a14="http://schemas.microsoft.com/office/drawing/2010/main" xmlns:a16="http://schemas.microsoft.com/office/drawing/2014/main" xmlns="" w="9525">
                   <a:solidFill>
                     <a:srgbClr val="000000"/>
                   </a:solidFill>
@@ -19539,6 +19574,13 @@
               </a:ext>
             </a:extLst>
           </p:spPr>
+          <p:txBody>
+            <a:bodyPr/>
+            <a:lstStyle/>
+            <a:p>
+              <a:endParaRPr lang="en-US"/>
+            </a:p>
+          </p:txBody>
         </p:sp>
         <p:sp>
           <p:nvSpPr>
@@ -19605,7 +19647,7 @@
             </a:ln>
             <a:extLst>
               <a:ext uri="{91240B29-F687-4f45-9708-019B960494DF}">
-                <a14:hiddenLine xmlns="" xmlns:a16="http://schemas.microsoft.com/office/drawing/2014/main" xmlns:a14="http://schemas.microsoft.com/office/drawing/2010/main" xmlns:p14="http://schemas.microsoft.com/office/powerpoint/2010/main" w="9525">
+                <a14:hiddenLine xmlns:p14="http://schemas.microsoft.com/office/powerpoint/2010/main" xmlns:a14="http://schemas.microsoft.com/office/drawing/2010/main" xmlns:a16="http://schemas.microsoft.com/office/drawing/2014/main" xmlns="" w="9525">
                   <a:solidFill>
                     <a:srgbClr val="000000"/>
                   </a:solidFill>
@@ -19616,6 +19658,13 @@
               </a:ext>
             </a:extLst>
           </p:spPr>
+          <p:txBody>
+            <a:bodyPr/>
+            <a:lstStyle/>
+            <a:p>
+              <a:endParaRPr lang="en-US"/>
+            </a:p>
+          </p:txBody>
         </p:sp>
         <p:sp>
           <p:nvSpPr>
@@ -19710,7 +19759,7 @@
             </a:ln>
             <a:extLst>
               <a:ext uri="{91240B29-F687-4f45-9708-019B960494DF}">
-                <a14:hiddenLine xmlns="" xmlns:a16="http://schemas.microsoft.com/office/drawing/2014/main" xmlns:a14="http://schemas.microsoft.com/office/drawing/2010/main" xmlns:p14="http://schemas.microsoft.com/office/powerpoint/2010/main" w="9525">
+                <a14:hiddenLine xmlns:p14="http://schemas.microsoft.com/office/powerpoint/2010/main" xmlns:a14="http://schemas.microsoft.com/office/drawing/2010/main" xmlns:a16="http://schemas.microsoft.com/office/drawing/2014/main" xmlns="" w="9525">
                   <a:solidFill>
                     <a:srgbClr val="000000"/>
                   </a:solidFill>
@@ -19721,6 +19770,13 @@
               </a:ext>
             </a:extLst>
           </p:spPr>
+          <p:txBody>
+            <a:bodyPr/>
+            <a:lstStyle/>
+            <a:p>
+              <a:endParaRPr lang="en-US"/>
+            </a:p>
+          </p:txBody>
         </p:sp>
         <p:sp>
           <p:nvSpPr>
@@ -19787,7 +19843,7 @@
             </a:ln>
             <a:extLst>
               <a:ext uri="{91240B29-F687-4f45-9708-019B960494DF}">
-                <a14:hiddenLine xmlns="" xmlns:a16="http://schemas.microsoft.com/office/drawing/2014/main" xmlns:a14="http://schemas.microsoft.com/office/drawing/2010/main" xmlns:p14="http://schemas.microsoft.com/office/powerpoint/2010/main" w="9525">
+                <a14:hiddenLine xmlns:p14="http://schemas.microsoft.com/office/powerpoint/2010/main" xmlns:a14="http://schemas.microsoft.com/office/drawing/2010/main" xmlns:a16="http://schemas.microsoft.com/office/drawing/2014/main" xmlns="" w="9525">
                   <a:solidFill>
                     <a:srgbClr val="000000"/>
                   </a:solidFill>
@@ -19798,6 +19854,13 @@
               </a:ext>
             </a:extLst>
           </p:spPr>
+          <p:txBody>
+            <a:bodyPr/>
+            <a:lstStyle/>
+            <a:p>
+              <a:endParaRPr lang="en-US"/>
+            </a:p>
+          </p:txBody>
         </p:sp>
         <p:sp>
           <p:nvSpPr>
@@ -19864,7 +19927,7 @@
             </a:ln>
             <a:extLst>
               <a:ext uri="{91240B29-F687-4f45-9708-019B960494DF}">
-                <a14:hiddenLine xmlns="" xmlns:a16="http://schemas.microsoft.com/office/drawing/2014/main" xmlns:a14="http://schemas.microsoft.com/office/drawing/2010/main" xmlns:p14="http://schemas.microsoft.com/office/powerpoint/2010/main" w="9525">
+                <a14:hiddenLine xmlns:p14="http://schemas.microsoft.com/office/powerpoint/2010/main" xmlns:a14="http://schemas.microsoft.com/office/drawing/2010/main" xmlns:a16="http://schemas.microsoft.com/office/drawing/2014/main" xmlns="" w="9525">
                   <a:solidFill>
                     <a:srgbClr val="000000"/>
                   </a:solidFill>
@@ -19875,6 +19938,13 @@
               </a:ext>
             </a:extLst>
           </p:spPr>
+          <p:txBody>
+            <a:bodyPr/>
+            <a:lstStyle/>
+            <a:p>
+              <a:endParaRPr lang="en-US"/>
+            </a:p>
+          </p:txBody>
         </p:sp>
         <p:sp>
           <p:nvSpPr>
@@ -19969,7 +20039,7 @@
             </a:ln>
             <a:extLst>
               <a:ext uri="{91240B29-F687-4f45-9708-019B960494DF}">
-                <a14:hiddenLine xmlns="" xmlns:a16="http://schemas.microsoft.com/office/drawing/2014/main" xmlns:a14="http://schemas.microsoft.com/office/drawing/2010/main" xmlns:p14="http://schemas.microsoft.com/office/powerpoint/2010/main" w="9525">
+                <a14:hiddenLine xmlns:p14="http://schemas.microsoft.com/office/powerpoint/2010/main" xmlns:a14="http://schemas.microsoft.com/office/drawing/2010/main" xmlns:a16="http://schemas.microsoft.com/office/drawing/2014/main" xmlns="" w="9525">
                   <a:solidFill>
                     <a:srgbClr val="000000"/>
                   </a:solidFill>
@@ -19980,6 +20050,13 @@
               </a:ext>
             </a:extLst>
           </p:spPr>
+          <p:txBody>
+            <a:bodyPr/>
+            <a:lstStyle/>
+            <a:p>
+              <a:endParaRPr lang="en-US"/>
+            </a:p>
+          </p:txBody>
         </p:sp>
         <p:sp>
           <p:nvSpPr>
@@ -20074,7 +20151,7 @@
             </a:ln>
             <a:extLst>
               <a:ext uri="{91240B29-F687-4f45-9708-019B960494DF}">
-                <a14:hiddenLine xmlns="" xmlns:a16="http://schemas.microsoft.com/office/drawing/2014/main" xmlns:a14="http://schemas.microsoft.com/office/drawing/2010/main" xmlns:p14="http://schemas.microsoft.com/office/powerpoint/2010/main" w="9525">
+                <a14:hiddenLine xmlns:p14="http://schemas.microsoft.com/office/powerpoint/2010/main" xmlns:a14="http://schemas.microsoft.com/office/drawing/2010/main" xmlns:a16="http://schemas.microsoft.com/office/drawing/2014/main" xmlns="" w="9525">
                   <a:solidFill>
                     <a:srgbClr val="000000"/>
                   </a:solidFill>
@@ -20085,6 +20162,13 @@
               </a:ext>
             </a:extLst>
           </p:spPr>
+          <p:txBody>
+            <a:bodyPr/>
+            <a:lstStyle/>
+            <a:p>
+              <a:endParaRPr lang="en-US"/>
+            </a:p>
+          </p:txBody>
         </p:sp>
         <p:sp>
           <p:nvSpPr>
@@ -20151,7 +20235,7 @@
             </a:ln>
             <a:extLst>
               <a:ext uri="{91240B29-F687-4f45-9708-019B960494DF}">
-                <a14:hiddenLine xmlns="" xmlns:a16="http://schemas.microsoft.com/office/drawing/2014/main" xmlns:a14="http://schemas.microsoft.com/office/drawing/2010/main" xmlns:p14="http://schemas.microsoft.com/office/powerpoint/2010/main" w="9525">
+                <a14:hiddenLine xmlns:p14="http://schemas.microsoft.com/office/powerpoint/2010/main" xmlns:a14="http://schemas.microsoft.com/office/drawing/2010/main" xmlns:a16="http://schemas.microsoft.com/office/drawing/2014/main" xmlns="" w="9525">
                   <a:solidFill>
                     <a:srgbClr val="000000"/>
                   </a:solidFill>
@@ -20162,6 +20246,13 @@
               </a:ext>
             </a:extLst>
           </p:spPr>
+          <p:txBody>
+            <a:bodyPr/>
+            <a:lstStyle/>
+            <a:p>
+              <a:endParaRPr lang="en-US"/>
+            </a:p>
+          </p:txBody>
         </p:sp>
         <p:sp>
           <p:nvSpPr>
@@ -20276,7 +20367,7 @@
             </a:ln>
             <a:extLst>
               <a:ext uri="{91240B29-F687-4f45-9708-019B960494DF}">
-                <a14:hiddenLine xmlns="" xmlns:a16="http://schemas.microsoft.com/office/drawing/2014/main" xmlns:a14="http://schemas.microsoft.com/office/drawing/2010/main" xmlns:p14="http://schemas.microsoft.com/office/powerpoint/2010/main" w="9525">
+                <a14:hiddenLine xmlns:p14="http://schemas.microsoft.com/office/powerpoint/2010/main" xmlns:a14="http://schemas.microsoft.com/office/drawing/2010/main" xmlns:a16="http://schemas.microsoft.com/office/drawing/2014/main" xmlns="" w="9525">
                   <a:solidFill>
                     <a:srgbClr val="000000"/>
                   </a:solidFill>
@@ -20287,6 +20378,13 @@
               </a:ext>
             </a:extLst>
           </p:spPr>
+          <p:txBody>
+            <a:bodyPr/>
+            <a:lstStyle/>
+            <a:p>
+              <a:endParaRPr lang="en-US"/>
+            </a:p>
+          </p:txBody>
         </p:sp>
         <p:sp>
           <p:nvSpPr>
@@ -20353,7 +20451,7 @@
             </a:ln>
             <a:extLst>
               <a:ext uri="{91240B29-F687-4f45-9708-019B960494DF}">
-                <a14:hiddenLine xmlns="" xmlns:a16="http://schemas.microsoft.com/office/drawing/2014/main" xmlns:a14="http://schemas.microsoft.com/office/drawing/2010/main" xmlns:p14="http://schemas.microsoft.com/office/powerpoint/2010/main" w="9525">
+                <a14:hiddenLine xmlns:p14="http://schemas.microsoft.com/office/powerpoint/2010/main" xmlns:a14="http://schemas.microsoft.com/office/drawing/2010/main" xmlns:a16="http://schemas.microsoft.com/office/drawing/2014/main" xmlns="" w="9525">
                   <a:solidFill>
                     <a:srgbClr val="000000"/>
                   </a:solidFill>
@@ -20364,6 +20462,13 @@
               </a:ext>
             </a:extLst>
           </p:spPr>
+          <p:txBody>
+            <a:bodyPr/>
+            <a:lstStyle/>
+            <a:p>
+              <a:endParaRPr lang="en-US"/>
+            </a:p>
+          </p:txBody>
         </p:sp>
         <p:sp>
           <p:nvSpPr>
@@ -20458,7 +20563,7 @@
             </a:ln>
             <a:extLst>
               <a:ext uri="{91240B29-F687-4f45-9708-019B960494DF}">
-                <a14:hiddenLine xmlns="" xmlns:a16="http://schemas.microsoft.com/office/drawing/2014/main" xmlns:a14="http://schemas.microsoft.com/office/drawing/2010/main" xmlns:p14="http://schemas.microsoft.com/office/powerpoint/2010/main" w="9525">
+                <a14:hiddenLine xmlns:p14="http://schemas.microsoft.com/office/powerpoint/2010/main" xmlns:a14="http://schemas.microsoft.com/office/drawing/2010/main" xmlns:a16="http://schemas.microsoft.com/office/drawing/2014/main" xmlns="" w="9525">
                   <a:solidFill>
                     <a:srgbClr val="000000"/>
                   </a:solidFill>
@@ -20469,6 +20574,13 @@
               </a:ext>
             </a:extLst>
           </p:spPr>
+          <p:txBody>
+            <a:bodyPr/>
+            <a:lstStyle/>
+            <a:p>
+              <a:endParaRPr lang="en-US"/>
+            </a:p>
+          </p:txBody>
         </p:sp>
         <p:sp>
           <p:nvSpPr>
@@ -20563,7 +20675,7 @@
             </a:ln>
             <a:extLst>
               <a:ext uri="{91240B29-F687-4f45-9708-019B960494DF}">
-                <a14:hiddenLine xmlns="" xmlns:a16="http://schemas.microsoft.com/office/drawing/2014/main" xmlns:a14="http://schemas.microsoft.com/office/drawing/2010/main" xmlns:p14="http://schemas.microsoft.com/office/powerpoint/2010/main" w="9525">
+                <a14:hiddenLine xmlns:p14="http://schemas.microsoft.com/office/powerpoint/2010/main" xmlns:a14="http://schemas.microsoft.com/office/drawing/2010/main" xmlns:a16="http://schemas.microsoft.com/office/drawing/2014/main" xmlns="" w="9525">
                   <a:solidFill>
                     <a:srgbClr val="000000"/>
                   </a:solidFill>
@@ -20574,6 +20686,13 @@
               </a:ext>
             </a:extLst>
           </p:spPr>
+          <p:txBody>
+            <a:bodyPr/>
+            <a:lstStyle/>
+            <a:p>
+              <a:endParaRPr lang="en-US"/>
+            </a:p>
+          </p:txBody>
         </p:sp>
         <p:sp>
           <p:nvSpPr>
@@ -20640,7 +20759,7 @@
             </a:ln>
             <a:extLst>
               <a:ext uri="{91240B29-F687-4f45-9708-019B960494DF}">
-                <a14:hiddenLine xmlns="" xmlns:a16="http://schemas.microsoft.com/office/drawing/2014/main" xmlns:a14="http://schemas.microsoft.com/office/drawing/2010/main" xmlns:p14="http://schemas.microsoft.com/office/powerpoint/2010/main" w="9525">
+                <a14:hiddenLine xmlns:p14="http://schemas.microsoft.com/office/powerpoint/2010/main" xmlns:a14="http://schemas.microsoft.com/office/drawing/2010/main" xmlns:a16="http://schemas.microsoft.com/office/drawing/2014/main" xmlns="" w="9525">
                   <a:solidFill>
                     <a:srgbClr val="000000"/>
                   </a:solidFill>
@@ -20651,6 +20770,13 @@
               </a:ext>
             </a:extLst>
           </p:spPr>
+          <p:txBody>
+            <a:bodyPr/>
+            <a:lstStyle/>
+            <a:p>
+              <a:endParaRPr lang="en-US"/>
+            </a:p>
+          </p:txBody>
         </p:sp>
         <p:sp>
           <p:nvSpPr>
@@ -20745,7 +20871,7 @@
             </a:ln>
             <a:extLst>
               <a:ext uri="{91240B29-F687-4f45-9708-019B960494DF}">
-                <a14:hiddenLine xmlns="" xmlns:a16="http://schemas.microsoft.com/office/drawing/2014/main" xmlns:a14="http://schemas.microsoft.com/office/drawing/2010/main" xmlns:p14="http://schemas.microsoft.com/office/powerpoint/2010/main" w="9525">
+                <a14:hiddenLine xmlns:p14="http://schemas.microsoft.com/office/powerpoint/2010/main" xmlns:a14="http://schemas.microsoft.com/office/drawing/2010/main" xmlns:a16="http://schemas.microsoft.com/office/drawing/2014/main" xmlns="" w="9525">
                   <a:solidFill>
                     <a:srgbClr val="000000"/>
                   </a:solidFill>
@@ -20756,6 +20882,13 @@
               </a:ext>
             </a:extLst>
           </p:spPr>
+          <p:txBody>
+            <a:bodyPr/>
+            <a:lstStyle/>
+            <a:p>
+              <a:endParaRPr lang="en-US"/>
+            </a:p>
+          </p:txBody>
         </p:sp>
         <p:sp>
           <p:nvSpPr>
@@ -20850,7 +20983,7 @@
             </a:ln>
             <a:extLst>
               <a:ext uri="{91240B29-F687-4f45-9708-019B960494DF}">
-                <a14:hiddenLine xmlns="" xmlns:a16="http://schemas.microsoft.com/office/drawing/2014/main" xmlns:a14="http://schemas.microsoft.com/office/drawing/2010/main" xmlns:p14="http://schemas.microsoft.com/office/powerpoint/2010/main" w="9525">
+                <a14:hiddenLine xmlns:p14="http://schemas.microsoft.com/office/powerpoint/2010/main" xmlns:a14="http://schemas.microsoft.com/office/drawing/2010/main" xmlns:a16="http://schemas.microsoft.com/office/drawing/2014/main" xmlns="" w="9525">
                   <a:solidFill>
                     <a:srgbClr val="000000"/>
                   </a:solidFill>
@@ -20861,6 +20994,13 @@
               </a:ext>
             </a:extLst>
           </p:spPr>
+          <p:txBody>
+            <a:bodyPr/>
+            <a:lstStyle/>
+            <a:p>
+              <a:endParaRPr lang="en-US"/>
+            </a:p>
+          </p:txBody>
         </p:sp>
         <p:sp>
           <p:nvSpPr>
@@ -20921,7 +21061,7 @@
             </a:ln>
             <a:extLst>
               <a:ext uri="{91240B29-F687-4f45-9708-019B960494DF}">
-                <a14:hiddenLine xmlns="" xmlns:a16="http://schemas.microsoft.com/office/drawing/2014/main" xmlns:a14="http://schemas.microsoft.com/office/drawing/2010/main" xmlns:p14="http://schemas.microsoft.com/office/powerpoint/2010/main" w="9525">
+                <a14:hiddenLine xmlns:p14="http://schemas.microsoft.com/office/powerpoint/2010/main" xmlns:a14="http://schemas.microsoft.com/office/drawing/2010/main" xmlns:a16="http://schemas.microsoft.com/office/drawing/2014/main" xmlns="" w="9525">
                   <a:solidFill>
                     <a:srgbClr val="000000"/>
                   </a:solidFill>
@@ -20932,6 +21072,13 @@
               </a:ext>
             </a:extLst>
           </p:spPr>
+          <p:txBody>
+            <a:bodyPr/>
+            <a:lstStyle/>
+            <a:p>
+              <a:endParaRPr lang="en-US"/>
+            </a:p>
+          </p:txBody>
         </p:sp>
         <p:sp>
           <p:nvSpPr>
@@ -21026,7 +21173,7 @@
             </a:ln>
             <a:extLst>
               <a:ext uri="{91240B29-F687-4f45-9708-019B960494DF}">
-                <a14:hiddenLine xmlns="" xmlns:a16="http://schemas.microsoft.com/office/drawing/2014/main" xmlns:a14="http://schemas.microsoft.com/office/drawing/2010/main" xmlns:p14="http://schemas.microsoft.com/office/powerpoint/2010/main" w="9525">
+                <a14:hiddenLine xmlns:p14="http://schemas.microsoft.com/office/powerpoint/2010/main" xmlns:a14="http://schemas.microsoft.com/office/drawing/2010/main" xmlns:a16="http://schemas.microsoft.com/office/drawing/2014/main" xmlns="" w="9525">
                   <a:solidFill>
                     <a:srgbClr val="000000"/>
                   </a:solidFill>
@@ -21037,6 +21184,13 @@
               </a:ext>
             </a:extLst>
           </p:spPr>
+          <p:txBody>
+            <a:bodyPr/>
+            <a:lstStyle/>
+            <a:p>
+              <a:endParaRPr lang="en-US"/>
+            </a:p>
+          </p:txBody>
         </p:sp>
         <p:sp>
           <p:nvSpPr>
@@ -21097,7 +21251,7 @@
             </a:ln>
             <a:extLst>
               <a:ext uri="{91240B29-F687-4f45-9708-019B960494DF}">
-                <a14:hiddenLine xmlns="" xmlns:a16="http://schemas.microsoft.com/office/drawing/2014/main" xmlns:a14="http://schemas.microsoft.com/office/drawing/2010/main" xmlns:p14="http://schemas.microsoft.com/office/powerpoint/2010/main" w="9525">
+                <a14:hiddenLine xmlns:p14="http://schemas.microsoft.com/office/powerpoint/2010/main" xmlns:a14="http://schemas.microsoft.com/office/drawing/2010/main" xmlns:a16="http://schemas.microsoft.com/office/drawing/2014/main" xmlns="" w="9525">
                   <a:solidFill>
                     <a:srgbClr val="000000"/>
                   </a:solidFill>
@@ -21108,6 +21262,13 @@
               </a:ext>
             </a:extLst>
           </p:spPr>
+          <p:txBody>
+            <a:bodyPr/>
+            <a:lstStyle/>
+            <a:p>
+              <a:endParaRPr lang="en-US"/>
+            </a:p>
+          </p:txBody>
         </p:sp>
         <p:sp>
           <p:nvSpPr>
@@ -21202,7 +21363,7 @@
             </a:ln>
             <a:extLst>
               <a:ext uri="{91240B29-F687-4f45-9708-019B960494DF}">
-                <a14:hiddenLine xmlns="" xmlns:a16="http://schemas.microsoft.com/office/drawing/2014/main" xmlns:a14="http://schemas.microsoft.com/office/drawing/2010/main" xmlns:p14="http://schemas.microsoft.com/office/powerpoint/2010/main" w="9525">
+                <a14:hiddenLine xmlns:p14="http://schemas.microsoft.com/office/powerpoint/2010/main" xmlns:a14="http://schemas.microsoft.com/office/drawing/2010/main" xmlns:a16="http://schemas.microsoft.com/office/drawing/2014/main" xmlns="" w="9525">
                   <a:solidFill>
                     <a:srgbClr val="000000"/>
                   </a:solidFill>
@@ -21213,6 +21374,13 @@
               </a:ext>
             </a:extLst>
           </p:spPr>
+          <p:txBody>
+            <a:bodyPr/>
+            <a:lstStyle/>
+            <a:p>
+              <a:endParaRPr lang="en-US"/>
+            </a:p>
+          </p:txBody>
         </p:sp>
         <p:sp>
           <p:nvSpPr>
@@ -21285,7 +21453,7 @@
             </a:ln>
             <a:extLst>
               <a:ext uri="{91240B29-F687-4f45-9708-019B960494DF}">
-                <a14:hiddenLine xmlns="" xmlns:a16="http://schemas.microsoft.com/office/drawing/2014/main" xmlns:a14="http://schemas.microsoft.com/office/drawing/2010/main" xmlns:p14="http://schemas.microsoft.com/office/powerpoint/2010/main" w="9525">
+                <a14:hiddenLine xmlns:p14="http://schemas.microsoft.com/office/powerpoint/2010/main" xmlns:a14="http://schemas.microsoft.com/office/drawing/2010/main" xmlns:a16="http://schemas.microsoft.com/office/drawing/2014/main" xmlns="" w="9525">
                   <a:solidFill>
                     <a:srgbClr val="000000"/>
                   </a:solidFill>
@@ -21296,6 +21464,13 @@
               </a:ext>
             </a:extLst>
           </p:spPr>
+          <p:txBody>
+            <a:bodyPr/>
+            <a:lstStyle/>
+            <a:p>
+              <a:endParaRPr lang="en-US"/>
+            </a:p>
+          </p:txBody>
         </p:sp>
         <p:sp>
           <p:nvSpPr>
@@ -21390,7 +21565,7 @@
             </a:ln>
             <a:extLst>
               <a:ext uri="{91240B29-F687-4f45-9708-019B960494DF}">
-                <a14:hiddenLine xmlns="" xmlns:a16="http://schemas.microsoft.com/office/drawing/2014/main" xmlns:a14="http://schemas.microsoft.com/office/drawing/2010/main" xmlns:p14="http://schemas.microsoft.com/office/powerpoint/2010/main" w="9525">
+                <a14:hiddenLine xmlns:p14="http://schemas.microsoft.com/office/powerpoint/2010/main" xmlns:a14="http://schemas.microsoft.com/office/drawing/2010/main" xmlns:a16="http://schemas.microsoft.com/office/drawing/2014/main" xmlns="" w="9525">
                   <a:solidFill>
                     <a:srgbClr val="000000"/>
                   </a:solidFill>
@@ -21401,6 +21576,13 @@
               </a:ext>
             </a:extLst>
           </p:spPr>
+          <p:txBody>
+            <a:bodyPr/>
+            <a:lstStyle/>
+            <a:p>
+              <a:endParaRPr lang="en-US"/>
+            </a:p>
+          </p:txBody>
         </p:sp>
         <p:sp>
           <p:nvSpPr>
@@ -21473,7 +21655,7 @@
             </a:ln>
             <a:extLst>
               <a:ext uri="{91240B29-F687-4f45-9708-019B960494DF}">
-                <a14:hiddenLine xmlns="" xmlns:a16="http://schemas.microsoft.com/office/drawing/2014/main" xmlns:a14="http://schemas.microsoft.com/office/drawing/2010/main" xmlns:p14="http://schemas.microsoft.com/office/powerpoint/2010/main" w="9525">
+                <a14:hiddenLine xmlns:p14="http://schemas.microsoft.com/office/powerpoint/2010/main" xmlns:a14="http://schemas.microsoft.com/office/drawing/2010/main" xmlns:a16="http://schemas.microsoft.com/office/drawing/2014/main" xmlns="" w="9525">
                   <a:solidFill>
                     <a:srgbClr val="000000"/>
                   </a:solidFill>
@@ -21484,6 +21666,13 @@
               </a:ext>
             </a:extLst>
           </p:spPr>
+          <p:txBody>
+            <a:bodyPr/>
+            <a:lstStyle/>
+            <a:p>
+              <a:endParaRPr lang="en-US"/>
+            </a:p>
+          </p:txBody>
         </p:sp>
         <p:sp>
           <p:nvSpPr>
@@ -21578,7 +21767,7 @@
             </a:ln>
             <a:extLst>
               <a:ext uri="{91240B29-F687-4f45-9708-019B960494DF}">
-                <a14:hiddenLine xmlns="" xmlns:a16="http://schemas.microsoft.com/office/drawing/2014/main" xmlns:a14="http://schemas.microsoft.com/office/drawing/2010/main" xmlns:p14="http://schemas.microsoft.com/office/powerpoint/2010/main" w="9525">
+                <a14:hiddenLine xmlns:p14="http://schemas.microsoft.com/office/powerpoint/2010/main" xmlns:a14="http://schemas.microsoft.com/office/drawing/2010/main" xmlns:a16="http://schemas.microsoft.com/office/drawing/2014/main" xmlns="" w="9525">
                   <a:solidFill>
                     <a:srgbClr val="000000"/>
                   </a:solidFill>
@@ -21589,6 +21778,13 @@
               </a:ext>
             </a:extLst>
           </p:spPr>
+          <p:txBody>
+            <a:bodyPr/>
+            <a:lstStyle/>
+            <a:p>
+              <a:endParaRPr lang="en-US"/>
+            </a:p>
+          </p:txBody>
         </p:sp>
         <p:sp>
           <p:nvSpPr>
@@ -21627,7 +21823,7 @@
             </a:ln>
             <a:extLst>
               <a:ext uri="{91240B29-F687-4f45-9708-019B960494DF}">
-                <a14:hiddenLine xmlns="" xmlns:a16="http://schemas.microsoft.com/office/drawing/2014/main" xmlns:a14="http://schemas.microsoft.com/office/drawing/2010/main" xmlns:p14="http://schemas.microsoft.com/office/powerpoint/2010/main" w="9525">
+                <a14:hiddenLine xmlns:p14="http://schemas.microsoft.com/office/powerpoint/2010/main" xmlns:a14="http://schemas.microsoft.com/office/drawing/2010/main" xmlns:a16="http://schemas.microsoft.com/office/drawing/2014/main" xmlns="" w="9525">
                   <a:solidFill>
                     <a:srgbClr val="000000"/>
                   </a:solidFill>
@@ -21638,6 +21834,13 @@
               </a:ext>
             </a:extLst>
           </p:spPr>
+          <p:txBody>
+            <a:bodyPr/>
+            <a:lstStyle/>
+            <a:p>
+              <a:endParaRPr lang="en-US"/>
+            </a:p>
+          </p:txBody>
         </p:sp>
         <p:sp>
           <p:nvSpPr>
@@ -21732,7 +21935,7 @@
             </a:ln>
             <a:extLst>
               <a:ext uri="{91240B29-F687-4f45-9708-019B960494DF}">
-                <a14:hiddenLine xmlns="" xmlns:a16="http://schemas.microsoft.com/office/drawing/2014/main" xmlns:a14="http://schemas.microsoft.com/office/drawing/2010/main" xmlns:p14="http://schemas.microsoft.com/office/powerpoint/2010/main" w="9525">
+                <a14:hiddenLine xmlns:p14="http://schemas.microsoft.com/office/powerpoint/2010/main" xmlns:a14="http://schemas.microsoft.com/office/drawing/2010/main" xmlns:a16="http://schemas.microsoft.com/office/drawing/2014/main" xmlns="" w="9525">
                   <a:solidFill>
                     <a:srgbClr val="000000"/>
                   </a:solidFill>
@@ -21743,6 +21946,13 @@
               </a:ext>
             </a:extLst>
           </p:spPr>
+          <p:txBody>
+            <a:bodyPr/>
+            <a:lstStyle/>
+            <a:p>
+              <a:endParaRPr lang="en-US"/>
+            </a:p>
+          </p:txBody>
         </p:sp>
         <p:sp>
           <p:nvSpPr>
@@ -21809,7 +22019,7 @@
             </a:ln>
             <a:extLst>
               <a:ext uri="{91240B29-F687-4f45-9708-019B960494DF}">
-                <a14:hiddenLine xmlns="" xmlns:a16="http://schemas.microsoft.com/office/drawing/2014/main" xmlns:a14="http://schemas.microsoft.com/office/drawing/2010/main" xmlns:p14="http://schemas.microsoft.com/office/powerpoint/2010/main" w="9525">
+                <a14:hiddenLine xmlns:p14="http://schemas.microsoft.com/office/powerpoint/2010/main" xmlns:a14="http://schemas.microsoft.com/office/drawing/2010/main" xmlns:a16="http://schemas.microsoft.com/office/drawing/2014/main" xmlns="" w="9525">
                   <a:solidFill>
                     <a:srgbClr val="000000"/>
                   </a:solidFill>
@@ -21820,6 +22030,13 @@
               </a:ext>
             </a:extLst>
           </p:spPr>
+          <p:txBody>
+            <a:bodyPr/>
+            <a:lstStyle/>
+            <a:p>
+              <a:endParaRPr lang="en-US"/>
+            </a:p>
+          </p:txBody>
         </p:sp>
         <p:sp>
           <p:nvSpPr>
@@ -21886,7 +22103,7 @@
             </a:ln>
             <a:extLst>
               <a:ext uri="{91240B29-F687-4f45-9708-019B960494DF}">
-                <a14:hiddenLine xmlns="" xmlns:a16="http://schemas.microsoft.com/office/drawing/2014/main" xmlns:a14="http://schemas.microsoft.com/office/drawing/2010/main" xmlns:p14="http://schemas.microsoft.com/office/powerpoint/2010/main" w="9525">
+                <a14:hiddenLine xmlns:p14="http://schemas.microsoft.com/office/powerpoint/2010/main" xmlns:a14="http://schemas.microsoft.com/office/drawing/2010/main" xmlns:a16="http://schemas.microsoft.com/office/drawing/2014/main" xmlns="" w="9525">
                   <a:solidFill>
                     <a:srgbClr val="000000"/>
                   </a:solidFill>
@@ -21897,6 +22114,13 @@
               </a:ext>
             </a:extLst>
           </p:spPr>
+          <p:txBody>
+            <a:bodyPr/>
+            <a:lstStyle/>
+            <a:p>
+              <a:endParaRPr lang="en-US"/>
+            </a:p>
+          </p:txBody>
         </p:sp>
         <p:sp>
           <p:nvSpPr>
@@ -21991,7 +22215,7 @@
             </a:ln>
             <a:extLst>
               <a:ext uri="{91240B29-F687-4f45-9708-019B960494DF}">
-                <a14:hiddenLine xmlns="" xmlns:a16="http://schemas.microsoft.com/office/drawing/2014/main" xmlns:a14="http://schemas.microsoft.com/office/drawing/2010/main" xmlns:p14="http://schemas.microsoft.com/office/powerpoint/2010/main" w="9525">
+                <a14:hiddenLine xmlns:p14="http://schemas.microsoft.com/office/powerpoint/2010/main" xmlns:a14="http://schemas.microsoft.com/office/drawing/2010/main" xmlns:a16="http://schemas.microsoft.com/office/drawing/2014/main" xmlns="" w="9525">
                   <a:solidFill>
                     <a:srgbClr val="000000"/>
                   </a:solidFill>
@@ -22002,6 +22226,13 @@
               </a:ext>
             </a:extLst>
           </p:spPr>
+          <p:txBody>
+            <a:bodyPr/>
+            <a:lstStyle/>
+            <a:p>
+              <a:endParaRPr lang="en-US"/>
+            </a:p>
+          </p:txBody>
         </p:sp>
         <p:sp>
           <p:nvSpPr>
@@ -22074,7 +22305,7 @@
             </a:ln>
             <a:extLst>
               <a:ext uri="{91240B29-F687-4f45-9708-019B960494DF}">
-                <a14:hiddenLine xmlns="" xmlns:a16="http://schemas.microsoft.com/office/drawing/2014/main" xmlns:a14="http://schemas.microsoft.com/office/drawing/2010/main" xmlns:p14="http://schemas.microsoft.com/office/powerpoint/2010/main" w="9525">
+                <a14:hiddenLine xmlns:p14="http://schemas.microsoft.com/office/powerpoint/2010/main" xmlns:a14="http://schemas.microsoft.com/office/drawing/2010/main" xmlns:a16="http://schemas.microsoft.com/office/drawing/2014/main" xmlns="" w="9525">
                   <a:solidFill>
                     <a:srgbClr val="000000"/>
                   </a:solidFill>
@@ -22085,6 +22316,13 @@
               </a:ext>
             </a:extLst>
           </p:spPr>
+          <p:txBody>
+            <a:bodyPr/>
+            <a:lstStyle/>
+            <a:p>
+              <a:endParaRPr lang="en-US"/>
+            </a:p>
+          </p:txBody>
         </p:sp>
         <p:sp>
           <p:nvSpPr>
@@ -22151,7 +22389,7 @@
             </a:ln>
             <a:extLst>
               <a:ext uri="{91240B29-F687-4f45-9708-019B960494DF}">
-                <a14:hiddenLine xmlns="" xmlns:a16="http://schemas.microsoft.com/office/drawing/2014/main" xmlns:a14="http://schemas.microsoft.com/office/drawing/2010/main" xmlns:p14="http://schemas.microsoft.com/office/powerpoint/2010/main" w="9525">
+                <a14:hiddenLine xmlns:p14="http://schemas.microsoft.com/office/powerpoint/2010/main" xmlns:a14="http://schemas.microsoft.com/office/drawing/2010/main" xmlns:a16="http://schemas.microsoft.com/office/drawing/2014/main" xmlns="" w="9525">
                   <a:solidFill>
                     <a:srgbClr val="000000"/>
                   </a:solidFill>
@@ -22162,6 +22400,13 @@
               </a:ext>
             </a:extLst>
           </p:spPr>
+          <p:txBody>
+            <a:bodyPr/>
+            <a:lstStyle/>
+            <a:p>
+              <a:endParaRPr lang="en-US"/>
+            </a:p>
+          </p:txBody>
         </p:sp>
         <p:sp>
           <p:nvSpPr>
@@ -22256,7 +22501,7 @@
             </a:ln>
             <a:extLst>
               <a:ext uri="{91240B29-F687-4f45-9708-019B960494DF}">
-                <a14:hiddenLine xmlns="" xmlns:a16="http://schemas.microsoft.com/office/drawing/2014/main" xmlns:a14="http://schemas.microsoft.com/office/drawing/2010/main" xmlns:p14="http://schemas.microsoft.com/office/powerpoint/2010/main" w="9525">
+                <a14:hiddenLine xmlns:p14="http://schemas.microsoft.com/office/powerpoint/2010/main" xmlns:a14="http://schemas.microsoft.com/office/drawing/2010/main" xmlns:a16="http://schemas.microsoft.com/office/drawing/2014/main" xmlns="" w="9525">
                   <a:solidFill>
                     <a:srgbClr val="000000"/>
                   </a:solidFill>
@@ -22267,6 +22512,13 @@
               </a:ext>
             </a:extLst>
           </p:spPr>
+          <p:txBody>
+            <a:bodyPr/>
+            <a:lstStyle/>
+            <a:p>
+              <a:endParaRPr lang="en-US"/>
+            </a:p>
+          </p:txBody>
         </p:sp>
         <p:sp>
           <p:nvSpPr>
@@ -22333,7 +22585,7 @@
             </a:ln>
             <a:extLst>
               <a:ext uri="{91240B29-F687-4f45-9708-019B960494DF}">
-                <a14:hiddenLine xmlns="" xmlns:a16="http://schemas.microsoft.com/office/drawing/2014/main" xmlns:a14="http://schemas.microsoft.com/office/drawing/2010/main" xmlns:p14="http://schemas.microsoft.com/office/powerpoint/2010/main" w="9525">
+                <a14:hiddenLine xmlns:p14="http://schemas.microsoft.com/office/powerpoint/2010/main" xmlns:a14="http://schemas.microsoft.com/office/drawing/2010/main" xmlns:a16="http://schemas.microsoft.com/office/drawing/2014/main" xmlns="" w="9525">
                   <a:solidFill>
                     <a:srgbClr val="000000"/>
                   </a:solidFill>
@@ -22344,6 +22596,13 @@
               </a:ext>
             </a:extLst>
           </p:spPr>
+          <p:txBody>
+            <a:bodyPr/>
+            <a:lstStyle/>
+            <a:p>
+              <a:endParaRPr lang="en-US"/>
+            </a:p>
+          </p:txBody>
         </p:sp>
         <p:sp>
           <p:nvSpPr>
@@ -22438,7 +22697,7 @@
             </a:ln>
             <a:extLst>
               <a:ext uri="{91240B29-F687-4f45-9708-019B960494DF}">
-                <a14:hiddenLine xmlns="" xmlns:a16="http://schemas.microsoft.com/office/drawing/2014/main" xmlns:a14="http://schemas.microsoft.com/office/drawing/2010/main" xmlns:p14="http://schemas.microsoft.com/office/powerpoint/2010/main" w="9525">
+                <a14:hiddenLine xmlns:p14="http://schemas.microsoft.com/office/powerpoint/2010/main" xmlns:a14="http://schemas.microsoft.com/office/drawing/2010/main" xmlns:a16="http://schemas.microsoft.com/office/drawing/2014/main" xmlns="" w="9525">
                   <a:solidFill>
                     <a:srgbClr val="000000"/>
                   </a:solidFill>
@@ -22449,6 +22708,13 @@
               </a:ext>
             </a:extLst>
           </p:spPr>
+          <p:txBody>
+            <a:bodyPr/>
+            <a:lstStyle/>
+            <a:p>
+              <a:endParaRPr lang="en-US"/>
+            </a:p>
+          </p:txBody>
         </p:sp>
         <p:sp>
           <p:nvSpPr>
@@ -22515,7 +22781,7 @@
             </a:ln>
             <a:extLst>
               <a:ext uri="{91240B29-F687-4f45-9708-019B960494DF}">
-                <a14:hiddenLine xmlns="" xmlns:a16="http://schemas.microsoft.com/office/drawing/2014/main" xmlns:a14="http://schemas.microsoft.com/office/drawing/2010/main" xmlns:p14="http://schemas.microsoft.com/office/powerpoint/2010/main" w="9525">
+                <a14:hiddenLine xmlns:p14="http://schemas.microsoft.com/office/powerpoint/2010/main" xmlns:a14="http://schemas.microsoft.com/office/drawing/2010/main" xmlns:a16="http://schemas.microsoft.com/office/drawing/2014/main" xmlns="" w="9525">
                   <a:solidFill>
                     <a:srgbClr val="000000"/>
                   </a:solidFill>
@@ -22526,6 +22792,13 @@
               </a:ext>
             </a:extLst>
           </p:spPr>
+          <p:txBody>
+            <a:bodyPr/>
+            <a:lstStyle/>
+            <a:p>
+              <a:endParaRPr lang="en-US"/>
+            </a:p>
+          </p:txBody>
         </p:sp>
         <p:sp>
           <p:nvSpPr>
@@ -22620,7 +22893,7 @@
             </a:ln>
             <a:extLst>
               <a:ext uri="{91240B29-F687-4f45-9708-019B960494DF}">
-                <a14:hiddenLine xmlns="" xmlns:a16="http://schemas.microsoft.com/office/drawing/2014/main" xmlns:a14="http://schemas.microsoft.com/office/drawing/2010/main" xmlns:p14="http://schemas.microsoft.com/office/powerpoint/2010/main" w="9525">
+                <a14:hiddenLine xmlns:p14="http://schemas.microsoft.com/office/powerpoint/2010/main" xmlns:a14="http://schemas.microsoft.com/office/drawing/2010/main" xmlns:a16="http://schemas.microsoft.com/office/drawing/2014/main" xmlns="" w="9525">
                   <a:solidFill>
                     <a:srgbClr val="000000"/>
                   </a:solidFill>
@@ -22631,6 +22904,13 @@
               </a:ext>
             </a:extLst>
           </p:spPr>
+          <p:txBody>
+            <a:bodyPr/>
+            <a:lstStyle/>
+            <a:p>
+              <a:endParaRPr lang="en-US"/>
+            </a:p>
+          </p:txBody>
         </p:sp>
         <p:sp>
           <p:nvSpPr>
@@ -22669,7 +22949,7 @@
             </a:ln>
             <a:extLst>
               <a:ext uri="{91240B29-F687-4f45-9708-019B960494DF}">
-                <a14:hiddenLine xmlns="" xmlns:a16="http://schemas.microsoft.com/office/drawing/2014/main" xmlns:a14="http://schemas.microsoft.com/office/drawing/2010/main" xmlns:p14="http://schemas.microsoft.com/office/powerpoint/2010/main" w="9525">
+                <a14:hiddenLine xmlns:p14="http://schemas.microsoft.com/office/powerpoint/2010/main" xmlns:a14="http://schemas.microsoft.com/office/drawing/2010/main" xmlns:a16="http://schemas.microsoft.com/office/drawing/2014/main" xmlns="" w="9525">
                   <a:solidFill>
                     <a:srgbClr val="000000"/>
                   </a:solidFill>
@@ -22680,6 +22960,13 @@
               </a:ext>
             </a:extLst>
           </p:spPr>
+          <p:txBody>
+            <a:bodyPr/>
+            <a:lstStyle/>
+            <a:p>
+              <a:endParaRPr lang="en-US"/>
+            </a:p>
+          </p:txBody>
         </p:sp>
         <p:sp>
           <p:nvSpPr>
@@ -22749,7 +23036,7 @@
             </a:ln>
             <a:extLst>
               <a:ext uri="{91240B29-F687-4f45-9708-019B960494DF}">
-                <a14:hiddenLine xmlns="" xmlns:a16="http://schemas.microsoft.com/office/drawing/2014/main" xmlns:a14="http://schemas.microsoft.com/office/drawing/2010/main" xmlns:p14="http://schemas.microsoft.com/office/powerpoint/2010/main" w="9525">
+                <a14:hiddenLine xmlns:p14="http://schemas.microsoft.com/office/powerpoint/2010/main" xmlns:a14="http://schemas.microsoft.com/office/drawing/2010/main" xmlns:a16="http://schemas.microsoft.com/office/drawing/2014/main" xmlns="" w="9525">
                   <a:solidFill>
                     <a:srgbClr val="000000"/>
                   </a:solidFill>
@@ -22760,6 +23047,13 @@
               </a:ext>
             </a:extLst>
           </p:spPr>
+          <p:txBody>
+            <a:bodyPr/>
+            <a:lstStyle/>
+            <a:p>
+              <a:endParaRPr lang="en-US"/>
+            </a:p>
+          </p:txBody>
         </p:sp>
         <p:sp>
           <p:nvSpPr>
@@ -22854,7 +23148,7 @@
             </a:ln>
             <a:extLst>
               <a:ext uri="{91240B29-F687-4f45-9708-019B960494DF}">
-                <a14:hiddenLine xmlns="" xmlns:a16="http://schemas.microsoft.com/office/drawing/2014/main" xmlns:a14="http://schemas.microsoft.com/office/drawing/2010/main" xmlns:p14="http://schemas.microsoft.com/office/powerpoint/2010/main" w="9525">
+                <a14:hiddenLine xmlns:p14="http://schemas.microsoft.com/office/powerpoint/2010/main" xmlns:a14="http://schemas.microsoft.com/office/drawing/2010/main" xmlns:a16="http://schemas.microsoft.com/office/drawing/2014/main" xmlns="" w="9525">
                   <a:solidFill>
                     <a:srgbClr val="000000"/>
                   </a:solidFill>
@@ -22865,6 +23159,13 @@
               </a:ext>
             </a:extLst>
           </p:spPr>
+          <p:txBody>
+            <a:bodyPr/>
+            <a:lstStyle/>
+            <a:p>
+              <a:endParaRPr lang="en-US"/>
+            </a:p>
+          </p:txBody>
         </p:sp>
         <p:sp>
           <p:nvSpPr>
@@ -22931,7 +23232,7 @@
             </a:ln>
             <a:extLst>
               <a:ext uri="{91240B29-F687-4f45-9708-019B960494DF}">
-                <a14:hiddenLine xmlns="" xmlns:a16="http://schemas.microsoft.com/office/drawing/2014/main" xmlns:a14="http://schemas.microsoft.com/office/drawing/2010/main" xmlns:p14="http://schemas.microsoft.com/office/powerpoint/2010/main" w="9525">
+                <a14:hiddenLine xmlns:p14="http://schemas.microsoft.com/office/powerpoint/2010/main" xmlns:a14="http://schemas.microsoft.com/office/drawing/2010/main" xmlns:a16="http://schemas.microsoft.com/office/drawing/2014/main" xmlns="" w="9525">
                   <a:solidFill>
                     <a:srgbClr val="000000"/>
                   </a:solidFill>
@@ -22942,6 +23243,13 @@
               </a:ext>
             </a:extLst>
           </p:spPr>
+          <p:txBody>
+            <a:bodyPr/>
+            <a:lstStyle/>
+            <a:p>
+              <a:endParaRPr lang="en-US"/>
+            </a:p>
+          </p:txBody>
         </p:sp>
         <p:sp>
           <p:nvSpPr>
@@ -23036,7 +23344,7 @@
             </a:ln>
             <a:extLst>
               <a:ext uri="{91240B29-F687-4f45-9708-019B960494DF}">
-                <a14:hiddenLine xmlns="" xmlns:a16="http://schemas.microsoft.com/office/drawing/2014/main" xmlns:a14="http://schemas.microsoft.com/office/drawing/2010/main" xmlns:p14="http://schemas.microsoft.com/office/powerpoint/2010/main" w="9525">
+                <a14:hiddenLine xmlns:p14="http://schemas.microsoft.com/office/powerpoint/2010/main" xmlns:a14="http://schemas.microsoft.com/office/drawing/2010/main" xmlns:a16="http://schemas.microsoft.com/office/drawing/2014/main" xmlns="" w="9525">
                   <a:solidFill>
                     <a:srgbClr val="000000"/>
                   </a:solidFill>
@@ -23047,6 +23355,13 @@
               </a:ext>
             </a:extLst>
           </p:spPr>
+          <p:txBody>
+            <a:bodyPr/>
+            <a:lstStyle/>
+            <a:p>
+              <a:endParaRPr lang="en-US"/>
+            </a:p>
+          </p:txBody>
         </p:sp>
         <p:sp>
           <p:nvSpPr>
@@ -23141,7 +23456,7 @@
             </a:ln>
             <a:extLst>
               <a:ext uri="{91240B29-F687-4f45-9708-019B960494DF}">
-                <a14:hiddenLine xmlns="" xmlns:a16="http://schemas.microsoft.com/office/drawing/2014/main" xmlns:a14="http://schemas.microsoft.com/office/drawing/2010/main" xmlns:p14="http://schemas.microsoft.com/office/powerpoint/2010/main" w="9525">
+                <a14:hiddenLine xmlns:p14="http://schemas.microsoft.com/office/powerpoint/2010/main" xmlns:a14="http://schemas.microsoft.com/office/drawing/2010/main" xmlns:a16="http://schemas.microsoft.com/office/drawing/2014/main" xmlns="" w="9525">
                   <a:solidFill>
                     <a:srgbClr val="000000"/>
                   </a:solidFill>
@@ -23152,6 +23467,13 @@
               </a:ext>
             </a:extLst>
           </p:spPr>
+          <p:txBody>
+            <a:bodyPr/>
+            <a:lstStyle/>
+            <a:p>
+              <a:endParaRPr lang="en-US"/>
+            </a:p>
+          </p:txBody>
         </p:sp>
         <p:sp>
           <p:nvSpPr>
@@ -23221,7 +23543,7 @@
             </a:ln>
             <a:extLst>
               <a:ext uri="{91240B29-F687-4f45-9708-019B960494DF}">
-                <a14:hiddenLine xmlns="" xmlns:a16="http://schemas.microsoft.com/office/drawing/2014/main" xmlns:a14="http://schemas.microsoft.com/office/drawing/2010/main" xmlns:p14="http://schemas.microsoft.com/office/powerpoint/2010/main" w="9525">
+                <a14:hiddenLine xmlns:p14="http://schemas.microsoft.com/office/powerpoint/2010/main" xmlns:a14="http://schemas.microsoft.com/office/drawing/2010/main" xmlns:a16="http://schemas.microsoft.com/office/drawing/2014/main" xmlns="" w="9525">
                   <a:solidFill>
                     <a:srgbClr val="000000"/>
                   </a:solidFill>
@@ -23232,6 +23554,13 @@
               </a:ext>
             </a:extLst>
           </p:spPr>
+          <p:txBody>
+            <a:bodyPr/>
+            <a:lstStyle/>
+            <a:p>
+              <a:endParaRPr lang="en-US"/>
+            </a:p>
+          </p:txBody>
         </p:sp>
         <p:sp>
           <p:nvSpPr>
@@ -23298,7 +23627,7 @@
             </a:ln>
             <a:extLst>
               <a:ext uri="{91240B29-F687-4f45-9708-019B960494DF}">
-                <a14:hiddenLine xmlns="" xmlns:a16="http://schemas.microsoft.com/office/drawing/2014/main" xmlns:a14="http://schemas.microsoft.com/office/drawing/2010/main" xmlns:p14="http://schemas.microsoft.com/office/powerpoint/2010/main" w="9525">
+                <a14:hiddenLine xmlns:p14="http://schemas.microsoft.com/office/powerpoint/2010/main" xmlns:a14="http://schemas.microsoft.com/office/drawing/2010/main" xmlns:a16="http://schemas.microsoft.com/office/drawing/2014/main" xmlns="" w="9525">
                   <a:solidFill>
                     <a:srgbClr val="000000"/>
                   </a:solidFill>
@@ -23309,6 +23638,13 @@
               </a:ext>
             </a:extLst>
           </p:spPr>
+          <p:txBody>
+            <a:bodyPr/>
+            <a:lstStyle/>
+            <a:p>
+              <a:endParaRPr lang="en-US"/>
+            </a:p>
+          </p:txBody>
         </p:sp>
         <p:sp>
           <p:nvSpPr>
@@ -23403,7 +23739,7 @@
             </a:ln>
             <a:extLst>
               <a:ext uri="{91240B29-F687-4f45-9708-019B960494DF}">
-                <a14:hiddenLine xmlns="" xmlns:a16="http://schemas.microsoft.com/office/drawing/2014/main" xmlns:a14="http://schemas.microsoft.com/office/drawing/2010/main" xmlns:p14="http://schemas.microsoft.com/office/powerpoint/2010/main" w="9525">
+                <a14:hiddenLine xmlns:p14="http://schemas.microsoft.com/office/powerpoint/2010/main" xmlns:a14="http://schemas.microsoft.com/office/drawing/2010/main" xmlns:a16="http://schemas.microsoft.com/office/drawing/2014/main" xmlns="" w="9525">
                   <a:solidFill>
                     <a:srgbClr val="000000"/>
                   </a:solidFill>
@@ -23414,6 +23750,13 @@
               </a:ext>
             </a:extLst>
           </p:spPr>
+          <p:txBody>
+            <a:bodyPr/>
+            <a:lstStyle/>
+            <a:p>
+              <a:endParaRPr lang="en-US"/>
+            </a:p>
+          </p:txBody>
         </p:sp>
         <p:sp>
           <p:nvSpPr>
@@ -23508,7 +23851,7 @@
             </a:ln>
             <a:extLst>
               <a:ext uri="{91240B29-F687-4f45-9708-019B960494DF}">
-                <a14:hiddenLine xmlns="" xmlns:a16="http://schemas.microsoft.com/office/drawing/2014/main" xmlns:a14="http://schemas.microsoft.com/office/drawing/2010/main" xmlns:p14="http://schemas.microsoft.com/office/powerpoint/2010/main" w="9525">
+                <a14:hiddenLine xmlns:p14="http://schemas.microsoft.com/office/powerpoint/2010/main" xmlns:a14="http://schemas.microsoft.com/office/drawing/2010/main" xmlns:a16="http://schemas.microsoft.com/office/drawing/2014/main" xmlns="" w="9525">
                   <a:solidFill>
                     <a:srgbClr val="000000"/>
                   </a:solidFill>
@@ -23519,6 +23862,13 @@
               </a:ext>
             </a:extLst>
           </p:spPr>
+          <p:txBody>
+            <a:bodyPr/>
+            <a:lstStyle/>
+            <a:p>
+              <a:endParaRPr lang="en-US"/>
+            </a:p>
+          </p:txBody>
         </p:sp>
         <p:sp>
           <p:nvSpPr>
@@ -23585,7 +23935,7 @@
             </a:ln>
             <a:extLst>
               <a:ext uri="{91240B29-F687-4f45-9708-019B960494DF}">
-                <a14:hiddenLine xmlns="" xmlns:a16="http://schemas.microsoft.com/office/drawing/2014/main" xmlns:a14="http://schemas.microsoft.com/office/drawing/2010/main" xmlns:p14="http://schemas.microsoft.com/office/powerpoint/2010/main" w="9525">
+                <a14:hiddenLine xmlns:p14="http://schemas.microsoft.com/office/powerpoint/2010/main" xmlns:a14="http://schemas.microsoft.com/office/drawing/2010/main" xmlns:a16="http://schemas.microsoft.com/office/drawing/2014/main" xmlns="" w="9525">
                   <a:solidFill>
                     <a:srgbClr val="000000"/>
                   </a:solidFill>
@@ -23596,6 +23946,13 @@
               </a:ext>
             </a:extLst>
           </p:spPr>
+          <p:txBody>
+            <a:bodyPr/>
+            <a:lstStyle/>
+            <a:p>
+              <a:endParaRPr lang="en-US"/>
+            </a:p>
+          </p:txBody>
         </p:sp>
         <p:sp>
           <p:nvSpPr>
@@ -23720,7 +24077,7 @@
             </a:ln>
             <a:extLst>
               <a:ext uri="{91240B29-F687-4f45-9708-019B960494DF}">
-                <a14:hiddenLine xmlns="" xmlns:a16="http://schemas.microsoft.com/office/drawing/2014/main" xmlns:a14="http://schemas.microsoft.com/office/drawing/2010/main" xmlns:p14="http://schemas.microsoft.com/office/powerpoint/2010/main" w="9525">
+                <a14:hiddenLine xmlns:p14="http://schemas.microsoft.com/office/powerpoint/2010/main" xmlns:a14="http://schemas.microsoft.com/office/drawing/2010/main" xmlns:a16="http://schemas.microsoft.com/office/drawing/2014/main" xmlns="" w="9525">
                   <a:solidFill>
                     <a:srgbClr val="000000"/>
                   </a:solidFill>
@@ -23731,6 +24088,13 @@
               </a:ext>
             </a:extLst>
           </p:spPr>
+          <p:txBody>
+            <a:bodyPr/>
+            <a:lstStyle/>
+            <a:p>
+              <a:endParaRPr lang="en-US"/>
+            </a:p>
+          </p:txBody>
         </p:sp>
         <p:sp>
           <p:nvSpPr>
@@ -23803,7 +24167,7 @@
             </a:ln>
             <a:extLst>
               <a:ext uri="{91240B29-F687-4f45-9708-019B960494DF}">
-                <a14:hiddenLine xmlns="" xmlns:a16="http://schemas.microsoft.com/office/drawing/2014/main" xmlns:a14="http://schemas.microsoft.com/office/drawing/2010/main" xmlns:p14="http://schemas.microsoft.com/office/powerpoint/2010/main" w="9525">
+                <a14:hiddenLine xmlns:p14="http://schemas.microsoft.com/office/powerpoint/2010/main" xmlns:a14="http://schemas.microsoft.com/office/drawing/2010/main" xmlns:a16="http://schemas.microsoft.com/office/drawing/2014/main" xmlns="" w="9525">
                   <a:solidFill>
                     <a:srgbClr val="000000"/>
                   </a:solidFill>
@@ -23814,6 +24178,13 @@
               </a:ext>
             </a:extLst>
           </p:spPr>
+          <p:txBody>
+            <a:bodyPr/>
+            <a:lstStyle/>
+            <a:p>
+              <a:endParaRPr lang="en-US"/>
+            </a:p>
+          </p:txBody>
         </p:sp>
         <p:sp>
           <p:nvSpPr>
@@ -23908,7 +24279,7 @@
             </a:ln>
             <a:extLst>
               <a:ext uri="{91240B29-F687-4f45-9708-019B960494DF}">
-                <a14:hiddenLine xmlns="" xmlns:a16="http://schemas.microsoft.com/office/drawing/2014/main" xmlns:a14="http://schemas.microsoft.com/office/drawing/2010/main" xmlns:p14="http://schemas.microsoft.com/office/powerpoint/2010/main" w="9525">
+                <a14:hiddenLine xmlns:p14="http://schemas.microsoft.com/office/powerpoint/2010/main" xmlns:a14="http://schemas.microsoft.com/office/drawing/2010/main" xmlns:a16="http://schemas.microsoft.com/office/drawing/2014/main" xmlns="" w="9525">
                   <a:solidFill>
                     <a:srgbClr val="000000"/>
                   </a:solidFill>
@@ -23919,6 +24290,13 @@
               </a:ext>
             </a:extLst>
           </p:spPr>
+          <p:txBody>
+            <a:bodyPr/>
+            <a:lstStyle/>
+            <a:p>
+              <a:endParaRPr lang="en-US"/>
+            </a:p>
+          </p:txBody>
         </p:sp>
       </p:grpSp>
       <p:grpSp>
@@ -24065,7 +24443,7 @@
             <a:noFill/>
             <a:extLst>
               <a:ext uri="{909E8E84-426E-40dd-AFC4-6F175D3DCCD1}">
-                <a14:hiddenFill xmlns="" xmlns:a16="http://schemas.microsoft.com/office/drawing/2014/main" xmlns:a14="http://schemas.microsoft.com/office/drawing/2010/main" xmlns:p14="http://schemas.microsoft.com/office/powerpoint/2010/main">
+                <a14:hiddenFill xmlns:p14="http://schemas.microsoft.com/office/powerpoint/2010/main" xmlns:a14="http://schemas.microsoft.com/office/drawing/2010/main" xmlns:a16="http://schemas.microsoft.com/office/drawing/2014/main" xmlns="">
                   <a:solidFill>
                     <a:srgbClr val="FFFFFF"/>
                   </a:solidFill>
@@ -24335,6 +24713,13 @@
                 </a:outerShdw>
               </a:effectLst>
             </p:spPr>
+            <p:txBody>
+              <a:bodyPr/>
+              <a:lstStyle/>
+              <a:p>
+                <a:endParaRPr lang="en-US"/>
+              </a:p>
+            </p:txBody>
           </p:sp>
           <p:sp>
             <p:nvSpPr>
@@ -24464,6 +24849,13 @@
                 </a:outerShdw>
               </a:effectLst>
             </p:spPr>
+            <p:txBody>
+              <a:bodyPr/>
+              <a:lstStyle/>
+              <a:p>
+                <a:endParaRPr lang="en-US"/>
+              </a:p>
+            </p:txBody>
           </p:sp>
           <p:sp>
             <p:nvSpPr>
@@ -24568,6 +24960,13 @@
                 </a:outerShdw>
               </a:effectLst>
             </p:spPr>
+            <p:txBody>
+              <a:bodyPr/>
+              <a:lstStyle/>
+              <a:p>
+                <a:endParaRPr lang="en-US"/>
+              </a:p>
+            </p:txBody>
           </p:sp>
           <p:sp>
             <p:nvSpPr>
@@ -24650,6 +25049,13 @@
                 </a:outerShdw>
               </a:effectLst>
             </p:spPr>
+            <p:txBody>
+              <a:bodyPr/>
+              <a:lstStyle/>
+              <a:p>
+                <a:endParaRPr lang="en-US"/>
+              </a:p>
+            </p:txBody>
           </p:sp>
           <p:sp>
             <p:nvSpPr>
@@ -24729,6 +25135,13 @@
                 </a:outerShdw>
               </a:effectLst>
             </p:spPr>
+            <p:txBody>
+              <a:bodyPr/>
+              <a:lstStyle/>
+              <a:p>
+                <a:endParaRPr lang="en-US"/>
+              </a:p>
+            </p:txBody>
           </p:sp>
           <p:sp>
             <p:nvSpPr>
@@ -24833,6 +25246,13 @@
                 </a:outerShdw>
               </a:effectLst>
             </p:spPr>
+            <p:txBody>
+              <a:bodyPr/>
+              <a:lstStyle/>
+              <a:p>
+                <a:endParaRPr lang="en-US"/>
+              </a:p>
+            </p:txBody>
           </p:sp>
           <p:sp>
             <p:nvSpPr>
@@ -24937,6 +25357,13 @@
                 </a:outerShdw>
               </a:effectLst>
             </p:spPr>
+            <p:txBody>
+              <a:bodyPr/>
+              <a:lstStyle/>
+              <a:p>
+                <a:endParaRPr lang="en-US"/>
+              </a:p>
+            </p:txBody>
           </p:sp>
           <p:sp>
             <p:nvSpPr>
@@ -25019,6 +25446,13 @@
                 </a:outerShdw>
               </a:effectLst>
             </p:spPr>
+            <p:txBody>
+              <a:bodyPr/>
+              <a:lstStyle/>
+              <a:p>
+                <a:endParaRPr lang="en-US"/>
+              </a:p>
+            </p:txBody>
           </p:sp>
           <p:sp>
             <p:nvSpPr>
@@ -25123,6 +25557,13 @@
                 </a:outerShdw>
               </a:effectLst>
             </p:spPr>
+            <p:txBody>
+              <a:bodyPr/>
+              <a:lstStyle/>
+              <a:p>
+                <a:endParaRPr lang="en-US"/>
+              </a:p>
+            </p:txBody>
           </p:sp>
           <p:sp>
             <p:nvSpPr>
@@ -25171,6 +25612,13 @@
                 </a:outerShdw>
               </a:effectLst>
             </p:spPr>
+            <p:txBody>
+              <a:bodyPr/>
+              <a:lstStyle/>
+              <a:p>
+                <a:endParaRPr lang="en-US"/>
+              </a:p>
+            </p:txBody>
           </p:sp>
           <p:sp>
             <p:nvSpPr>
@@ -25250,6 +25698,13 @@
                 </a:outerShdw>
               </a:effectLst>
             </p:spPr>
+            <p:txBody>
+              <a:bodyPr/>
+              <a:lstStyle/>
+              <a:p>
+                <a:endParaRPr lang="en-US"/>
+              </a:p>
+            </p:txBody>
           </p:sp>
           <p:sp>
             <p:nvSpPr>
@@ -25379,6 +25834,13 @@
                 </a:outerShdw>
               </a:effectLst>
             </p:spPr>
+            <p:txBody>
+              <a:bodyPr/>
+              <a:lstStyle/>
+              <a:p>
+                <a:endParaRPr lang="en-US"/>
+              </a:p>
+            </p:txBody>
           </p:sp>
           <p:sp>
             <p:nvSpPr>
@@ -25483,6 +25945,13 @@
                 </a:outerShdw>
               </a:effectLst>
             </p:spPr>
+            <p:txBody>
+              <a:bodyPr/>
+              <a:lstStyle/>
+              <a:p>
+                <a:endParaRPr lang="en-US"/>
+              </a:p>
+            </p:txBody>
           </p:sp>
           <p:sp>
             <p:nvSpPr>
@@ -25565,6 +26034,13 @@
                 </a:outerShdw>
               </a:effectLst>
             </p:spPr>
+            <p:txBody>
+              <a:bodyPr/>
+              <a:lstStyle/>
+              <a:p>
+                <a:endParaRPr lang="en-US"/>
+              </a:p>
+            </p:txBody>
           </p:sp>
           <p:sp>
             <p:nvSpPr>
@@ -25644,6 +26120,13 @@
                 </a:outerShdw>
               </a:effectLst>
             </p:spPr>
+            <p:txBody>
+              <a:bodyPr/>
+              <a:lstStyle/>
+              <a:p>
+                <a:endParaRPr lang="en-US"/>
+              </a:p>
+            </p:txBody>
           </p:sp>
           <p:sp>
             <p:nvSpPr>
@@ -25748,6 +26231,13 @@
                 </a:outerShdw>
               </a:effectLst>
             </p:spPr>
+            <p:txBody>
+              <a:bodyPr/>
+              <a:lstStyle/>
+              <a:p>
+                <a:endParaRPr lang="en-US"/>
+              </a:p>
+            </p:txBody>
           </p:sp>
           <p:sp>
             <p:nvSpPr>
@@ -25852,6 +26342,13 @@
                 </a:outerShdw>
               </a:effectLst>
             </p:spPr>
+            <p:txBody>
+              <a:bodyPr/>
+              <a:lstStyle/>
+              <a:p>
+                <a:endParaRPr lang="en-US"/>
+              </a:p>
+            </p:txBody>
           </p:sp>
           <p:sp>
             <p:nvSpPr>
@@ -25934,6 +26431,13 @@
                 </a:outerShdw>
               </a:effectLst>
             </p:spPr>
+            <p:txBody>
+              <a:bodyPr/>
+              <a:lstStyle/>
+              <a:p>
+                <a:endParaRPr lang="en-US"/>
+              </a:p>
+            </p:txBody>
           </p:sp>
           <p:sp>
             <p:nvSpPr>
@@ -26038,6 +26542,13 @@
                 </a:outerShdw>
               </a:effectLst>
             </p:spPr>
+            <p:txBody>
+              <a:bodyPr/>
+              <a:lstStyle/>
+              <a:p>
+                <a:endParaRPr lang="en-US"/>
+              </a:p>
+            </p:txBody>
           </p:sp>
           <p:sp>
             <p:nvSpPr>
@@ -26086,6 +26597,13 @@
                 </a:outerShdw>
               </a:effectLst>
             </p:spPr>
+            <p:txBody>
+              <a:bodyPr/>
+              <a:lstStyle/>
+              <a:p>
+                <a:endParaRPr lang="en-US"/>
+              </a:p>
+            </p:txBody>
           </p:sp>
         </p:grpSp>
       </p:grpSp>
@@ -36498,7 +37016,7 @@
             </a:pPr>
             <a:r>
               <a:rPr lang="en-US" sz="1500" dirty="0"/>
-              <a:t>The picture on the right is a  portrait of Jacquard was woven in silk on a Jacquard loom and required 24,000 punched cards to create (1839). One of these portraits in the possession of Charles Babbage inspired him in using perforated cards in his Difference Engine.</a:t>
+              <a:t>The picture on the right is a portrait of Jacquard was woven in silk on a Jacquard loom and required 24,000 punched cards to create (1839). One of these portraits in the possession of Charles Babbage inspired him in using perforated cards in his Difference Engine.</a:t>
             </a:r>
           </a:p>
           <a:p>
@@ -36731,7 +37249,7 @@
             </a:pPr>
             <a:r>
               <a:rPr lang="en-US" sz="2000" dirty="0"/>
-              <a:t>Charles Babbage in 1823 started work on his Difference Engine.  It was programmed using punch cards and could do simple calculations to 31 digits. Do to high costs, it was not built until 1991, well after his death.  It weighed 15 tons and was 8 ft tall.</a:t>
+              <a:t>Charles Babbage in 1823 started work on his Difference Engine.  It was programmed using punch cards and could do simple calculations to 31 digits. Due to high costs, it was not built until 1991, well after his death.  It weighed 15 tons and was 8 ft tall.</a:t>
             </a:r>
           </a:p>
           <a:p>
@@ -37122,7 +37640,7 @@
           <a:noFill/>
           <a:extLst>
             <a:ext uri="{909E8E84-426E-40dd-AFC4-6F175D3DCCD1}">
-              <a14:hiddenFill xmlns="" xmlns:a16="http://schemas.microsoft.com/office/drawing/2014/main" xmlns:a14="http://schemas.microsoft.com/office/drawing/2010/main" xmlns:p14="http://schemas.microsoft.com/office/powerpoint/2010/main">
+              <a14:hiddenFill xmlns:p14="http://schemas.microsoft.com/office/powerpoint/2010/main" xmlns:a14="http://schemas.microsoft.com/office/drawing/2010/main" xmlns:a16="http://schemas.microsoft.com/office/drawing/2014/main" xmlns="">
                 <a:solidFill>
                   <a:srgbClr val="FFFFFF"/>
                 </a:solidFill>
@@ -37213,7 +37731,7 @@
             </a:ln>
             <a:extLst>
               <a:ext uri="{91240B29-F687-4f45-9708-019B960494DF}">
-                <a14:hiddenLine xmlns="" xmlns:a16="http://schemas.microsoft.com/office/drawing/2014/main" xmlns:a14="http://schemas.microsoft.com/office/drawing/2010/main" xmlns:p14="http://schemas.microsoft.com/office/powerpoint/2010/main" w="9525">
+                <a14:hiddenLine xmlns:p14="http://schemas.microsoft.com/office/powerpoint/2010/main" xmlns:a14="http://schemas.microsoft.com/office/drawing/2010/main" xmlns:a16="http://schemas.microsoft.com/office/drawing/2014/main" xmlns="" w="9525">
                   <a:solidFill>
                     <a:srgbClr val="000000"/>
                   </a:solidFill>
@@ -37224,6 +37742,13 @@
               </a:ext>
             </a:extLst>
           </p:spPr>
+          <p:txBody>
+            <a:bodyPr/>
+            <a:lstStyle/>
+            <a:p>
+              <a:endParaRPr lang="en-US"/>
+            </a:p>
+          </p:txBody>
         </p:sp>
         <p:sp>
           <p:nvSpPr>
@@ -37318,7 +37843,7 @@
             </a:ln>
             <a:extLst>
               <a:ext uri="{91240B29-F687-4f45-9708-019B960494DF}">
-                <a14:hiddenLine xmlns="" xmlns:a16="http://schemas.microsoft.com/office/drawing/2014/main" xmlns:a14="http://schemas.microsoft.com/office/drawing/2010/main" xmlns:p14="http://schemas.microsoft.com/office/powerpoint/2010/main" w="9525">
+                <a14:hiddenLine xmlns:p14="http://schemas.microsoft.com/office/powerpoint/2010/main" xmlns:a14="http://schemas.microsoft.com/office/drawing/2010/main" xmlns:a16="http://schemas.microsoft.com/office/drawing/2014/main" xmlns="" w="9525">
                   <a:solidFill>
                     <a:srgbClr val="000000"/>
                   </a:solidFill>
@@ -37329,6 +37854,13 @@
               </a:ext>
             </a:extLst>
           </p:spPr>
+          <p:txBody>
+            <a:bodyPr/>
+            <a:lstStyle/>
+            <a:p>
+              <a:endParaRPr lang="en-US"/>
+            </a:p>
+          </p:txBody>
         </p:sp>
         <p:sp>
           <p:nvSpPr>
@@ -37423,7 +37955,7 @@
             </a:ln>
             <a:extLst>
               <a:ext uri="{91240B29-F687-4f45-9708-019B960494DF}">
-                <a14:hiddenLine xmlns="" xmlns:a16="http://schemas.microsoft.com/office/drawing/2014/main" xmlns:a14="http://schemas.microsoft.com/office/drawing/2010/main" xmlns:p14="http://schemas.microsoft.com/office/powerpoint/2010/main" w="9525">
+                <a14:hiddenLine xmlns:p14="http://schemas.microsoft.com/office/powerpoint/2010/main" xmlns:a14="http://schemas.microsoft.com/office/drawing/2010/main" xmlns:a16="http://schemas.microsoft.com/office/drawing/2014/main" xmlns="" w="9525">
                   <a:solidFill>
                     <a:srgbClr val="000000"/>
                   </a:solidFill>
@@ -37434,6 +37966,13 @@
               </a:ext>
             </a:extLst>
           </p:spPr>
+          <p:txBody>
+            <a:bodyPr/>
+            <a:lstStyle/>
+            <a:p>
+              <a:endParaRPr lang="en-US"/>
+            </a:p>
+          </p:txBody>
         </p:sp>
         <p:sp>
           <p:nvSpPr>
@@ -37472,7 +38011,7 @@
             </a:ln>
             <a:extLst>
               <a:ext uri="{91240B29-F687-4f45-9708-019B960494DF}">
-                <a14:hiddenLine xmlns="" xmlns:a16="http://schemas.microsoft.com/office/drawing/2014/main" xmlns:a14="http://schemas.microsoft.com/office/drawing/2010/main" xmlns:p14="http://schemas.microsoft.com/office/powerpoint/2010/main" w="9525">
+                <a14:hiddenLine xmlns:p14="http://schemas.microsoft.com/office/powerpoint/2010/main" xmlns:a14="http://schemas.microsoft.com/office/drawing/2010/main" xmlns:a16="http://schemas.microsoft.com/office/drawing/2014/main" xmlns="" w="9525">
                   <a:solidFill>
                     <a:srgbClr val="000000"/>
                   </a:solidFill>
@@ -37483,6 +38022,13 @@
               </a:ext>
             </a:extLst>
           </p:spPr>
+          <p:txBody>
+            <a:bodyPr/>
+            <a:lstStyle/>
+            <a:p>
+              <a:endParaRPr lang="en-US"/>
+            </a:p>
+          </p:txBody>
         </p:sp>
         <p:sp>
           <p:nvSpPr>
@@ -37577,7 +38123,7 @@
             </a:ln>
             <a:extLst>
               <a:ext uri="{91240B29-F687-4f45-9708-019B960494DF}">
-                <a14:hiddenLine xmlns="" xmlns:a16="http://schemas.microsoft.com/office/drawing/2014/main" xmlns:a14="http://schemas.microsoft.com/office/drawing/2010/main" xmlns:p14="http://schemas.microsoft.com/office/powerpoint/2010/main" w="9525">
+                <a14:hiddenLine xmlns:p14="http://schemas.microsoft.com/office/powerpoint/2010/main" xmlns:a14="http://schemas.microsoft.com/office/drawing/2010/main" xmlns:a16="http://schemas.microsoft.com/office/drawing/2014/main" xmlns="" w="9525">
                   <a:solidFill>
                     <a:srgbClr val="000000"/>
                   </a:solidFill>
@@ -37588,6 +38134,13 @@
               </a:ext>
             </a:extLst>
           </p:spPr>
+          <p:txBody>
+            <a:bodyPr/>
+            <a:lstStyle/>
+            <a:p>
+              <a:endParaRPr lang="en-US"/>
+            </a:p>
+          </p:txBody>
         </p:sp>
         <p:sp>
           <p:nvSpPr>
@@ -37654,7 +38207,7 @@
             </a:ln>
             <a:extLst>
               <a:ext uri="{91240B29-F687-4f45-9708-019B960494DF}">
-                <a14:hiddenLine xmlns="" xmlns:a16="http://schemas.microsoft.com/office/drawing/2014/main" xmlns:a14="http://schemas.microsoft.com/office/drawing/2010/main" xmlns:p14="http://schemas.microsoft.com/office/powerpoint/2010/main" w="9525">
+                <a14:hiddenLine xmlns:p14="http://schemas.microsoft.com/office/powerpoint/2010/main" xmlns:a14="http://schemas.microsoft.com/office/drawing/2010/main" xmlns:a16="http://schemas.microsoft.com/office/drawing/2014/main" xmlns="" w="9525">
                   <a:solidFill>
                     <a:srgbClr val="000000"/>
                   </a:solidFill>
@@ -37665,6 +38218,13 @@
               </a:ext>
             </a:extLst>
           </p:spPr>
+          <p:txBody>
+            <a:bodyPr/>
+            <a:lstStyle/>
+            <a:p>
+              <a:endParaRPr lang="en-US"/>
+            </a:p>
+          </p:txBody>
         </p:sp>
         <p:sp>
           <p:nvSpPr>
@@ -37731,7 +38291,7 @@
             </a:ln>
             <a:extLst>
               <a:ext uri="{91240B29-F687-4f45-9708-019B960494DF}">
-                <a14:hiddenLine xmlns="" xmlns:a16="http://schemas.microsoft.com/office/drawing/2014/main" xmlns:a14="http://schemas.microsoft.com/office/drawing/2010/main" xmlns:p14="http://schemas.microsoft.com/office/powerpoint/2010/main" w="9525">
+                <a14:hiddenLine xmlns:p14="http://schemas.microsoft.com/office/powerpoint/2010/main" xmlns:a14="http://schemas.microsoft.com/office/drawing/2010/main" xmlns:a16="http://schemas.microsoft.com/office/drawing/2014/main" xmlns="" w="9525">
                   <a:solidFill>
                     <a:srgbClr val="000000"/>
                   </a:solidFill>
@@ -37742,6 +38302,13 @@
               </a:ext>
             </a:extLst>
           </p:spPr>
+          <p:txBody>
+            <a:bodyPr/>
+            <a:lstStyle/>
+            <a:p>
+              <a:endParaRPr lang="en-US"/>
+            </a:p>
+          </p:txBody>
         </p:sp>
         <p:sp>
           <p:nvSpPr>
@@ -37836,7 +38403,7 @@
             </a:ln>
             <a:extLst>
               <a:ext uri="{91240B29-F687-4f45-9708-019B960494DF}">
-                <a14:hiddenLine xmlns="" xmlns:a16="http://schemas.microsoft.com/office/drawing/2014/main" xmlns:a14="http://schemas.microsoft.com/office/drawing/2010/main" xmlns:p14="http://schemas.microsoft.com/office/powerpoint/2010/main" w="9525">
+                <a14:hiddenLine xmlns:p14="http://schemas.microsoft.com/office/powerpoint/2010/main" xmlns:a14="http://schemas.microsoft.com/office/drawing/2010/main" xmlns:a16="http://schemas.microsoft.com/office/drawing/2014/main" xmlns="" w="9525">
                   <a:solidFill>
                     <a:srgbClr val="000000"/>
                   </a:solidFill>
@@ -37847,6 +38414,13 @@
               </a:ext>
             </a:extLst>
           </p:spPr>
+          <p:txBody>
+            <a:bodyPr/>
+            <a:lstStyle/>
+            <a:p>
+              <a:endParaRPr lang="en-US"/>
+            </a:p>
+          </p:txBody>
         </p:sp>
         <p:sp>
           <p:nvSpPr>
@@ -37913,7 +38487,7 @@
             </a:ln>
             <a:extLst>
               <a:ext uri="{91240B29-F687-4f45-9708-019B960494DF}">
-                <a14:hiddenLine xmlns="" xmlns:a16="http://schemas.microsoft.com/office/drawing/2014/main" xmlns:a14="http://schemas.microsoft.com/office/drawing/2010/main" xmlns:p14="http://schemas.microsoft.com/office/powerpoint/2010/main" w="9525">
+                <a14:hiddenLine xmlns:p14="http://schemas.microsoft.com/office/powerpoint/2010/main" xmlns:a14="http://schemas.microsoft.com/office/drawing/2010/main" xmlns:a16="http://schemas.microsoft.com/office/drawing/2014/main" xmlns="" w="9525">
                   <a:solidFill>
                     <a:srgbClr val="000000"/>
                   </a:solidFill>
@@ -37924,6 +38498,13 @@
               </a:ext>
             </a:extLst>
           </p:spPr>
+          <p:txBody>
+            <a:bodyPr/>
+            <a:lstStyle/>
+            <a:p>
+              <a:endParaRPr lang="en-US"/>
+            </a:p>
+          </p:txBody>
         </p:sp>
         <p:sp>
           <p:nvSpPr>
@@ -37990,7 +38571,7 @@
             </a:ln>
             <a:extLst>
               <a:ext uri="{91240B29-F687-4f45-9708-019B960494DF}">
-                <a14:hiddenLine xmlns="" xmlns:a16="http://schemas.microsoft.com/office/drawing/2014/main" xmlns:a14="http://schemas.microsoft.com/office/drawing/2010/main" xmlns:p14="http://schemas.microsoft.com/office/powerpoint/2010/main" w="9525">
+                <a14:hiddenLine xmlns:p14="http://schemas.microsoft.com/office/powerpoint/2010/main" xmlns:a14="http://schemas.microsoft.com/office/drawing/2010/main" xmlns:a16="http://schemas.microsoft.com/office/drawing/2014/main" xmlns="" w="9525">
                   <a:solidFill>
                     <a:srgbClr val="000000"/>
                   </a:solidFill>
@@ -38001,6 +38582,13 @@
               </a:ext>
             </a:extLst>
           </p:spPr>
+          <p:txBody>
+            <a:bodyPr/>
+            <a:lstStyle/>
+            <a:p>
+              <a:endParaRPr lang="en-US"/>
+            </a:p>
+          </p:txBody>
         </p:sp>
         <p:sp>
           <p:nvSpPr>
@@ -38095,7 +38683,7 @@
             </a:ln>
             <a:extLst>
               <a:ext uri="{91240B29-F687-4f45-9708-019B960494DF}">
-                <a14:hiddenLine xmlns="" xmlns:a16="http://schemas.microsoft.com/office/drawing/2014/main" xmlns:a14="http://schemas.microsoft.com/office/drawing/2010/main" xmlns:p14="http://schemas.microsoft.com/office/powerpoint/2010/main" w="9525">
+                <a14:hiddenLine xmlns:p14="http://schemas.microsoft.com/office/powerpoint/2010/main" xmlns:a14="http://schemas.microsoft.com/office/drawing/2010/main" xmlns:a16="http://schemas.microsoft.com/office/drawing/2014/main" xmlns="" w="9525">
                   <a:solidFill>
                     <a:srgbClr val="000000"/>
                   </a:solidFill>
@@ -38106,6 +38694,13 @@
               </a:ext>
             </a:extLst>
           </p:spPr>
+          <p:txBody>
+            <a:bodyPr/>
+            <a:lstStyle/>
+            <a:p>
+              <a:endParaRPr lang="en-US"/>
+            </a:p>
+          </p:txBody>
         </p:sp>
         <p:sp>
           <p:nvSpPr>
@@ -38200,7 +38795,7 @@
             </a:ln>
             <a:extLst>
               <a:ext uri="{91240B29-F687-4f45-9708-019B960494DF}">
-                <a14:hiddenLine xmlns="" xmlns:a16="http://schemas.microsoft.com/office/drawing/2014/main" xmlns:a14="http://schemas.microsoft.com/office/drawing/2010/main" xmlns:p14="http://schemas.microsoft.com/office/powerpoint/2010/main" w="9525">
+                <a14:hiddenLine xmlns:p14="http://schemas.microsoft.com/office/powerpoint/2010/main" xmlns:a14="http://schemas.microsoft.com/office/drawing/2010/main" xmlns:a16="http://schemas.microsoft.com/office/drawing/2014/main" xmlns="" w="9525">
                   <a:solidFill>
                     <a:srgbClr val="000000"/>
                   </a:solidFill>
@@ -38211,6 +38806,13 @@
               </a:ext>
             </a:extLst>
           </p:spPr>
+          <p:txBody>
+            <a:bodyPr/>
+            <a:lstStyle/>
+            <a:p>
+              <a:endParaRPr lang="en-US"/>
+            </a:p>
+          </p:txBody>
         </p:sp>
         <p:sp>
           <p:nvSpPr>
@@ -38277,7 +38879,7 @@
             </a:ln>
             <a:extLst>
               <a:ext uri="{91240B29-F687-4f45-9708-019B960494DF}">
-                <a14:hiddenLine xmlns="" xmlns:a16="http://schemas.microsoft.com/office/drawing/2014/main" xmlns:a14="http://schemas.microsoft.com/office/drawing/2010/main" xmlns:p14="http://schemas.microsoft.com/office/powerpoint/2010/main" w="9525">
+                <a14:hiddenLine xmlns:p14="http://schemas.microsoft.com/office/powerpoint/2010/main" xmlns:a14="http://schemas.microsoft.com/office/drawing/2010/main" xmlns:a16="http://schemas.microsoft.com/office/drawing/2014/main" xmlns="" w="9525">
                   <a:solidFill>
                     <a:srgbClr val="000000"/>
                   </a:solidFill>
@@ -38288,6 +38890,13 @@
               </a:ext>
             </a:extLst>
           </p:spPr>
+          <p:txBody>
+            <a:bodyPr/>
+            <a:lstStyle/>
+            <a:p>
+              <a:endParaRPr lang="en-US"/>
+            </a:p>
+          </p:txBody>
         </p:sp>
         <p:sp>
           <p:nvSpPr>
@@ -38402,7 +39011,7 @@
             </a:ln>
             <a:extLst>
               <a:ext uri="{91240B29-F687-4f45-9708-019B960494DF}">
-                <a14:hiddenLine xmlns="" xmlns:a16="http://schemas.microsoft.com/office/drawing/2014/main" xmlns:a14="http://schemas.microsoft.com/office/drawing/2010/main" xmlns:p14="http://schemas.microsoft.com/office/powerpoint/2010/main" w="9525">
+                <a14:hiddenLine xmlns:p14="http://schemas.microsoft.com/office/powerpoint/2010/main" xmlns:a14="http://schemas.microsoft.com/office/drawing/2010/main" xmlns:a16="http://schemas.microsoft.com/office/drawing/2014/main" xmlns="" w="9525">
                   <a:solidFill>
                     <a:srgbClr val="000000"/>
                   </a:solidFill>
@@ -38413,6 +39022,13 @@
               </a:ext>
             </a:extLst>
           </p:spPr>
+          <p:txBody>
+            <a:bodyPr/>
+            <a:lstStyle/>
+            <a:p>
+              <a:endParaRPr lang="en-US"/>
+            </a:p>
+          </p:txBody>
         </p:sp>
         <p:sp>
           <p:nvSpPr>
@@ -38479,7 +39095,7 @@
             </a:ln>
             <a:extLst>
               <a:ext uri="{91240B29-F687-4f45-9708-019B960494DF}">
-                <a14:hiddenLine xmlns="" xmlns:a16="http://schemas.microsoft.com/office/drawing/2014/main" xmlns:a14="http://schemas.microsoft.com/office/drawing/2010/main" xmlns:p14="http://schemas.microsoft.com/office/powerpoint/2010/main" w="9525">
+                <a14:hiddenLine xmlns:p14="http://schemas.microsoft.com/office/powerpoint/2010/main" xmlns:a14="http://schemas.microsoft.com/office/drawing/2010/main" xmlns:a16="http://schemas.microsoft.com/office/drawing/2014/main" xmlns="" w="9525">
                   <a:solidFill>
                     <a:srgbClr val="000000"/>
                   </a:solidFill>
@@ -38490,6 +39106,13 @@
               </a:ext>
             </a:extLst>
           </p:spPr>
+          <p:txBody>
+            <a:bodyPr/>
+            <a:lstStyle/>
+            <a:p>
+              <a:endParaRPr lang="en-US"/>
+            </a:p>
+          </p:txBody>
         </p:sp>
         <p:sp>
           <p:nvSpPr>
@@ -38584,7 +39207,7 @@
             </a:ln>
             <a:extLst>
               <a:ext uri="{91240B29-F687-4f45-9708-019B960494DF}">
-                <a14:hiddenLine xmlns="" xmlns:a16="http://schemas.microsoft.com/office/drawing/2014/main" xmlns:a14="http://schemas.microsoft.com/office/drawing/2010/main" xmlns:p14="http://schemas.microsoft.com/office/powerpoint/2010/main" w="9525">
+                <a14:hiddenLine xmlns:p14="http://schemas.microsoft.com/office/powerpoint/2010/main" xmlns:a14="http://schemas.microsoft.com/office/drawing/2010/main" xmlns:a16="http://schemas.microsoft.com/office/drawing/2014/main" xmlns="" w="9525">
                   <a:solidFill>
                     <a:srgbClr val="000000"/>
                   </a:solidFill>
@@ -38595,6 +39218,13 @@
               </a:ext>
             </a:extLst>
           </p:spPr>
+          <p:txBody>
+            <a:bodyPr/>
+            <a:lstStyle/>
+            <a:p>
+              <a:endParaRPr lang="en-US"/>
+            </a:p>
+          </p:txBody>
         </p:sp>
         <p:sp>
           <p:nvSpPr>
@@ -38689,7 +39319,7 @@
             </a:ln>
             <a:extLst>
               <a:ext uri="{91240B29-F687-4f45-9708-019B960494DF}">
-                <a14:hiddenLine xmlns="" xmlns:a16="http://schemas.microsoft.com/office/drawing/2014/main" xmlns:a14="http://schemas.microsoft.com/office/drawing/2010/main" xmlns:p14="http://schemas.microsoft.com/office/powerpoint/2010/main" w="9525">
+                <a14:hiddenLine xmlns:p14="http://schemas.microsoft.com/office/powerpoint/2010/main" xmlns:a14="http://schemas.microsoft.com/office/drawing/2010/main" xmlns:a16="http://schemas.microsoft.com/office/drawing/2014/main" xmlns="" w="9525">
                   <a:solidFill>
                     <a:srgbClr val="000000"/>
                   </a:solidFill>
@@ -38700,6 +39330,13 @@
               </a:ext>
             </a:extLst>
           </p:spPr>
+          <p:txBody>
+            <a:bodyPr/>
+            <a:lstStyle/>
+            <a:p>
+              <a:endParaRPr lang="en-US"/>
+            </a:p>
+          </p:txBody>
         </p:sp>
         <p:sp>
           <p:nvSpPr>
@@ -38766,7 +39403,7 @@
             </a:ln>
             <a:extLst>
               <a:ext uri="{91240B29-F687-4f45-9708-019B960494DF}">
-                <a14:hiddenLine xmlns="" xmlns:a16="http://schemas.microsoft.com/office/drawing/2014/main" xmlns:a14="http://schemas.microsoft.com/office/drawing/2010/main" xmlns:p14="http://schemas.microsoft.com/office/powerpoint/2010/main" w="9525">
+                <a14:hiddenLine xmlns:p14="http://schemas.microsoft.com/office/powerpoint/2010/main" xmlns:a14="http://schemas.microsoft.com/office/drawing/2010/main" xmlns:a16="http://schemas.microsoft.com/office/drawing/2014/main" xmlns="" w="9525">
                   <a:solidFill>
                     <a:srgbClr val="000000"/>
                   </a:solidFill>
@@ -38777,6 +39414,13 @@
               </a:ext>
             </a:extLst>
           </p:spPr>
+          <p:txBody>
+            <a:bodyPr/>
+            <a:lstStyle/>
+            <a:p>
+              <a:endParaRPr lang="en-US"/>
+            </a:p>
+          </p:txBody>
         </p:sp>
         <p:sp>
           <p:nvSpPr>
@@ -38871,7 +39515,7 @@
             </a:ln>
             <a:extLst>
               <a:ext uri="{91240B29-F687-4f45-9708-019B960494DF}">
-                <a14:hiddenLine xmlns="" xmlns:a16="http://schemas.microsoft.com/office/drawing/2014/main" xmlns:a14="http://schemas.microsoft.com/office/drawing/2010/main" xmlns:p14="http://schemas.microsoft.com/office/powerpoint/2010/main" w="9525">
+                <a14:hiddenLine xmlns:p14="http://schemas.microsoft.com/office/powerpoint/2010/main" xmlns:a14="http://schemas.microsoft.com/office/drawing/2010/main" xmlns:a16="http://schemas.microsoft.com/office/drawing/2014/main" xmlns="" w="9525">
                   <a:solidFill>
                     <a:srgbClr val="000000"/>
                   </a:solidFill>
@@ -38882,6 +39526,13 @@
               </a:ext>
             </a:extLst>
           </p:spPr>
+          <p:txBody>
+            <a:bodyPr/>
+            <a:lstStyle/>
+            <a:p>
+              <a:endParaRPr lang="en-US"/>
+            </a:p>
+          </p:txBody>
         </p:sp>
         <p:sp>
           <p:nvSpPr>
@@ -38976,7 +39627,7 @@
             </a:ln>
             <a:extLst>
               <a:ext uri="{91240B29-F687-4f45-9708-019B960494DF}">
-                <a14:hiddenLine xmlns="" xmlns:a16="http://schemas.microsoft.com/office/drawing/2014/main" xmlns:a14="http://schemas.microsoft.com/office/drawing/2010/main" xmlns:p14="http://schemas.microsoft.com/office/powerpoint/2010/main" w="9525">
+                <a14:hiddenLine xmlns:p14="http://schemas.microsoft.com/office/powerpoint/2010/main" xmlns:a14="http://schemas.microsoft.com/office/drawing/2010/main" xmlns:a16="http://schemas.microsoft.com/office/drawing/2014/main" xmlns="" w="9525">
                   <a:solidFill>
                     <a:srgbClr val="000000"/>
                   </a:solidFill>
@@ -38987,6 +39638,13 @@
               </a:ext>
             </a:extLst>
           </p:spPr>
+          <p:txBody>
+            <a:bodyPr/>
+            <a:lstStyle/>
+            <a:p>
+              <a:endParaRPr lang="en-US"/>
+            </a:p>
+          </p:txBody>
         </p:sp>
         <p:sp>
           <p:nvSpPr>
@@ -39047,7 +39705,7 @@
             </a:ln>
             <a:extLst>
               <a:ext uri="{91240B29-F687-4f45-9708-019B960494DF}">
-                <a14:hiddenLine xmlns="" xmlns:a16="http://schemas.microsoft.com/office/drawing/2014/main" xmlns:a14="http://schemas.microsoft.com/office/drawing/2010/main" xmlns:p14="http://schemas.microsoft.com/office/powerpoint/2010/main" w="9525">
+                <a14:hiddenLine xmlns:p14="http://schemas.microsoft.com/office/powerpoint/2010/main" xmlns:a14="http://schemas.microsoft.com/office/drawing/2010/main" xmlns:a16="http://schemas.microsoft.com/office/drawing/2014/main" xmlns="" w="9525">
                   <a:solidFill>
                     <a:srgbClr val="000000"/>
                   </a:solidFill>
@@ -39058,6 +39716,13 @@
               </a:ext>
             </a:extLst>
           </p:spPr>
+          <p:txBody>
+            <a:bodyPr/>
+            <a:lstStyle/>
+            <a:p>
+              <a:endParaRPr lang="en-US"/>
+            </a:p>
+          </p:txBody>
         </p:sp>
         <p:sp>
           <p:nvSpPr>
@@ -39152,7 +39817,7 @@
             </a:ln>
             <a:extLst>
               <a:ext uri="{91240B29-F687-4f45-9708-019B960494DF}">
-                <a14:hiddenLine xmlns="" xmlns:a16="http://schemas.microsoft.com/office/drawing/2014/main" xmlns:a14="http://schemas.microsoft.com/office/drawing/2010/main" xmlns:p14="http://schemas.microsoft.com/office/powerpoint/2010/main" w="9525">
+                <a14:hiddenLine xmlns:p14="http://schemas.microsoft.com/office/powerpoint/2010/main" xmlns:a14="http://schemas.microsoft.com/office/drawing/2010/main" xmlns:a16="http://schemas.microsoft.com/office/drawing/2014/main" xmlns="" w="9525">
                   <a:solidFill>
                     <a:srgbClr val="000000"/>
                   </a:solidFill>
@@ -39163,6 +39828,13 @@
               </a:ext>
             </a:extLst>
           </p:spPr>
+          <p:txBody>
+            <a:bodyPr/>
+            <a:lstStyle/>
+            <a:p>
+              <a:endParaRPr lang="en-US"/>
+            </a:p>
+          </p:txBody>
         </p:sp>
         <p:sp>
           <p:nvSpPr>
@@ -39223,7 +39895,7 @@
             </a:ln>
             <a:extLst>
               <a:ext uri="{91240B29-F687-4f45-9708-019B960494DF}">
-                <a14:hiddenLine xmlns="" xmlns:a16="http://schemas.microsoft.com/office/drawing/2014/main" xmlns:a14="http://schemas.microsoft.com/office/drawing/2010/main" xmlns:p14="http://schemas.microsoft.com/office/powerpoint/2010/main" w="9525">
+                <a14:hiddenLine xmlns:p14="http://schemas.microsoft.com/office/powerpoint/2010/main" xmlns:a14="http://schemas.microsoft.com/office/drawing/2010/main" xmlns:a16="http://schemas.microsoft.com/office/drawing/2014/main" xmlns="" w="9525">
                   <a:solidFill>
                     <a:srgbClr val="000000"/>
                   </a:solidFill>
@@ -39234,6 +39906,13 @@
               </a:ext>
             </a:extLst>
           </p:spPr>
+          <p:txBody>
+            <a:bodyPr/>
+            <a:lstStyle/>
+            <a:p>
+              <a:endParaRPr lang="en-US"/>
+            </a:p>
+          </p:txBody>
         </p:sp>
         <p:sp>
           <p:nvSpPr>
@@ -39328,7 +40007,7 @@
             </a:ln>
             <a:extLst>
               <a:ext uri="{91240B29-F687-4f45-9708-019B960494DF}">
-                <a14:hiddenLine xmlns="" xmlns:a16="http://schemas.microsoft.com/office/drawing/2014/main" xmlns:a14="http://schemas.microsoft.com/office/drawing/2010/main" xmlns:p14="http://schemas.microsoft.com/office/powerpoint/2010/main" w="9525">
+                <a14:hiddenLine xmlns:p14="http://schemas.microsoft.com/office/powerpoint/2010/main" xmlns:a14="http://schemas.microsoft.com/office/drawing/2010/main" xmlns:a16="http://schemas.microsoft.com/office/drawing/2014/main" xmlns="" w="9525">
                   <a:solidFill>
                     <a:srgbClr val="000000"/>
                   </a:solidFill>
@@ -39339,6 +40018,13 @@
               </a:ext>
             </a:extLst>
           </p:spPr>
+          <p:txBody>
+            <a:bodyPr/>
+            <a:lstStyle/>
+            <a:p>
+              <a:endParaRPr lang="en-US"/>
+            </a:p>
+          </p:txBody>
         </p:sp>
         <p:sp>
           <p:nvSpPr>
@@ -39411,7 +40097,7 @@
             </a:ln>
             <a:extLst>
               <a:ext uri="{91240B29-F687-4f45-9708-019B960494DF}">
-                <a14:hiddenLine xmlns="" xmlns:a16="http://schemas.microsoft.com/office/drawing/2014/main" xmlns:a14="http://schemas.microsoft.com/office/drawing/2010/main" xmlns:p14="http://schemas.microsoft.com/office/powerpoint/2010/main" w="9525">
+                <a14:hiddenLine xmlns:p14="http://schemas.microsoft.com/office/powerpoint/2010/main" xmlns:a14="http://schemas.microsoft.com/office/drawing/2010/main" xmlns:a16="http://schemas.microsoft.com/office/drawing/2014/main" xmlns="" w="9525">
                   <a:solidFill>
                     <a:srgbClr val="000000"/>
                   </a:solidFill>
@@ -39422,6 +40108,13 @@
               </a:ext>
             </a:extLst>
           </p:spPr>
+          <p:txBody>
+            <a:bodyPr/>
+            <a:lstStyle/>
+            <a:p>
+              <a:endParaRPr lang="en-US"/>
+            </a:p>
+          </p:txBody>
         </p:sp>
         <p:sp>
           <p:nvSpPr>
@@ -39516,7 +40209,7 @@
             </a:ln>
             <a:extLst>
               <a:ext uri="{91240B29-F687-4f45-9708-019B960494DF}">
-                <a14:hiddenLine xmlns="" xmlns:a16="http://schemas.microsoft.com/office/drawing/2014/main" xmlns:a14="http://schemas.microsoft.com/office/drawing/2010/main" xmlns:p14="http://schemas.microsoft.com/office/powerpoint/2010/main" w="9525">
+                <a14:hiddenLine xmlns:p14="http://schemas.microsoft.com/office/powerpoint/2010/main" xmlns:a14="http://schemas.microsoft.com/office/drawing/2010/main" xmlns:a16="http://schemas.microsoft.com/office/drawing/2014/main" xmlns="" w="9525">
                   <a:solidFill>
                     <a:srgbClr val="000000"/>
                   </a:solidFill>
@@ -39527,6 +40220,13 @@
               </a:ext>
             </a:extLst>
           </p:spPr>
+          <p:txBody>
+            <a:bodyPr/>
+            <a:lstStyle/>
+            <a:p>
+              <a:endParaRPr lang="en-US"/>
+            </a:p>
+          </p:txBody>
         </p:sp>
         <p:sp>
           <p:nvSpPr>
@@ -39599,7 +40299,7 @@
             </a:ln>
             <a:extLst>
               <a:ext uri="{91240B29-F687-4f45-9708-019B960494DF}">
-                <a14:hiddenLine xmlns="" xmlns:a16="http://schemas.microsoft.com/office/drawing/2014/main" xmlns:a14="http://schemas.microsoft.com/office/drawing/2010/main" xmlns:p14="http://schemas.microsoft.com/office/powerpoint/2010/main" w="9525">
+                <a14:hiddenLine xmlns:p14="http://schemas.microsoft.com/office/powerpoint/2010/main" xmlns:a14="http://schemas.microsoft.com/office/drawing/2010/main" xmlns:a16="http://schemas.microsoft.com/office/drawing/2014/main" xmlns="" w="9525">
                   <a:solidFill>
                     <a:srgbClr val="000000"/>
                   </a:solidFill>
@@ -39610,6 +40310,13 @@
               </a:ext>
             </a:extLst>
           </p:spPr>
+          <p:txBody>
+            <a:bodyPr/>
+            <a:lstStyle/>
+            <a:p>
+              <a:endParaRPr lang="en-US"/>
+            </a:p>
+          </p:txBody>
         </p:sp>
         <p:sp>
           <p:nvSpPr>
@@ -39704,7 +40411,7 @@
             </a:ln>
             <a:extLst>
               <a:ext uri="{91240B29-F687-4f45-9708-019B960494DF}">
-                <a14:hiddenLine xmlns="" xmlns:a16="http://schemas.microsoft.com/office/drawing/2014/main" xmlns:a14="http://schemas.microsoft.com/office/drawing/2010/main" xmlns:p14="http://schemas.microsoft.com/office/powerpoint/2010/main" w="9525">
+                <a14:hiddenLine xmlns:p14="http://schemas.microsoft.com/office/powerpoint/2010/main" xmlns:a14="http://schemas.microsoft.com/office/drawing/2010/main" xmlns:a16="http://schemas.microsoft.com/office/drawing/2014/main" xmlns="" w="9525">
                   <a:solidFill>
                     <a:srgbClr val="000000"/>
                   </a:solidFill>
@@ -39715,6 +40422,13 @@
               </a:ext>
             </a:extLst>
           </p:spPr>
+          <p:txBody>
+            <a:bodyPr/>
+            <a:lstStyle/>
+            <a:p>
+              <a:endParaRPr lang="en-US"/>
+            </a:p>
+          </p:txBody>
         </p:sp>
         <p:sp>
           <p:nvSpPr>
@@ -39753,7 +40467,7 @@
             </a:ln>
             <a:extLst>
               <a:ext uri="{91240B29-F687-4f45-9708-019B960494DF}">
-                <a14:hiddenLine xmlns="" xmlns:a16="http://schemas.microsoft.com/office/drawing/2014/main" xmlns:a14="http://schemas.microsoft.com/office/drawing/2010/main" xmlns:p14="http://schemas.microsoft.com/office/powerpoint/2010/main" w="9525">
+                <a14:hiddenLine xmlns:p14="http://schemas.microsoft.com/office/powerpoint/2010/main" xmlns:a14="http://schemas.microsoft.com/office/drawing/2010/main" xmlns:a16="http://schemas.microsoft.com/office/drawing/2014/main" xmlns="" w="9525">
                   <a:solidFill>
                     <a:srgbClr val="000000"/>
                   </a:solidFill>
@@ -39764,6 +40478,13 @@
               </a:ext>
             </a:extLst>
           </p:spPr>
+          <p:txBody>
+            <a:bodyPr/>
+            <a:lstStyle/>
+            <a:p>
+              <a:endParaRPr lang="en-US"/>
+            </a:p>
+          </p:txBody>
         </p:sp>
         <p:sp>
           <p:nvSpPr>
@@ -39858,7 +40579,7 @@
             </a:ln>
             <a:extLst>
               <a:ext uri="{91240B29-F687-4f45-9708-019B960494DF}">
-                <a14:hiddenLine xmlns="" xmlns:a16="http://schemas.microsoft.com/office/drawing/2014/main" xmlns:a14="http://schemas.microsoft.com/office/drawing/2010/main" xmlns:p14="http://schemas.microsoft.com/office/powerpoint/2010/main" w="9525">
+                <a14:hiddenLine xmlns:p14="http://schemas.microsoft.com/office/powerpoint/2010/main" xmlns:a14="http://schemas.microsoft.com/office/drawing/2010/main" xmlns:a16="http://schemas.microsoft.com/office/drawing/2014/main" xmlns="" w="9525">
                   <a:solidFill>
                     <a:srgbClr val="000000"/>
                   </a:solidFill>
@@ -39869,6 +40590,13 @@
               </a:ext>
             </a:extLst>
           </p:spPr>
+          <p:txBody>
+            <a:bodyPr/>
+            <a:lstStyle/>
+            <a:p>
+              <a:endParaRPr lang="en-US"/>
+            </a:p>
+          </p:txBody>
         </p:sp>
         <p:sp>
           <p:nvSpPr>
@@ -39935,7 +40663,7 @@
             </a:ln>
             <a:extLst>
               <a:ext uri="{91240B29-F687-4f45-9708-019B960494DF}">
-                <a14:hiddenLine xmlns="" xmlns:a16="http://schemas.microsoft.com/office/drawing/2014/main" xmlns:a14="http://schemas.microsoft.com/office/drawing/2010/main" xmlns:p14="http://schemas.microsoft.com/office/powerpoint/2010/main" w="9525">
+                <a14:hiddenLine xmlns:p14="http://schemas.microsoft.com/office/powerpoint/2010/main" xmlns:a14="http://schemas.microsoft.com/office/drawing/2010/main" xmlns:a16="http://schemas.microsoft.com/office/drawing/2014/main" xmlns="" w="9525">
                   <a:solidFill>
                     <a:srgbClr val="000000"/>
                   </a:solidFill>
@@ -39946,6 +40674,13 @@
               </a:ext>
             </a:extLst>
           </p:spPr>
+          <p:txBody>
+            <a:bodyPr/>
+            <a:lstStyle/>
+            <a:p>
+              <a:endParaRPr lang="en-US"/>
+            </a:p>
+          </p:txBody>
         </p:sp>
         <p:sp>
           <p:nvSpPr>
@@ -40012,7 +40747,7 @@
             </a:ln>
             <a:extLst>
               <a:ext uri="{91240B29-F687-4f45-9708-019B960494DF}">
-                <a14:hiddenLine xmlns="" xmlns:a16="http://schemas.microsoft.com/office/drawing/2014/main" xmlns:a14="http://schemas.microsoft.com/office/drawing/2010/main" xmlns:p14="http://schemas.microsoft.com/office/powerpoint/2010/main" w="9525">
+                <a14:hiddenLine xmlns:p14="http://schemas.microsoft.com/office/powerpoint/2010/main" xmlns:a14="http://schemas.microsoft.com/office/drawing/2010/main" xmlns:a16="http://schemas.microsoft.com/office/drawing/2014/main" xmlns="" w="9525">
                   <a:solidFill>
                     <a:srgbClr val="000000"/>
                   </a:solidFill>
@@ -40023,6 +40758,13 @@
               </a:ext>
             </a:extLst>
           </p:spPr>
+          <p:txBody>
+            <a:bodyPr/>
+            <a:lstStyle/>
+            <a:p>
+              <a:endParaRPr lang="en-US"/>
+            </a:p>
+          </p:txBody>
         </p:sp>
         <p:sp>
           <p:nvSpPr>
@@ -40117,7 +40859,7 @@
             </a:ln>
             <a:extLst>
               <a:ext uri="{91240B29-F687-4f45-9708-019B960494DF}">
-                <a14:hiddenLine xmlns="" xmlns:a16="http://schemas.microsoft.com/office/drawing/2014/main" xmlns:a14="http://schemas.microsoft.com/office/drawing/2010/main" xmlns:p14="http://schemas.microsoft.com/office/powerpoint/2010/main" w="9525">
+                <a14:hiddenLine xmlns:p14="http://schemas.microsoft.com/office/powerpoint/2010/main" xmlns:a14="http://schemas.microsoft.com/office/drawing/2010/main" xmlns:a16="http://schemas.microsoft.com/office/drawing/2014/main" xmlns="" w="9525">
                   <a:solidFill>
                     <a:srgbClr val="000000"/>
                   </a:solidFill>
@@ -40128,6 +40870,13 @@
               </a:ext>
             </a:extLst>
           </p:spPr>
+          <p:txBody>
+            <a:bodyPr/>
+            <a:lstStyle/>
+            <a:p>
+              <a:endParaRPr lang="en-US"/>
+            </a:p>
+          </p:txBody>
         </p:sp>
         <p:sp>
           <p:nvSpPr>
@@ -40200,7 +40949,7 @@
             </a:ln>
             <a:extLst>
               <a:ext uri="{91240B29-F687-4f45-9708-019B960494DF}">
-                <a14:hiddenLine xmlns="" xmlns:a16="http://schemas.microsoft.com/office/drawing/2014/main" xmlns:a14="http://schemas.microsoft.com/office/drawing/2010/main" xmlns:p14="http://schemas.microsoft.com/office/powerpoint/2010/main" w="9525">
+                <a14:hiddenLine xmlns:p14="http://schemas.microsoft.com/office/powerpoint/2010/main" xmlns:a14="http://schemas.microsoft.com/office/drawing/2010/main" xmlns:a16="http://schemas.microsoft.com/office/drawing/2014/main" xmlns="" w="9525">
                   <a:solidFill>
                     <a:srgbClr val="000000"/>
                   </a:solidFill>
@@ -40211,6 +40960,13 @@
               </a:ext>
             </a:extLst>
           </p:spPr>
+          <p:txBody>
+            <a:bodyPr/>
+            <a:lstStyle/>
+            <a:p>
+              <a:endParaRPr lang="en-US"/>
+            </a:p>
+          </p:txBody>
         </p:sp>
         <p:sp>
           <p:nvSpPr>
@@ -40277,7 +41033,7 @@
             </a:ln>
             <a:extLst>
               <a:ext uri="{91240B29-F687-4f45-9708-019B960494DF}">
-                <a14:hiddenLine xmlns="" xmlns:a16="http://schemas.microsoft.com/office/drawing/2014/main" xmlns:a14="http://schemas.microsoft.com/office/drawing/2010/main" xmlns:p14="http://schemas.microsoft.com/office/powerpoint/2010/main" w="9525">
+                <a14:hiddenLine xmlns:p14="http://schemas.microsoft.com/office/powerpoint/2010/main" xmlns:a14="http://schemas.microsoft.com/office/drawing/2010/main" xmlns:a16="http://schemas.microsoft.com/office/drawing/2014/main" xmlns="" w="9525">
                   <a:solidFill>
                     <a:srgbClr val="000000"/>
                   </a:solidFill>
@@ -40288,6 +41044,13 @@
               </a:ext>
             </a:extLst>
           </p:spPr>
+          <p:txBody>
+            <a:bodyPr/>
+            <a:lstStyle/>
+            <a:p>
+              <a:endParaRPr lang="en-US"/>
+            </a:p>
+          </p:txBody>
         </p:sp>
         <p:sp>
           <p:nvSpPr>
@@ -40382,7 +41145,7 @@
             </a:ln>
             <a:extLst>
               <a:ext uri="{91240B29-F687-4f45-9708-019B960494DF}">
-                <a14:hiddenLine xmlns="" xmlns:a16="http://schemas.microsoft.com/office/drawing/2014/main" xmlns:a14="http://schemas.microsoft.com/office/drawing/2010/main" xmlns:p14="http://schemas.microsoft.com/office/powerpoint/2010/main" w="9525">
+                <a14:hiddenLine xmlns:p14="http://schemas.microsoft.com/office/powerpoint/2010/main" xmlns:a14="http://schemas.microsoft.com/office/drawing/2010/main" xmlns:a16="http://schemas.microsoft.com/office/drawing/2014/main" xmlns="" w="9525">
                   <a:solidFill>
                     <a:srgbClr val="000000"/>
                   </a:solidFill>
@@ -40393,6 +41156,13 @@
               </a:ext>
             </a:extLst>
           </p:spPr>
+          <p:txBody>
+            <a:bodyPr/>
+            <a:lstStyle/>
+            <a:p>
+              <a:endParaRPr lang="en-US"/>
+            </a:p>
+          </p:txBody>
         </p:sp>
         <p:sp>
           <p:nvSpPr>
@@ -40459,7 +41229,7 @@
             </a:ln>
             <a:extLst>
               <a:ext uri="{91240B29-F687-4f45-9708-019B960494DF}">
-                <a14:hiddenLine xmlns="" xmlns:a16="http://schemas.microsoft.com/office/drawing/2014/main" xmlns:a14="http://schemas.microsoft.com/office/drawing/2010/main" xmlns:p14="http://schemas.microsoft.com/office/powerpoint/2010/main" w="9525">
+                <a14:hiddenLine xmlns:p14="http://schemas.microsoft.com/office/powerpoint/2010/main" xmlns:a14="http://schemas.microsoft.com/office/drawing/2010/main" xmlns:a16="http://schemas.microsoft.com/office/drawing/2014/main" xmlns="" w="9525">
                   <a:solidFill>
                     <a:srgbClr val="000000"/>
                   </a:solidFill>
@@ -40470,6 +41240,13 @@
               </a:ext>
             </a:extLst>
           </p:spPr>
+          <p:txBody>
+            <a:bodyPr/>
+            <a:lstStyle/>
+            <a:p>
+              <a:endParaRPr lang="en-US"/>
+            </a:p>
+          </p:txBody>
         </p:sp>
         <p:sp>
           <p:nvSpPr>
@@ -40564,7 +41341,7 @@
             </a:ln>
             <a:extLst>
               <a:ext uri="{91240B29-F687-4f45-9708-019B960494DF}">
-                <a14:hiddenLine xmlns="" xmlns:a16="http://schemas.microsoft.com/office/drawing/2014/main" xmlns:a14="http://schemas.microsoft.com/office/drawing/2010/main" xmlns:p14="http://schemas.microsoft.com/office/powerpoint/2010/main" w="9525">
+                <a14:hiddenLine xmlns:p14="http://schemas.microsoft.com/office/powerpoint/2010/main" xmlns:a14="http://schemas.microsoft.com/office/drawing/2010/main" xmlns:a16="http://schemas.microsoft.com/office/drawing/2014/main" xmlns="" w="9525">
                   <a:solidFill>
                     <a:srgbClr val="000000"/>
                   </a:solidFill>
@@ -40575,6 +41352,13 @@
               </a:ext>
             </a:extLst>
           </p:spPr>
+          <p:txBody>
+            <a:bodyPr/>
+            <a:lstStyle/>
+            <a:p>
+              <a:endParaRPr lang="en-US"/>
+            </a:p>
+          </p:txBody>
         </p:sp>
         <p:sp>
           <p:nvSpPr>
@@ -40641,7 +41425,7 @@
             </a:ln>
             <a:extLst>
               <a:ext uri="{91240B29-F687-4f45-9708-019B960494DF}">
-                <a14:hiddenLine xmlns="" xmlns:a16="http://schemas.microsoft.com/office/drawing/2014/main" xmlns:a14="http://schemas.microsoft.com/office/drawing/2010/main" xmlns:p14="http://schemas.microsoft.com/office/powerpoint/2010/main" w="9525">
+                <a14:hiddenLine xmlns:p14="http://schemas.microsoft.com/office/powerpoint/2010/main" xmlns:a14="http://schemas.microsoft.com/office/drawing/2010/main" xmlns:a16="http://schemas.microsoft.com/office/drawing/2014/main" xmlns="" w="9525">
                   <a:solidFill>
                     <a:srgbClr val="000000"/>
                   </a:solidFill>
@@ -40652,6 +41436,13 @@
               </a:ext>
             </a:extLst>
           </p:spPr>
+          <p:txBody>
+            <a:bodyPr/>
+            <a:lstStyle/>
+            <a:p>
+              <a:endParaRPr lang="en-US"/>
+            </a:p>
+          </p:txBody>
         </p:sp>
         <p:sp>
           <p:nvSpPr>
@@ -40746,7 +41537,7 @@
             </a:ln>
             <a:extLst>
               <a:ext uri="{91240B29-F687-4f45-9708-019B960494DF}">
-                <a14:hiddenLine xmlns="" xmlns:a16="http://schemas.microsoft.com/office/drawing/2014/main" xmlns:a14="http://schemas.microsoft.com/office/drawing/2010/main" xmlns:p14="http://schemas.microsoft.com/office/powerpoint/2010/main" w="9525">
+                <a14:hiddenLine xmlns:p14="http://schemas.microsoft.com/office/powerpoint/2010/main" xmlns:a14="http://schemas.microsoft.com/office/drawing/2010/main" xmlns:a16="http://schemas.microsoft.com/office/drawing/2014/main" xmlns="" w="9525">
                   <a:solidFill>
                     <a:srgbClr val="000000"/>
                   </a:solidFill>
@@ -40757,6 +41548,13 @@
               </a:ext>
             </a:extLst>
           </p:spPr>
+          <p:txBody>
+            <a:bodyPr/>
+            <a:lstStyle/>
+            <a:p>
+              <a:endParaRPr lang="en-US"/>
+            </a:p>
+          </p:txBody>
         </p:sp>
         <p:sp>
           <p:nvSpPr>
@@ -40795,7 +41593,7 @@
             </a:ln>
             <a:extLst>
               <a:ext uri="{91240B29-F687-4f45-9708-019B960494DF}">
-                <a14:hiddenLine xmlns="" xmlns:a16="http://schemas.microsoft.com/office/drawing/2014/main" xmlns:a14="http://schemas.microsoft.com/office/drawing/2010/main" xmlns:p14="http://schemas.microsoft.com/office/powerpoint/2010/main" w="9525">
+                <a14:hiddenLine xmlns:p14="http://schemas.microsoft.com/office/powerpoint/2010/main" xmlns:a14="http://schemas.microsoft.com/office/drawing/2010/main" xmlns:a16="http://schemas.microsoft.com/office/drawing/2014/main" xmlns="" w="9525">
                   <a:solidFill>
                     <a:srgbClr val="000000"/>
                   </a:solidFill>
@@ -40806,6 +41604,13 @@
               </a:ext>
             </a:extLst>
           </p:spPr>
+          <p:txBody>
+            <a:bodyPr/>
+            <a:lstStyle/>
+            <a:p>
+              <a:endParaRPr lang="en-US"/>
+            </a:p>
+          </p:txBody>
         </p:sp>
         <p:sp>
           <p:nvSpPr>
@@ -40875,7 +41680,7 @@
             </a:ln>
             <a:extLst>
               <a:ext uri="{91240B29-F687-4f45-9708-019B960494DF}">
-                <a14:hiddenLine xmlns="" xmlns:a16="http://schemas.microsoft.com/office/drawing/2014/main" xmlns:a14="http://schemas.microsoft.com/office/drawing/2010/main" xmlns:p14="http://schemas.microsoft.com/office/powerpoint/2010/main" w="9525">
+                <a14:hiddenLine xmlns:p14="http://schemas.microsoft.com/office/powerpoint/2010/main" xmlns:a14="http://schemas.microsoft.com/office/drawing/2010/main" xmlns:a16="http://schemas.microsoft.com/office/drawing/2014/main" xmlns="" w="9525">
                   <a:solidFill>
                     <a:srgbClr val="000000"/>
                   </a:solidFill>
@@ -40886,6 +41691,13 @@
               </a:ext>
             </a:extLst>
           </p:spPr>
+          <p:txBody>
+            <a:bodyPr/>
+            <a:lstStyle/>
+            <a:p>
+              <a:endParaRPr lang="en-US"/>
+            </a:p>
+          </p:txBody>
         </p:sp>
         <p:sp>
           <p:nvSpPr>
@@ -40980,7 +41792,7 @@
             </a:ln>
             <a:extLst>
               <a:ext uri="{91240B29-F687-4f45-9708-019B960494DF}">
-                <a14:hiddenLine xmlns="" xmlns:a16="http://schemas.microsoft.com/office/drawing/2014/main" xmlns:a14="http://schemas.microsoft.com/office/drawing/2010/main" xmlns:p14="http://schemas.microsoft.com/office/powerpoint/2010/main" w="9525">
+                <a14:hiddenLine xmlns:p14="http://schemas.microsoft.com/office/powerpoint/2010/main" xmlns:a14="http://schemas.microsoft.com/office/drawing/2010/main" xmlns:a16="http://schemas.microsoft.com/office/drawing/2014/main" xmlns="" w="9525">
                   <a:solidFill>
                     <a:srgbClr val="000000"/>
                   </a:solidFill>
@@ -40991,6 +41803,13 @@
               </a:ext>
             </a:extLst>
           </p:spPr>
+          <p:txBody>
+            <a:bodyPr/>
+            <a:lstStyle/>
+            <a:p>
+              <a:endParaRPr lang="en-US"/>
+            </a:p>
+          </p:txBody>
         </p:sp>
         <p:sp>
           <p:nvSpPr>
@@ -41057,7 +41876,7 @@
             </a:ln>
             <a:extLst>
               <a:ext uri="{91240B29-F687-4f45-9708-019B960494DF}">
-                <a14:hiddenLine xmlns="" xmlns:a16="http://schemas.microsoft.com/office/drawing/2014/main" xmlns:a14="http://schemas.microsoft.com/office/drawing/2010/main" xmlns:p14="http://schemas.microsoft.com/office/powerpoint/2010/main" w="9525">
+                <a14:hiddenLine xmlns:p14="http://schemas.microsoft.com/office/powerpoint/2010/main" xmlns:a14="http://schemas.microsoft.com/office/drawing/2010/main" xmlns:a16="http://schemas.microsoft.com/office/drawing/2014/main" xmlns="" w="9525">
                   <a:solidFill>
                     <a:srgbClr val="000000"/>
                   </a:solidFill>
@@ -41068,6 +41887,13 @@
               </a:ext>
             </a:extLst>
           </p:spPr>
+          <p:txBody>
+            <a:bodyPr/>
+            <a:lstStyle/>
+            <a:p>
+              <a:endParaRPr lang="en-US"/>
+            </a:p>
+          </p:txBody>
         </p:sp>
         <p:sp>
           <p:nvSpPr>
@@ -41162,7 +41988,7 @@
             </a:ln>
             <a:extLst>
               <a:ext uri="{91240B29-F687-4f45-9708-019B960494DF}">
-                <a14:hiddenLine xmlns="" xmlns:a16="http://schemas.microsoft.com/office/drawing/2014/main" xmlns:a14="http://schemas.microsoft.com/office/drawing/2010/main" xmlns:p14="http://schemas.microsoft.com/office/powerpoint/2010/main" w="9525">
+                <a14:hiddenLine xmlns:p14="http://schemas.microsoft.com/office/powerpoint/2010/main" xmlns:a14="http://schemas.microsoft.com/office/drawing/2010/main" xmlns:a16="http://schemas.microsoft.com/office/drawing/2014/main" xmlns="" w="9525">
                   <a:solidFill>
                     <a:srgbClr val="000000"/>
                   </a:solidFill>
@@ -41173,6 +41999,13 @@
               </a:ext>
             </a:extLst>
           </p:spPr>
+          <p:txBody>
+            <a:bodyPr/>
+            <a:lstStyle/>
+            <a:p>
+              <a:endParaRPr lang="en-US"/>
+            </a:p>
+          </p:txBody>
         </p:sp>
         <p:sp>
           <p:nvSpPr>
@@ -41267,7 +42100,7 @@
             </a:ln>
             <a:extLst>
               <a:ext uri="{91240B29-F687-4f45-9708-019B960494DF}">
-                <a14:hiddenLine xmlns="" xmlns:a16="http://schemas.microsoft.com/office/drawing/2014/main" xmlns:a14="http://schemas.microsoft.com/office/drawing/2010/main" xmlns:p14="http://schemas.microsoft.com/office/powerpoint/2010/main" w="9525">
+                <a14:hiddenLine xmlns:p14="http://schemas.microsoft.com/office/powerpoint/2010/main" xmlns:a14="http://schemas.microsoft.com/office/drawing/2010/main" xmlns:a16="http://schemas.microsoft.com/office/drawing/2014/main" xmlns="" w="9525">
                   <a:solidFill>
                     <a:srgbClr val="000000"/>
                   </a:solidFill>
@@ -41278,6 +42111,13 @@
               </a:ext>
             </a:extLst>
           </p:spPr>
+          <p:txBody>
+            <a:bodyPr/>
+            <a:lstStyle/>
+            <a:p>
+              <a:endParaRPr lang="en-US"/>
+            </a:p>
+          </p:txBody>
         </p:sp>
         <p:sp>
           <p:nvSpPr>
@@ -41347,7 +42187,7 @@
             </a:ln>
             <a:extLst>
               <a:ext uri="{91240B29-F687-4f45-9708-019B960494DF}">
-                <a14:hiddenLine xmlns="" xmlns:a16="http://schemas.microsoft.com/office/drawing/2014/main" xmlns:a14="http://schemas.microsoft.com/office/drawing/2010/main" xmlns:p14="http://schemas.microsoft.com/office/powerpoint/2010/main" w="9525">
+                <a14:hiddenLine xmlns:p14="http://schemas.microsoft.com/office/powerpoint/2010/main" xmlns:a14="http://schemas.microsoft.com/office/drawing/2010/main" xmlns:a16="http://schemas.microsoft.com/office/drawing/2014/main" xmlns="" w="9525">
                   <a:solidFill>
                     <a:srgbClr val="000000"/>
                   </a:solidFill>
@@ -41358,6 +42198,13 @@
               </a:ext>
             </a:extLst>
           </p:spPr>
+          <p:txBody>
+            <a:bodyPr/>
+            <a:lstStyle/>
+            <a:p>
+              <a:endParaRPr lang="en-US"/>
+            </a:p>
+          </p:txBody>
         </p:sp>
         <p:sp>
           <p:nvSpPr>
@@ -41424,7 +42271,7 @@
             </a:ln>
             <a:extLst>
               <a:ext uri="{91240B29-F687-4f45-9708-019B960494DF}">
-                <a14:hiddenLine xmlns="" xmlns:a16="http://schemas.microsoft.com/office/drawing/2014/main" xmlns:a14="http://schemas.microsoft.com/office/drawing/2010/main" xmlns:p14="http://schemas.microsoft.com/office/powerpoint/2010/main" w="9525">
+                <a14:hiddenLine xmlns:p14="http://schemas.microsoft.com/office/powerpoint/2010/main" xmlns:a14="http://schemas.microsoft.com/office/drawing/2010/main" xmlns:a16="http://schemas.microsoft.com/office/drawing/2014/main" xmlns="" w="9525">
                   <a:solidFill>
                     <a:srgbClr val="000000"/>
                   </a:solidFill>
@@ -41435,6 +42282,13 @@
               </a:ext>
             </a:extLst>
           </p:spPr>
+          <p:txBody>
+            <a:bodyPr/>
+            <a:lstStyle/>
+            <a:p>
+              <a:endParaRPr lang="en-US"/>
+            </a:p>
+          </p:txBody>
         </p:sp>
         <p:sp>
           <p:nvSpPr>
@@ -41529,7 +42383,7 @@
             </a:ln>
             <a:extLst>
               <a:ext uri="{91240B29-F687-4f45-9708-019B960494DF}">
-                <a14:hiddenLine xmlns="" xmlns:a16="http://schemas.microsoft.com/office/drawing/2014/main" xmlns:a14="http://schemas.microsoft.com/office/drawing/2010/main" xmlns:p14="http://schemas.microsoft.com/office/powerpoint/2010/main" w="9525">
+                <a14:hiddenLine xmlns:p14="http://schemas.microsoft.com/office/powerpoint/2010/main" xmlns:a14="http://schemas.microsoft.com/office/drawing/2010/main" xmlns:a16="http://schemas.microsoft.com/office/drawing/2014/main" xmlns="" w="9525">
                   <a:solidFill>
                     <a:srgbClr val="000000"/>
                   </a:solidFill>
@@ -41540,6 +42394,13 @@
               </a:ext>
             </a:extLst>
           </p:spPr>
+          <p:txBody>
+            <a:bodyPr/>
+            <a:lstStyle/>
+            <a:p>
+              <a:endParaRPr lang="en-US"/>
+            </a:p>
+          </p:txBody>
         </p:sp>
         <p:sp>
           <p:nvSpPr>
@@ -41634,7 +42495,7 @@
             </a:ln>
             <a:extLst>
               <a:ext uri="{91240B29-F687-4f45-9708-019B960494DF}">
-                <a14:hiddenLine xmlns="" xmlns:a16="http://schemas.microsoft.com/office/drawing/2014/main" xmlns:a14="http://schemas.microsoft.com/office/drawing/2010/main" xmlns:p14="http://schemas.microsoft.com/office/powerpoint/2010/main" w="9525">
+                <a14:hiddenLine xmlns:p14="http://schemas.microsoft.com/office/powerpoint/2010/main" xmlns:a14="http://schemas.microsoft.com/office/drawing/2010/main" xmlns:a16="http://schemas.microsoft.com/office/drawing/2014/main" xmlns="" w="9525">
                   <a:solidFill>
                     <a:srgbClr val="000000"/>
                   </a:solidFill>
@@ -41645,6 +42506,13 @@
               </a:ext>
             </a:extLst>
           </p:spPr>
+          <p:txBody>
+            <a:bodyPr/>
+            <a:lstStyle/>
+            <a:p>
+              <a:endParaRPr lang="en-US"/>
+            </a:p>
+          </p:txBody>
         </p:sp>
         <p:sp>
           <p:nvSpPr>
@@ -41711,7 +42579,7 @@
             </a:ln>
             <a:extLst>
               <a:ext uri="{91240B29-F687-4f45-9708-019B960494DF}">
-                <a14:hiddenLine xmlns="" xmlns:a16="http://schemas.microsoft.com/office/drawing/2014/main" xmlns:a14="http://schemas.microsoft.com/office/drawing/2010/main" xmlns:p14="http://schemas.microsoft.com/office/powerpoint/2010/main" w="9525">
+                <a14:hiddenLine xmlns:p14="http://schemas.microsoft.com/office/powerpoint/2010/main" xmlns:a14="http://schemas.microsoft.com/office/drawing/2010/main" xmlns:a16="http://schemas.microsoft.com/office/drawing/2014/main" xmlns="" w="9525">
                   <a:solidFill>
                     <a:srgbClr val="000000"/>
                   </a:solidFill>
@@ -41722,6 +42590,13 @@
               </a:ext>
             </a:extLst>
           </p:spPr>
+          <p:txBody>
+            <a:bodyPr/>
+            <a:lstStyle/>
+            <a:p>
+              <a:endParaRPr lang="en-US"/>
+            </a:p>
+          </p:txBody>
         </p:sp>
         <p:sp>
           <p:nvSpPr>
@@ -41846,7 +42721,7 @@
             </a:ln>
             <a:extLst>
               <a:ext uri="{91240B29-F687-4f45-9708-019B960494DF}">
-                <a14:hiddenLine xmlns="" xmlns:a16="http://schemas.microsoft.com/office/drawing/2014/main" xmlns:a14="http://schemas.microsoft.com/office/drawing/2010/main" xmlns:p14="http://schemas.microsoft.com/office/powerpoint/2010/main" w="9525">
+                <a14:hiddenLine xmlns:p14="http://schemas.microsoft.com/office/powerpoint/2010/main" xmlns:a14="http://schemas.microsoft.com/office/drawing/2010/main" xmlns:a16="http://schemas.microsoft.com/office/drawing/2014/main" xmlns="" w="9525">
                   <a:solidFill>
                     <a:srgbClr val="000000"/>
                   </a:solidFill>
@@ -41857,6 +42732,13 @@
               </a:ext>
             </a:extLst>
           </p:spPr>
+          <p:txBody>
+            <a:bodyPr/>
+            <a:lstStyle/>
+            <a:p>
+              <a:endParaRPr lang="en-US"/>
+            </a:p>
+          </p:txBody>
         </p:sp>
         <p:sp>
           <p:nvSpPr>
@@ -41929,7 +42811,7 @@
             </a:ln>
             <a:extLst>
               <a:ext uri="{91240B29-F687-4f45-9708-019B960494DF}">
-                <a14:hiddenLine xmlns="" xmlns:a16="http://schemas.microsoft.com/office/drawing/2014/main" xmlns:a14="http://schemas.microsoft.com/office/drawing/2010/main" xmlns:p14="http://schemas.microsoft.com/office/powerpoint/2010/main" w="9525">
+                <a14:hiddenLine xmlns:p14="http://schemas.microsoft.com/office/powerpoint/2010/main" xmlns:a14="http://schemas.microsoft.com/office/drawing/2010/main" xmlns:a16="http://schemas.microsoft.com/office/drawing/2014/main" xmlns="" w="9525">
                   <a:solidFill>
                     <a:srgbClr val="000000"/>
                   </a:solidFill>
@@ -41940,6 +42822,13 @@
               </a:ext>
             </a:extLst>
           </p:spPr>
+          <p:txBody>
+            <a:bodyPr/>
+            <a:lstStyle/>
+            <a:p>
+              <a:endParaRPr lang="en-US"/>
+            </a:p>
+          </p:txBody>
         </p:sp>
         <p:sp>
           <p:nvSpPr>
@@ -42034,7 +42923,7 @@
             </a:ln>
             <a:extLst>
               <a:ext uri="{91240B29-F687-4f45-9708-019B960494DF}">
-                <a14:hiddenLine xmlns="" xmlns:a16="http://schemas.microsoft.com/office/drawing/2014/main" xmlns:a14="http://schemas.microsoft.com/office/drawing/2010/main" xmlns:p14="http://schemas.microsoft.com/office/powerpoint/2010/main" w="9525">
+                <a14:hiddenLine xmlns:p14="http://schemas.microsoft.com/office/powerpoint/2010/main" xmlns:a14="http://schemas.microsoft.com/office/drawing/2010/main" xmlns:a16="http://schemas.microsoft.com/office/drawing/2014/main" xmlns="" w="9525">
                   <a:solidFill>
                     <a:srgbClr val="000000"/>
                   </a:solidFill>
@@ -42045,6 +42934,13 @@
               </a:ext>
             </a:extLst>
           </p:spPr>
+          <p:txBody>
+            <a:bodyPr/>
+            <a:lstStyle/>
+            <a:p>
+              <a:endParaRPr lang="en-US"/>
+            </a:p>
+          </p:txBody>
         </p:sp>
       </p:grpSp>
       <p:grpSp>
@@ -42191,7 +43087,7 @@
             <a:noFill/>
             <a:extLst>
               <a:ext uri="{909E8E84-426E-40dd-AFC4-6F175D3DCCD1}">
-                <a14:hiddenFill xmlns="" xmlns:a16="http://schemas.microsoft.com/office/drawing/2014/main" xmlns:a14="http://schemas.microsoft.com/office/drawing/2010/main" xmlns:p14="http://schemas.microsoft.com/office/powerpoint/2010/main">
+                <a14:hiddenFill xmlns:p14="http://schemas.microsoft.com/office/powerpoint/2010/main" xmlns:a14="http://schemas.microsoft.com/office/drawing/2010/main" xmlns:a16="http://schemas.microsoft.com/office/drawing/2014/main" xmlns="">
                   <a:solidFill>
                     <a:srgbClr val="FFFFFF"/>
                   </a:solidFill>
@@ -42461,6 +43357,13 @@
                 </a:outerShdw>
               </a:effectLst>
             </p:spPr>
+            <p:txBody>
+              <a:bodyPr/>
+              <a:lstStyle/>
+              <a:p>
+                <a:endParaRPr lang="en-US"/>
+              </a:p>
+            </p:txBody>
           </p:sp>
           <p:sp>
             <p:nvSpPr>
@@ -42590,6 +43493,13 @@
                 </a:outerShdw>
               </a:effectLst>
             </p:spPr>
+            <p:txBody>
+              <a:bodyPr/>
+              <a:lstStyle/>
+              <a:p>
+                <a:endParaRPr lang="en-US"/>
+              </a:p>
+            </p:txBody>
           </p:sp>
           <p:sp>
             <p:nvSpPr>
@@ -42694,6 +43604,13 @@
                 </a:outerShdw>
               </a:effectLst>
             </p:spPr>
+            <p:txBody>
+              <a:bodyPr/>
+              <a:lstStyle/>
+              <a:p>
+                <a:endParaRPr lang="en-US"/>
+              </a:p>
+            </p:txBody>
           </p:sp>
           <p:sp>
             <p:nvSpPr>
@@ -42776,6 +43693,13 @@
                 </a:outerShdw>
               </a:effectLst>
             </p:spPr>
+            <p:txBody>
+              <a:bodyPr/>
+              <a:lstStyle/>
+              <a:p>
+                <a:endParaRPr lang="en-US"/>
+              </a:p>
+            </p:txBody>
           </p:sp>
           <p:sp>
             <p:nvSpPr>
@@ -42855,6 +43779,13 @@
                 </a:outerShdw>
               </a:effectLst>
             </p:spPr>
+            <p:txBody>
+              <a:bodyPr/>
+              <a:lstStyle/>
+              <a:p>
+                <a:endParaRPr lang="en-US"/>
+              </a:p>
+            </p:txBody>
           </p:sp>
           <p:sp>
             <p:nvSpPr>
@@ -42959,6 +43890,13 @@
                 </a:outerShdw>
               </a:effectLst>
             </p:spPr>
+            <p:txBody>
+              <a:bodyPr/>
+              <a:lstStyle/>
+              <a:p>
+                <a:endParaRPr lang="en-US"/>
+              </a:p>
+            </p:txBody>
           </p:sp>
           <p:sp>
             <p:nvSpPr>
@@ -43063,6 +44001,13 @@
                 </a:outerShdw>
               </a:effectLst>
             </p:spPr>
+            <p:txBody>
+              <a:bodyPr/>
+              <a:lstStyle/>
+              <a:p>
+                <a:endParaRPr lang="en-US"/>
+              </a:p>
+            </p:txBody>
           </p:sp>
           <p:sp>
             <p:nvSpPr>
@@ -43145,6 +44090,13 @@
                 </a:outerShdw>
               </a:effectLst>
             </p:spPr>
+            <p:txBody>
+              <a:bodyPr/>
+              <a:lstStyle/>
+              <a:p>
+                <a:endParaRPr lang="en-US"/>
+              </a:p>
+            </p:txBody>
           </p:sp>
           <p:sp>
             <p:nvSpPr>
@@ -43249,6 +44201,13 @@
                 </a:outerShdw>
               </a:effectLst>
             </p:spPr>
+            <p:txBody>
+              <a:bodyPr/>
+              <a:lstStyle/>
+              <a:p>
+                <a:endParaRPr lang="en-US"/>
+              </a:p>
+            </p:txBody>
           </p:sp>
           <p:sp>
             <p:nvSpPr>
@@ -43297,6 +44256,13 @@
                 </a:outerShdw>
               </a:effectLst>
             </p:spPr>
+            <p:txBody>
+              <a:bodyPr/>
+              <a:lstStyle/>
+              <a:p>
+                <a:endParaRPr lang="en-US"/>
+              </a:p>
+            </p:txBody>
           </p:sp>
           <p:sp>
             <p:nvSpPr>
@@ -43376,6 +44342,13 @@
                 </a:outerShdw>
               </a:effectLst>
             </p:spPr>
+            <p:txBody>
+              <a:bodyPr/>
+              <a:lstStyle/>
+              <a:p>
+                <a:endParaRPr lang="en-US"/>
+              </a:p>
+            </p:txBody>
           </p:sp>
           <p:sp>
             <p:nvSpPr>
@@ -43505,6 +44478,13 @@
                 </a:outerShdw>
               </a:effectLst>
             </p:spPr>
+            <p:txBody>
+              <a:bodyPr/>
+              <a:lstStyle/>
+              <a:p>
+                <a:endParaRPr lang="en-US"/>
+              </a:p>
+            </p:txBody>
           </p:sp>
           <p:sp>
             <p:nvSpPr>
@@ -43609,6 +44589,13 @@
                 </a:outerShdw>
               </a:effectLst>
             </p:spPr>
+            <p:txBody>
+              <a:bodyPr/>
+              <a:lstStyle/>
+              <a:p>
+                <a:endParaRPr lang="en-US"/>
+              </a:p>
+            </p:txBody>
           </p:sp>
           <p:sp>
             <p:nvSpPr>
@@ -43691,6 +44678,13 @@
                 </a:outerShdw>
               </a:effectLst>
             </p:spPr>
+            <p:txBody>
+              <a:bodyPr/>
+              <a:lstStyle/>
+              <a:p>
+                <a:endParaRPr lang="en-US"/>
+              </a:p>
+            </p:txBody>
           </p:sp>
           <p:sp>
             <p:nvSpPr>
@@ -43770,6 +44764,13 @@
                 </a:outerShdw>
               </a:effectLst>
             </p:spPr>
+            <p:txBody>
+              <a:bodyPr/>
+              <a:lstStyle/>
+              <a:p>
+                <a:endParaRPr lang="en-US"/>
+              </a:p>
+            </p:txBody>
           </p:sp>
           <p:sp>
             <p:nvSpPr>
@@ -43874,6 +44875,13 @@
                 </a:outerShdw>
               </a:effectLst>
             </p:spPr>
+            <p:txBody>
+              <a:bodyPr/>
+              <a:lstStyle/>
+              <a:p>
+                <a:endParaRPr lang="en-US"/>
+              </a:p>
+            </p:txBody>
           </p:sp>
           <p:sp>
             <p:nvSpPr>
@@ -43978,6 +44986,13 @@
                 </a:outerShdw>
               </a:effectLst>
             </p:spPr>
+            <p:txBody>
+              <a:bodyPr/>
+              <a:lstStyle/>
+              <a:p>
+                <a:endParaRPr lang="en-US"/>
+              </a:p>
+            </p:txBody>
           </p:sp>
           <p:sp>
             <p:nvSpPr>
@@ -44060,6 +45075,13 @@
                 </a:outerShdw>
               </a:effectLst>
             </p:spPr>
+            <p:txBody>
+              <a:bodyPr/>
+              <a:lstStyle/>
+              <a:p>
+                <a:endParaRPr lang="en-US"/>
+              </a:p>
+            </p:txBody>
           </p:sp>
           <p:sp>
             <p:nvSpPr>
@@ -44164,6 +45186,13 @@
                 </a:outerShdw>
               </a:effectLst>
             </p:spPr>
+            <p:txBody>
+              <a:bodyPr/>
+              <a:lstStyle/>
+              <a:p>
+                <a:endParaRPr lang="en-US"/>
+              </a:p>
+            </p:txBody>
           </p:sp>
           <p:sp>
             <p:nvSpPr>
@@ -44212,6 +45241,13 @@
                 </a:outerShdw>
               </a:effectLst>
             </p:spPr>
+            <p:txBody>
+              <a:bodyPr/>
+              <a:lstStyle/>
+              <a:p>
+                <a:endParaRPr lang="en-US"/>
+              </a:p>
+            </p:txBody>
           </p:sp>
         </p:grpSp>
       </p:grpSp>

</xml_diff>

<commit_message>
Spelling error, left/right swap on the loom slide.
</commit_message>
<xml_diff>
--- a/ProgrammingMB.pptx
+++ b/ProgrammingMB.pptx
@@ -1151,7 +1151,7 @@
           <a:p>
             <a:fld id="{2F09888F-BA9C-4D6F-A4EF-C2140F0FB5B5}" type="datetimeFigureOut">
               <a:rPr lang="en-US" smtClean="0"/>
-              <a:t>7/10/2024</a:t>
+              <a:t>7/23/2024</a:t>
             </a:fld>
             <a:endParaRPr lang="en-US"/>
           </a:p>
@@ -2521,7 +2521,7 @@
           <a:noFill/>
           <a:extLst>
             <a:ext uri="{909E8E84-426E-40dd-AFC4-6F175D3DCCD1}">
-              <a14:hiddenFill xmlns="" xmlns:a14="http://schemas.microsoft.com/office/drawing/2010/main">
+              <a14:hiddenFill xmlns:a14="http://schemas.microsoft.com/office/drawing/2010/main" xmlns="">
                 <a:solidFill>
                   <a:srgbClr val="FFFFFF"/>
                 </a:solidFill>
@@ -2580,7 +2580,7 @@
             </a:ln>
             <a:extLst>
               <a:ext uri="{91240B29-F687-4f45-9708-019B960494DF}">
-                <a14:hiddenLine xmlns="" xmlns:a14="http://schemas.microsoft.com/office/drawing/2010/main" w="9525">
+                <a14:hiddenLine xmlns:a14="http://schemas.microsoft.com/office/drawing/2010/main" xmlns="" w="9525">
                   <a:solidFill>
                     <a:srgbClr val="000000"/>
                   </a:solidFill>
@@ -2670,7 +2670,7 @@
             </a:ln>
             <a:extLst>
               <a:ext uri="{91240B29-F687-4f45-9708-019B960494DF}">
-                <a14:hiddenLine xmlns="" xmlns:a14="http://schemas.microsoft.com/office/drawing/2010/main" w="9525">
+                <a14:hiddenLine xmlns:a14="http://schemas.microsoft.com/office/drawing/2010/main" xmlns="" w="9525">
                   <a:solidFill>
                     <a:srgbClr val="000000"/>
                   </a:solidFill>
@@ -2760,7 +2760,7 @@
             </a:ln>
             <a:extLst>
               <a:ext uri="{91240B29-F687-4f45-9708-019B960494DF}">
-                <a14:hiddenLine xmlns="" xmlns:a14="http://schemas.microsoft.com/office/drawing/2010/main" w="9525">
+                <a14:hiddenLine xmlns:a14="http://schemas.microsoft.com/office/drawing/2010/main" xmlns="" w="9525">
                   <a:solidFill>
                     <a:srgbClr val="000000"/>
                   </a:solidFill>
@@ -2794,7 +2794,7 @@
             </a:ln>
             <a:extLst>
               <a:ext uri="{91240B29-F687-4f45-9708-019B960494DF}">
-                <a14:hiddenLine xmlns="" xmlns:a14="http://schemas.microsoft.com/office/drawing/2010/main" w="9525">
+                <a14:hiddenLine xmlns:a14="http://schemas.microsoft.com/office/drawing/2010/main" xmlns="" w="9525">
                   <a:solidFill>
                     <a:srgbClr val="000000"/>
                   </a:solidFill>
@@ -2884,7 +2884,7 @@
             </a:ln>
             <a:extLst>
               <a:ext uri="{91240B29-F687-4f45-9708-019B960494DF}">
-                <a14:hiddenLine xmlns="" xmlns:a14="http://schemas.microsoft.com/office/drawing/2010/main" w="9525">
+                <a14:hiddenLine xmlns:a14="http://schemas.microsoft.com/office/drawing/2010/main" xmlns="" w="9525">
                   <a:solidFill>
                     <a:srgbClr val="000000"/>
                   </a:solidFill>
@@ -2946,7 +2946,7 @@
             </a:ln>
             <a:extLst>
               <a:ext uri="{91240B29-F687-4f45-9708-019B960494DF}">
-                <a14:hiddenLine xmlns="" xmlns:a14="http://schemas.microsoft.com/office/drawing/2010/main" w="9525">
+                <a14:hiddenLine xmlns:a14="http://schemas.microsoft.com/office/drawing/2010/main" xmlns="" w="9525">
                   <a:solidFill>
                     <a:srgbClr val="000000"/>
                   </a:solidFill>
@@ -3008,7 +3008,7 @@
             </a:ln>
             <a:extLst>
               <a:ext uri="{91240B29-F687-4f45-9708-019B960494DF}">
-                <a14:hiddenLine xmlns="" xmlns:a14="http://schemas.microsoft.com/office/drawing/2010/main" w="9525">
+                <a14:hiddenLine xmlns:a14="http://schemas.microsoft.com/office/drawing/2010/main" xmlns="" w="9525">
                   <a:solidFill>
                     <a:srgbClr val="000000"/>
                   </a:solidFill>
@@ -3098,7 +3098,7 @@
             </a:ln>
             <a:extLst>
               <a:ext uri="{91240B29-F687-4f45-9708-019B960494DF}">
-                <a14:hiddenLine xmlns="" xmlns:a14="http://schemas.microsoft.com/office/drawing/2010/main" w="9525">
+                <a14:hiddenLine xmlns:a14="http://schemas.microsoft.com/office/drawing/2010/main" xmlns="" w="9525">
                   <a:solidFill>
                     <a:srgbClr val="000000"/>
                   </a:solidFill>
@@ -3160,7 +3160,7 @@
             </a:ln>
             <a:extLst>
               <a:ext uri="{91240B29-F687-4f45-9708-019B960494DF}">
-                <a14:hiddenLine xmlns="" xmlns:a14="http://schemas.microsoft.com/office/drawing/2010/main" w="9525">
+                <a14:hiddenLine xmlns:a14="http://schemas.microsoft.com/office/drawing/2010/main" xmlns="" w="9525">
                   <a:solidFill>
                     <a:srgbClr val="000000"/>
                   </a:solidFill>
@@ -3222,7 +3222,7 @@
             </a:ln>
             <a:extLst>
               <a:ext uri="{91240B29-F687-4f45-9708-019B960494DF}">
-                <a14:hiddenLine xmlns="" xmlns:a14="http://schemas.microsoft.com/office/drawing/2010/main" w="9525">
+                <a14:hiddenLine xmlns:a14="http://schemas.microsoft.com/office/drawing/2010/main" xmlns="" w="9525">
                   <a:solidFill>
                     <a:srgbClr val="000000"/>
                   </a:solidFill>
@@ -3312,7 +3312,7 @@
             </a:ln>
             <a:extLst>
               <a:ext uri="{91240B29-F687-4f45-9708-019B960494DF}">
-                <a14:hiddenLine xmlns="" xmlns:a14="http://schemas.microsoft.com/office/drawing/2010/main" w="9525">
+                <a14:hiddenLine xmlns:a14="http://schemas.microsoft.com/office/drawing/2010/main" xmlns="" w="9525">
                   <a:solidFill>
                     <a:srgbClr val="000000"/>
                   </a:solidFill>
@@ -3402,7 +3402,7 @@
             </a:ln>
             <a:extLst>
               <a:ext uri="{91240B29-F687-4f45-9708-019B960494DF}">
-                <a14:hiddenLine xmlns="" xmlns:a14="http://schemas.microsoft.com/office/drawing/2010/main" w="9525">
+                <a14:hiddenLine xmlns:a14="http://schemas.microsoft.com/office/drawing/2010/main" xmlns="" w="9525">
                   <a:solidFill>
                     <a:srgbClr val="000000"/>
                   </a:solidFill>
@@ -3464,7 +3464,7 @@
             </a:ln>
             <a:extLst>
               <a:ext uri="{91240B29-F687-4f45-9708-019B960494DF}">
-                <a14:hiddenLine xmlns="" xmlns:a14="http://schemas.microsoft.com/office/drawing/2010/main" w="9525">
+                <a14:hiddenLine xmlns:a14="http://schemas.microsoft.com/office/drawing/2010/main" xmlns="" w="9525">
                   <a:solidFill>
                     <a:srgbClr val="000000"/>
                   </a:solidFill>
@@ -3574,7 +3574,7 @@
             </a:ln>
             <a:extLst>
               <a:ext uri="{91240B29-F687-4f45-9708-019B960494DF}">
-                <a14:hiddenLine xmlns="" xmlns:a14="http://schemas.microsoft.com/office/drawing/2010/main" w="9525">
+                <a14:hiddenLine xmlns:a14="http://schemas.microsoft.com/office/drawing/2010/main" xmlns="" w="9525">
                   <a:solidFill>
                     <a:srgbClr val="000000"/>
                   </a:solidFill>
@@ -3636,7 +3636,7 @@
             </a:ln>
             <a:extLst>
               <a:ext uri="{91240B29-F687-4f45-9708-019B960494DF}">
-                <a14:hiddenLine xmlns="" xmlns:a14="http://schemas.microsoft.com/office/drawing/2010/main" w="9525">
+                <a14:hiddenLine xmlns:a14="http://schemas.microsoft.com/office/drawing/2010/main" xmlns="" w="9525">
                   <a:solidFill>
                     <a:srgbClr val="000000"/>
                   </a:solidFill>
@@ -3726,7 +3726,7 @@
             </a:ln>
             <a:extLst>
               <a:ext uri="{91240B29-F687-4f45-9708-019B960494DF}">
-                <a14:hiddenLine xmlns="" xmlns:a14="http://schemas.microsoft.com/office/drawing/2010/main" w="9525">
+                <a14:hiddenLine xmlns:a14="http://schemas.microsoft.com/office/drawing/2010/main" xmlns="" w="9525">
                   <a:solidFill>
                     <a:srgbClr val="000000"/>
                   </a:solidFill>
@@ -3816,7 +3816,7 @@
             </a:ln>
             <a:extLst>
               <a:ext uri="{91240B29-F687-4f45-9708-019B960494DF}">
-                <a14:hiddenLine xmlns="" xmlns:a14="http://schemas.microsoft.com/office/drawing/2010/main" w="9525">
+                <a14:hiddenLine xmlns:a14="http://schemas.microsoft.com/office/drawing/2010/main" xmlns="" w="9525">
                   <a:solidFill>
                     <a:srgbClr val="000000"/>
                   </a:solidFill>
@@ -3878,7 +3878,7 @@
             </a:ln>
             <a:extLst>
               <a:ext uri="{91240B29-F687-4f45-9708-019B960494DF}">
-                <a14:hiddenLine xmlns="" xmlns:a14="http://schemas.microsoft.com/office/drawing/2010/main" w="9525">
+                <a14:hiddenLine xmlns:a14="http://schemas.microsoft.com/office/drawing/2010/main" xmlns="" w="9525">
                   <a:solidFill>
                     <a:srgbClr val="000000"/>
                   </a:solidFill>
@@ -3968,7 +3968,7 @@
             </a:ln>
             <a:extLst>
               <a:ext uri="{91240B29-F687-4f45-9708-019B960494DF}">
-                <a14:hiddenLine xmlns="" xmlns:a14="http://schemas.microsoft.com/office/drawing/2010/main" w="9525">
+                <a14:hiddenLine xmlns:a14="http://schemas.microsoft.com/office/drawing/2010/main" xmlns="" w="9525">
                   <a:solidFill>
                     <a:srgbClr val="000000"/>
                   </a:solidFill>
@@ -4058,7 +4058,7 @@
             </a:ln>
             <a:extLst>
               <a:ext uri="{91240B29-F687-4f45-9708-019B960494DF}">
-                <a14:hiddenLine xmlns="" xmlns:a14="http://schemas.microsoft.com/office/drawing/2010/main" w="9525">
+                <a14:hiddenLine xmlns:a14="http://schemas.microsoft.com/office/drawing/2010/main" xmlns="" w="9525">
                   <a:solidFill>
                     <a:srgbClr val="000000"/>
                   </a:solidFill>
@@ -4114,7 +4114,7 @@
             </a:ln>
             <a:extLst>
               <a:ext uri="{91240B29-F687-4f45-9708-019B960494DF}">
-                <a14:hiddenLine xmlns="" xmlns:a14="http://schemas.microsoft.com/office/drawing/2010/main" w="9525">
+                <a14:hiddenLine xmlns:a14="http://schemas.microsoft.com/office/drawing/2010/main" xmlns="" w="9525">
                   <a:solidFill>
                     <a:srgbClr val="000000"/>
                   </a:solidFill>
@@ -4204,7 +4204,7 @@
             </a:ln>
             <a:extLst>
               <a:ext uri="{91240B29-F687-4f45-9708-019B960494DF}">
-                <a14:hiddenLine xmlns="" xmlns:a14="http://schemas.microsoft.com/office/drawing/2010/main" w="9525">
+                <a14:hiddenLine xmlns:a14="http://schemas.microsoft.com/office/drawing/2010/main" xmlns="" w="9525">
                   <a:solidFill>
                     <a:srgbClr val="000000"/>
                   </a:solidFill>
@@ -4260,7 +4260,7 @@
             </a:ln>
             <a:extLst>
               <a:ext uri="{91240B29-F687-4f45-9708-019B960494DF}">
-                <a14:hiddenLine xmlns="" xmlns:a14="http://schemas.microsoft.com/office/drawing/2010/main" w="9525">
+                <a14:hiddenLine xmlns:a14="http://schemas.microsoft.com/office/drawing/2010/main" xmlns="" w="9525">
                   <a:solidFill>
                     <a:srgbClr val="000000"/>
                   </a:solidFill>
@@ -4350,7 +4350,7 @@
             </a:ln>
             <a:extLst>
               <a:ext uri="{91240B29-F687-4f45-9708-019B960494DF}">
-                <a14:hiddenLine xmlns="" xmlns:a14="http://schemas.microsoft.com/office/drawing/2010/main" w="9525">
+                <a14:hiddenLine xmlns:a14="http://schemas.microsoft.com/office/drawing/2010/main" xmlns="" w="9525">
                   <a:solidFill>
                     <a:srgbClr val="000000"/>
                   </a:solidFill>
@@ -4418,7 +4418,7 @@
             </a:ln>
             <a:extLst>
               <a:ext uri="{91240B29-F687-4f45-9708-019B960494DF}">
-                <a14:hiddenLine xmlns="" xmlns:a14="http://schemas.microsoft.com/office/drawing/2010/main" w="9525">
+                <a14:hiddenLine xmlns:a14="http://schemas.microsoft.com/office/drawing/2010/main" xmlns="" w="9525">
                   <a:solidFill>
                     <a:srgbClr val="000000"/>
                   </a:solidFill>
@@ -4508,7 +4508,7 @@
             </a:ln>
             <a:extLst>
               <a:ext uri="{91240B29-F687-4f45-9708-019B960494DF}">
-                <a14:hiddenLine xmlns="" xmlns:a14="http://schemas.microsoft.com/office/drawing/2010/main" w="9525">
+                <a14:hiddenLine xmlns:a14="http://schemas.microsoft.com/office/drawing/2010/main" xmlns="" w="9525">
                   <a:solidFill>
                     <a:srgbClr val="000000"/>
                   </a:solidFill>
@@ -4576,7 +4576,7 @@
             </a:ln>
             <a:extLst>
               <a:ext uri="{91240B29-F687-4f45-9708-019B960494DF}">
-                <a14:hiddenLine xmlns="" xmlns:a14="http://schemas.microsoft.com/office/drawing/2010/main" w="9525">
+                <a14:hiddenLine xmlns:a14="http://schemas.microsoft.com/office/drawing/2010/main" xmlns="" w="9525">
                   <a:solidFill>
                     <a:srgbClr val="000000"/>
                   </a:solidFill>
@@ -4666,7 +4666,7 @@
             </a:ln>
             <a:extLst>
               <a:ext uri="{91240B29-F687-4f45-9708-019B960494DF}">
-                <a14:hiddenLine xmlns="" xmlns:a14="http://schemas.microsoft.com/office/drawing/2010/main" w="9525">
+                <a14:hiddenLine xmlns:a14="http://schemas.microsoft.com/office/drawing/2010/main" xmlns="" w="9525">
                   <a:solidFill>
                     <a:srgbClr val="000000"/>
                   </a:solidFill>
@@ -4700,7 +4700,7 @@
             </a:ln>
             <a:extLst>
               <a:ext uri="{91240B29-F687-4f45-9708-019B960494DF}">
-                <a14:hiddenLine xmlns="" xmlns:a14="http://schemas.microsoft.com/office/drawing/2010/main" w="9525">
+                <a14:hiddenLine xmlns:a14="http://schemas.microsoft.com/office/drawing/2010/main" xmlns="" w="9525">
                   <a:solidFill>
                     <a:srgbClr val="000000"/>
                   </a:solidFill>
@@ -4790,7 +4790,7 @@
             </a:ln>
             <a:extLst>
               <a:ext uri="{91240B29-F687-4f45-9708-019B960494DF}">
-                <a14:hiddenLine xmlns="" xmlns:a14="http://schemas.microsoft.com/office/drawing/2010/main" w="9525">
+                <a14:hiddenLine xmlns:a14="http://schemas.microsoft.com/office/drawing/2010/main" xmlns="" w="9525">
                   <a:solidFill>
                     <a:srgbClr val="000000"/>
                   </a:solidFill>
@@ -4852,7 +4852,7 @@
             </a:ln>
             <a:extLst>
               <a:ext uri="{91240B29-F687-4f45-9708-019B960494DF}">
-                <a14:hiddenLine xmlns="" xmlns:a14="http://schemas.microsoft.com/office/drawing/2010/main" w="9525">
+                <a14:hiddenLine xmlns:a14="http://schemas.microsoft.com/office/drawing/2010/main" xmlns="" w="9525">
                   <a:solidFill>
                     <a:srgbClr val="000000"/>
                   </a:solidFill>
@@ -4914,7 +4914,7 @@
             </a:ln>
             <a:extLst>
               <a:ext uri="{91240B29-F687-4f45-9708-019B960494DF}">
-                <a14:hiddenLine xmlns="" xmlns:a14="http://schemas.microsoft.com/office/drawing/2010/main" w="9525">
+                <a14:hiddenLine xmlns:a14="http://schemas.microsoft.com/office/drawing/2010/main" xmlns="" w="9525">
                   <a:solidFill>
                     <a:srgbClr val="000000"/>
                   </a:solidFill>
@@ -5004,7 +5004,7 @@
             </a:ln>
             <a:extLst>
               <a:ext uri="{91240B29-F687-4f45-9708-019B960494DF}">
-                <a14:hiddenLine xmlns="" xmlns:a14="http://schemas.microsoft.com/office/drawing/2010/main" w="9525">
+                <a14:hiddenLine xmlns:a14="http://schemas.microsoft.com/office/drawing/2010/main" xmlns="" w="9525">
                   <a:solidFill>
                     <a:srgbClr val="000000"/>
                   </a:solidFill>
@@ -5072,7 +5072,7 @@
             </a:ln>
             <a:extLst>
               <a:ext uri="{91240B29-F687-4f45-9708-019B960494DF}">
-                <a14:hiddenLine xmlns="" xmlns:a14="http://schemas.microsoft.com/office/drawing/2010/main" w="9525">
+                <a14:hiddenLine xmlns:a14="http://schemas.microsoft.com/office/drawing/2010/main" xmlns="" w="9525">
                   <a:solidFill>
                     <a:srgbClr val="000000"/>
                   </a:solidFill>
@@ -5134,7 +5134,7 @@
             </a:ln>
             <a:extLst>
               <a:ext uri="{91240B29-F687-4f45-9708-019B960494DF}">
-                <a14:hiddenLine xmlns="" xmlns:a14="http://schemas.microsoft.com/office/drawing/2010/main" w="9525">
+                <a14:hiddenLine xmlns:a14="http://schemas.microsoft.com/office/drawing/2010/main" xmlns="" w="9525">
                   <a:solidFill>
                     <a:srgbClr val="000000"/>
                   </a:solidFill>
@@ -5224,7 +5224,7 @@
             </a:ln>
             <a:extLst>
               <a:ext uri="{91240B29-F687-4f45-9708-019B960494DF}">
-                <a14:hiddenLine xmlns="" xmlns:a14="http://schemas.microsoft.com/office/drawing/2010/main" w="9525">
+                <a14:hiddenLine xmlns:a14="http://schemas.microsoft.com/office/drawing/2010/main" xmlns="" w="9525">
                   <a:solidFill>
                     <a:srgbClr val="000000"/>
                   </a:solidFill>
@@ -5286,7 +5286,7 @@
             </a:ln>
             <a:extLst>
               <a:ext uri="{91240B29-F687-4f45-9708-019B960494DF}">
-                <a14:hiddenLine xmlns="" xmlns:a14="http://schemas.microsoft.com/office/drawing/2010/main" w="9525">
+                <a14:hiddenLine xmlns:a14="http://schemas.microsoft.com/office/drawing/2010/main" xmlns="" w="9525">
                   <a:solidFill>
                     <a:srgbClr val="000000"/>
                   </a:solidFill>
@@ -5376,7 +5376,7 @@
             </a:ln>
             <a:extLst>
               <a:ext uri="{91240B29-F687-4f45-9708-019B960494DF}">
-                <a14:hiddenLine xmlns="" xmlns:a14="http://schemas.microsoft.com/office/drawing/2010/main" w="9525">
+                <a14:hiddenLine xmlns:a14="http://schemas.microsoft.com/office/drawing/2010/main" xmlns="" w="9525">
                   <a:solidFill>
                     <a:srgbClr val="000000"/>
                   </a:solidFill>
@@ -5438,7 +5438,7 @@
             </a:ln>
             <a:extLst>
               <a:ext uri="{91240B29-F687-4f45-9708-019B960494DF}">
-                <a14:hiddenLine xmlns="" xmlns:a14="http://schemas.microsoft.com/office/drawing/2010/main" w="9525">
+                <a14:hiddenLine xmlns:a14="http://schemas.microsoft.com/office/drawing/2010/main" xmlns="" w="9525">
                   <a:solidFill>
                     <a:srgbClr val="000000"/>
                   </a:solidFill>
@@ -5528,7 +5528,7 @@
             </a:ln>
             <a:extLst>
               <a:ext uri="{91240B29-F687-4f45-9708-019B960494DF}">
-                <a14:hiddenLine xmlns="" xmlns:a14="http://schemas.microsoft.com/office/drawing/2010/main" w="9525">
+                <a14:hiddenLine xmlns:a14="http://schemas.microsoft.com/office/drawing/2010/main" xmlns="" w="9525">
                   <a:solidFill>
                     <a:srgbClr val="000000"/>
                   </a:solidFill>
@@ -5562,7 +5562,7 @@
             </a:ln>
             <a:extLst>
               <a:ext uri="{91240B29-F687-4f45-9708-019B960494DF}">
-                <a14:hiddenLine xmlns="" xmlns:a14="http://schemas.microsoft.com/office/drawing/2010/main" w="9525">
+                <a14:hiddenLine xmlns:a14="http://schemas.microsoft.com/office/drawing/2010/main" xmlns="" w="9525">
                   <a:solidFill>
                     <a:srgbClr val="000000"/>
                   </a:solidFill>
@@ -5627,7 +5627,7 @@
             </a:ln>
             <a:extLst>
               <a:ext uri="{91240B29-F687-4f45-9708-019B960494DF}">
-                <a14:hiddenLine xmlns="" xmlns:a14="http://schemas.microsoft.com/office/drawing/2010/main" w="9525">
+                <a14:hiddenLine xmlns:a14="http://schemas.microsoft.com/office/drawing/2010/main" xmlns="" w="9525">
                   <a:solidFill>
                     <a:srgbClr val="000000"/>
                   </a:solidFill>
@@ -5717,7 +5717,7 @@
             </a:ln>
             <a:extLst>
               <a:ext uri="{91240B29-F687-4f45-9708-019B960494DF}">
-                <a14:hiddenLine xmlns="" xmlns:a14="http://schemas.microsoft.com/office/drawing/2010/main" w="9525">
+                <a14:hiddenLine xmlns:a14="http://schemas.microsoft.com/office/drawing/2010/main" xmlns="" w="9525">
                   <a:solidFill>
                     <a:srgbClr val="000000"/>
                   </a:solidFill>
@@ -5779,7 +5779,7 @@
             </a:ln>
             <a:extLst>
               <a:ext uri="{91240B29-F687-4f45-9708-019B960494DF}">
-                <a14:hiddenLine xmlns="" xmlns:a14="http://schemas.microsoft.com/office/drawing/2010/main" w="9525">
+                <a14:hiddenLine xmlns:a14="http://schemas.microsoft.com/office/drawing/2010/main" xmlns="" w="9525">
                   <a:solidFill>
                     <a:srgbClr val="000000"/>
                   </a:solidFill>
@@ -5869,7 +5869,7 @@
             </a:ln>
             <a:extLst>
               <a:ext uri="{91240B29-F687-4f45-9708-019B960494DF}">
-                <a14:hiddenLine xmlns="" xmlns:a14="http://schemas.microsoft.com/office/drawing/2010/main" w="9525">
+                <a14:hiddenLine xmlns:a14="http://schemas.microsoft.com/office/drawing/2010/main" xmlns="" w="9525">
                   <a:solidFill>
                     <a:srgbClr val="000000"/>
                   </a:solidFill>
@@ -5959,7 +5959,7 @@
             </a:ln>
             <a:extLst>
               <a:ext uri="{91240B29-F687-4f45-9708-019B960494DF}">
-                <a14:hiddenLine xmlns="" xmlns:a14="http://schemas.microsoft.com/office/drawing/2010/main" w="9525">
+                <a14:hiddenLine xmlns:a14="http://schemas.microsoft.com/office/drawing/2010/main" xmlns="" w="9525">
                   <a:solidFill>
                     <a:srgbClr val="000000"/>
                   </a:solidFill>
@@ -6024,7 +6024,7 @@
             </a:ln>
             <a:extLst>
               <a:ext uri="{91240B29-F687-4f45-9708-019B960494DF}">
-                <a14:hiddenLine xmlns="" xmlns:a14="http://schemas.microsoft.com/office/drawing/2010/main" w="9525">
+                <a14:hiddenLine xmlns:a14="http://schemas.microsoft.com/office/drawing/2010/main" xmlns="" w="9525">
                   <a:solidFill>
                     <a:srgbClr val="000000"/>
                   </a:solidFill>
@@ -6086,7 +6086,7 @@
             </a:ln>
             <a:extLst>
               <a:ext uri="{91240B29-F687-4f45-9708-019B960494DF}">
-                <a14:hiddenLine xmlns="" xmlns:a14="http://schemas.microsoft.com/office/drawing/2010/main" w="9525">
+                <a14:hiddenLine xmlns:a14="http://schemas.microsoft.com/office/drawing/2010/main" xmlns="" w="9525">
                   <a:solidFill>
                     <a:srgbClr val="000000"/>
                   </a:solidFill>
@@ -6176,7 +6176,7 @@
             </a:ln>
             <a:extLst>
               <a:ext uri="{91240B29-F687-4f45-9708-019B960494DF}">
-                <a14:hiddenLine xmlns="" xmlns:a14="http://schemas.microsoft.com/office/drawing/2010/main" w="9525">
+                <a14:hiddenLine xmlns:a14="http://schemas.microsoft.com/office/drawing/2010/main" xmlns="" w="9525">
                   <a:solidFill>
                     <a:srgbClr val="000000"/>
                   </a:solidFill>
@@ -6266,7 +6266,7 @@
             </a:ln>
             <a:extLst>
               <a:ext uri="{91240B29-F687-4f45-9708-019B960494DF}">
-                <a14:hiddenLine xmlns="" xmlns:a14="http://schemas.microsoft.com/office/drawing/2010/main" w="9525">
+                <a14:hiddenLine xmlns:a14="http://schemas.microsoft.com/office/drawing/2010/main" xmlns="" w="9525">
                   <a:solidFill>
                     <a:srgbClr val="000000"/>
                   </a:solidFill>
@@ -6328,7 +6328,7 @@
             </a:ln>
             <a:extLst>
               <a:ext uri="{91240B29-F687-4f45-9708-019B960494DF}">
-                <a14:hiddenLine xmlns="" xmlns:a14="http://schemas.microsoft.com/office/drawing/2010/main" w="9525">
+                <a14:hiddenLine xmlns:a14="http://schemas.microsoft.com/office/drawing/2010/main" xmlns="" w="9525">
                   <a:solidFill>
                     <a:srgbClr val="000000"/>
                   </a:solidFill>
@@ -6448,7 +6448,7 @@
             </a:ln>
             <a:extLst>
               <a:ext uri="{91240B29-F687-4f45-9708-019B960494DF}">
-                <a14:hiddenLine xmlns="" xmlns:a14="http://schemas.microsoft.com/office/drawing/2010/main" w="9525">
+                <a14:hiddenLine xmlns:a14="http://schemas.microsoft.com/office/drawing/2010/main" xmlns="" w="9525">
                   <a:solidFill>
                     <a:srgbClr val="000000"/>
                   </a:solidFill>
@@ -6516,7 +6516,7 @@
             </a:ln>
             <a:extLst>
               <a:ext uri="{91240B29-F687-4f45-9708-019B960494DF}">
-                <a14:hiddenLine xmlns="" xmlns:a14="http://schemas.microsoft.com/office/drawing/2010/main" w="9525">
+                <a14:hiddenLine xmlns:a14="http://schemas.microsoft.com/office/drawing/2010/main" xmlns="" w="9525">
                   <a:solidFill>
                     <a:srgbClr val="000000"/>
                   </a:solidFill>
@@ -6606,7 +6606,7 @@
             </a:ln>
             <a:extLst>
               <a:ext uri="{91240B29-F687-4f45-9708-019B960494DF}">
-                <a14:hiddenLine xmlns="" xmlns:a14="http://schemas.microsoft.com/office/drawing/2010/main" w="9525">
+                <a14:hiddenLine xmlns:a14="http://schemas.microsoft.com/office/drawing/2010/main" xmlns="" w="9525">
                   <a:solidFill>
                     <a:srgbClr val="000000"/>
                   </a:solidFill>
@@ -6746,7 +6746,7 @@
           <a:p>
             <a:fld id="{48A87A34-81AB-432B-8DAE-1953F412C126}" type="datetimeFigureOut">
               <a:rPr lang="en-US" dirty="0"/>
-              <a:t>7/10/2024</a:t>
+              <a:t>7/23/2024</a:t>
             </a:fld>
             <a:endParaRPr lang="en-US" dirty="0"/>
           </a:p>
@@ -7008,7 +7008,7 @@
           <a:p>
             <a:fld id="{48A87A34-81AB-432B-8DAE-1953F412C126}" type="datetimeFigureOut">
               <a:rPr lang="en-US" dirty="0"/>
-              <a:t>7/10/2024</a:t>
+              <a:t>7/23/2024</a:t>
             </a:fld>
             <a:endParaRPr lang="en-US" dirty="0"/>
           </a:p>
@@ -7199,7 +7199,7 @@
           <a:p>
             <a:fld id="{48A87A34-81AB-432B-8DAE-1953F412C126}" type="datetimeFigureOut">
               <a:rPr lang="en-US" dirty="0"/>
-              <a:t>7/10/2024</a:t>
+              <a:t>7/23/2024</a:t>
             </a:fld>
             <a:endParaRPr lang="en-US" dirty="0"/>
           </a:p>
@@ -7457,7 +7457,7 @@
           <a:p>
             <a:fld id="{48A87A34-81AB-432B-8DAE-1953F412C126}" type="datetimeFigureOut">
               <a:rPr lang="en-US" dirty="0"/>
-              <a:t>7/10/2024</a:t>
+              <a:t>7/23/2024</a:t>
             </a:fld>
             <a:endParaRPr lang="en-US" dirty="0"/>
           </a:p>
@@ -7886,7 +7886,7 @@
           <a:p>
             <a:fld id="{48A87A34-81AB-432B-8DAE-1953F412C126}" type="datetimeFigureOut">
               <a:rPr lang="en-US" dirty="0"/>
-              <a:t>7/10/2024</a:t>
+              <a:t>7/23/2024</a:t>
             </a:fld>
             <a:endParaRPr lang="en-US" dirty="0"/>
           </a:p>
@@ -8427,7 +8427,7 @@
           <a:p>
             <a:fld id="{48A87A34-81AB-432B-8DAE-1953F412C126}" type="datetimeFigureOut">
               <a:rPr lang="en-US" dirty="0"/>
-              <a:t>7/10/2024</a:t>
+              <a:t>7/23/2024</a:t>
             </a:fld>
             <a:endParaRPr lang="en-US" dirty="0"/>
           </a:p>
@@ -9142,7 +9142,7 @@
           <a:p>
             <a:fld id="{48A87A34-81AB-432B-8DAE-1953F412C126}" type="datetimeFigureOut">
               <a:rPr lang="en-US" dirty="0"/>
-              <a:t>7/10/2024</a:t>
+              <a:t>7/23/2024</a:t>
             </a:fld>
             <a:endParaRPr lang="en-US" dirty="0"/>
           </a:p>
@@ -9307,7 +9307,7 @@
           <a:p>
             <a:fld id="{48A87A34-81AB-432B-8DAE-1953F412C126}" type="datetimeFigureOut">
               <a:rPr lang="en-US" dirty="0"/>
-              <a:t>7/10/2024</a:t>
+              <a:t>7/23/2024</a:t>
             </a:fld>
             <a:endParaRPr lang="en-US" dirty="0"/>
           </a:p>
@@ -9482,7 +9482,7 @@
           <a:p>
             <a:fld id="{48A87A34-81AB-432B-8DAE-1953F412C126}" type="datetimeFigureOut">
               <a:rPr lang="en-US" dirty="0"/>
-              <a:t>7/10/2024</a:t>
+              <a:t>7/23/2024</a:t>
             </a:fld>
             <a:endParaRPr lang="en-US" dirty="0"/>
           </a:p>
@@ -9647,7 +9647,7 @@
           <a:p>
             <a:fld id="{48A87A34-81AB-432B-8DAE-1953F412C126}" type="datetimeFigureOut">
               <a:rPr lang="en-US" dirty="0"/>
-              <a:t>7/10/2024</a:t>
+              <a:t>7/23/2024</a:t>
             </a:fld>
             <a:endParaRPr lang="en-US" dirty="0"/>
           </a:p>
@@ -9892,7 +9892,7 @@
           <a:p>
             <a:fld id="{48A87A34-81AB-432B-8DAE-1953F412C126}" type="datetimeFigureOut">
               <a:rPr lang="en-US" dirty="0"/>
-              <a:t>7/10/2024</a:t>
+              <a:t>7/23/2024</a:t>
             </a:fld>
             <a:endParaRPr lang="en-US" dirty="0"/>
           </a:p>
@@ -10119,7 +10119,7 @@
           <a:p>
             <a:fld id="{48A87A34-81AB-432B-8DAE-1953F412C126}" type="datetimeFigureOut">
               <a:rPr lang="en-US" dirty="0"/>
-              <a:t>7/10/2024</a:t>
+              <a:t>7/23/2024</a:t>
             </a:fld>
             <a:endParaRPr lang="en-US" dirty="0"/>
           </a:p>
@@ -10495,7 +10495,7 @@
           <a:p>
             <a:fld id="{48A87A34-81AB-432B-8DAE-1953F412C126}" type="datetimeFigureOut">
               <a:rPr lang="en-US" dirty="0"/>
-              <a:t>7/10/2024</a:t>
+              <a:t>7/23/2024</a:t>
             </a:fld>
             <a:endParaRPr lang="en-US" dirty="0"/>
           </a:p>
@@ -10608,7 +10608,7 @@
           <a:p>
             <a:fld id="{48A87A34-81AB-432B-8DAE-1953F412C126}" type="datetimeFigureOut">
               <a:rPr lang="en-US" dirty="0"/>
-              <a:t>7/10/2024</a:t>
+              <a:t>7/23/2024</a:t>
             </a:fld>
             <a:endParaRPr lang="en-US" dirty="0"/>
           </a:p>
@@ -10698,7 +10698,7 @@
           <a:p>
             <a:fld id="{48A87A34-81AB-432B-8DAE-1953F412C126}" type="datetimeFigureOut">
               <a:rPr lang="en-US" dirty="0"/>
-              <a:t>7/10/2024</a:t>
+              <a:t>7/23/2024</a:t>
             </a:fld>
             <a:endParaRPr lang="en-US" dirty="0"/>
           </a:p>
@@ -10942,7 +10942,7 @@
           <a:p>
             <a:fld id="{48A87A34-81AB-432B-8DAE-1953F412C126}" type="datetimeFigureOut">
               <a:rPr lang="en-US" dirty="0"/>
-              <a:t>7/10/2024</a:t>
+              <a:t>7/23/2024</a:t>
             </a:fld>
             <a:endParaRPr lang="en-US" dirty="0"/>
           </a:p>
@@ -11217,7 +11217,7 @@
           <a:p>
             <a:fld id="{48A87A34-81AB-432B-8DAE-1953F412C126}" type="datetimeFigureOut">
               <a:rPr lang="en-US" dirty="0"/>
-              <a:t>7/10/2024</a:t>
+              <a:t>7/23/2024</a:t>
             </a:fld>
             <a:endParaRPr lang="en-US" dirty="0"/>
           </a:p>
@@ -11335,7 +11335,7 @@
           <a:noFill/>
           <a:extLst>
             <a:ext uri="{909E8E84-426E-40dd-AFC4-6F175D3DCCD1}">
-              <a14:hiddenFill xmlns="" xmlns:a14="http://schemas.microsoft.com/office/drawing/2010/main">
+              <a14:hiddenFill xmlns:a14="http://schemas.microsoft.com/office/drawing/2010/main" xmlns="">
                 <a:solidFill>
                   <a:srgbClr val="FFFFFF"/>
                 </a:solidFill>
@@ -11409,7 +11409,7 @@
               </a:ln>
               <a:extLst>
                 <a:ext uri="{91240B29-F687-4f45-9708-019B960494DF}">
-                  <a14:hiddenLine xmlns="" xmlns:a14="http://schemas.microsoft.com/office/drawing/2010/main" w="9525">
+                  <a14:hiddenLine xmlns:a14="http://schemas.microsoft.com/office/drawing/2010/main" xmlns="" w="9525">
                     <a:solidFill>
                       <a:srgbClr val="000000"/>
                     </a:solidFill>
@@ -11499,7 +11499,7 @@
               </a:ln>
               <a:extLst>
                 <a:ext uri="{91240B29-F687-4f45-9708-019B960494DF}">
-                  <a14:hiddenLine xmlns="" xmlns:a14="http://schemas.microsoft.com/office/drawing/2010/main" w="9525">
+                  <a14:hiddenLine xmlns:a14="http://schemas.microsoft.com/office/drawing/2010/main" xmlns="" w="9525">
                     <a:solidFill>
                       <a:srgbClr val="000000"/>
                     </a:solidFill>
@@ -11589,7 +11589,7 @@
               </a:ln>
               <a:extLst>
                 <a:ext uri="{91240B29-F687-4f45-9708-019B960494DF}">
-                  <a14:hiddenLine xmlns="" xmlns:a14="http://schemas.microsoft.com/office/drawing/2010/main" w="9525">
+                  <a14:hiddenLine xmlns:a14="http://schemas.microsoft.com/office/drawing/2010/main" xmlns="" w="9525">
                     <a:solidFill>
                       <a:srgbClr val="000000"/>
                     </a:solidFill>
@@ -11651,7 +11651,7 @@
               </a:ln>
               <a:extLst>
                 <a:ext uri="{91240B29-F687-4f45-9708-019B960494DF}">
-                  <a14:hiddenLine xmlns="" xmlns:a14="http://schemas.microsoft.com/office/drawing/2010/main" w="9525">
+                  <a14:hiddenLine xmlns:a14="http://schemas.microsoft.com/office/drawing/2010/main" xmlns="" w="9525">
                     <a:solidFill>
                       <a:srgbClr val="000000"/>
                     </a:solidFill>
@@ -11741,7 +11741,7 @@
               </a:ln>
               <a:extLst>
                 <a:ext uri="{91240B29-F687-4f45-9708-019B960494DF}">
-                  <a14:hiddenLine xmlns="" xmlns:a14="http://schemas.microsoft.com/office/drawing/2010/main" w="9525">
+                  <a14:hiddenLine xmlns:a14="http://schemas.microsoft.com/office/drawing/2010/main" xmlns="" w="9525">
                     <a:solidFill>
                       <a:srgbClr val="000000"/>
                     </a:solidFill>
@@ -11803,7 +11803,7 @@
               </a:ln>
               <a:extLst>
                 <a:ext uri="{91240B29-F687-4f45-9708-019B960494DF}">
-                  <a14:hiddenLine xmlns="" xmlns:a14="http://schemas.microsoft.com/office/drawing/2010/main" w="9525">
+                  <a14:hiddenLine xmlns:a14="http://schemas.microsoft.com/office/drawing/2010/main" xmlns="" w="9525">
                     <a:solidFill>
                       <a:srgbClr val="000000"/>
                     </a:solidFill>
@@ -11865,7 +11865,7 @@
               </a:ln>
               <a:extLst>
                 <a:ext uri="{91240B29-F687-4f45-9708-019B960494DF}">
-                  <a14:hiddenLine xmlns="" xmlns:a14="http://schemas.microsoft.com/office/drawing/2010/main" w="9525">
+                  <a14:hiddenLine xmlns:a14="http://schemas.microsoft.com/office/drawing/2010/main" xmlns="" w="9525">
                     <a:solidFill>
                       <a:srgbClr val="000000"/>
                     </a:solidFill>
@@ -11955,7 +11955,7 @@
               </a:ln>
               <a:extLst>
                 <a:ext uri="{91240B29-F687-4f45-9708-019B960494DF}">
-                  <a14:hiddenLine xmlns="" xmlns:a14="http://schemas.microsoft.com/office/drawing/2010/main" w="9525">
+                  <a14:hiddenLine xmlns:a14="http://schemas.microsoft.com/office/drawing/2010/main" xmlns="" w="9525">
                     <a:solidFill>
                       <a:srgbClr val="000000"/>
                     </a:solidFill>
@@ -12045,7 +12045,7 @@
               </a:ln>
               <a:extLst>
                 <a:ext uri="{91240B29-F687-4f45-9708-019B960494DF}">
-                  <a14:hiddenLine xmlns="" xmlns:a14="http://schemas.microsoft.com/office/drawing/2010/main" w="9525">
+                  <a14:hiddenLine xmlns:a14="http://schemas.microsoft.com/office/drawing/2010/main" xmlns="" w="9525">
                     <a:solidFill>
                       <a:srgbClr val="000000"/>
                     </a:solidFill>
@@ -12107,7 +12107,7 @@
               </a:ln>
               <a:extLst>
                 <a:ext uri="{91240B29-F687-4f45-9708-019B960494DF}">
-                  <a14:hiddenLine xmlns="" xmlns:a14="http://schemas.microsoft.com/office/drawing/2010/main" w="9525">
+                  <a14:hiddenLine xmlns:a14="http://schemas.microsoft.com/office/drawing/2010/main" xmlns="" w="9525">
                     <a:solidFill>
                       <a:srgbClr val="000000"/>
                     </a:solidFill>
@@ -12217,7 +12217,7 @@
               </a:ln>
               <a:extLst>
                 <a:ext uri="{91240B29-F687-4f45-9708-019B960494DF}">
-                  <a14:hiddenLine xmlns="" xmlns:a14="http://schemas.microsoft.com/office/drawing/2010/main" w="9525">
+                  <a14:hiddenLine xmlns:a14="http://schemas.microsoft.com/office/drawing/2010/main" xmlns="" w="9525">
                     <a:solidFill>
                       <a:srgbClr val="000000"/>
                     </a:solidFill>
@@ -12301,7 +12301,7 @@
               </a:ln>
               <a:extLst>
                 <a:ext uri="{91240B29-F687-4f45-9708-019B960494DF}">
-                  <a14:hiddenLine xmlns="" xmlns:a14="http://schemas.microsoft.com/office/drawing/2010/main" w="9525">
+                  <a14:hiddenLine xmlns:a14="http://schemas.microsoft.com/office/drawing/2010/main" xmlns="" w="9525">
                     <a:solidFill>
                       <a:srgbClr val="000000"/>
                     </a:solidFill>
@@ -12363,7 +12363,7 @@
               </a:ln>
               <a:extLst>
                 <a:ext uri="{91240B29-F687-4f45-9708-019B960494DF}">
-                  <a14:hiddenLine xmlns="" xmlns:a14="http://schemas.microsoft.com/office/drawing/2010/main" w="9525">
+                  <a14:hiddenLine xmlns:a14="http://schemas.microsoft.com/office/drawing/2010/main" xmlns="" w="9525">
                     <a:solidFill>
                       <a:srgbClr val="000000"/>
                     </a:solidFill>
@@ -12425,7 +12425,7 @@
               </a:ln>
               <a:extLst>
                 <a:ext uri="{91240B29-F687-4f45-9708-019B960494DF}">
-                  <a14:hiddenLine xmlns="" xmlns:a14="http://schemas.microsoft.com/office/drawing/2010/main" w="9525">
+                  <a14:hiddenLine xmlns:a14="http://schemas.microsoft.com/office/drawing/2010/main" xmlns="" w="9525">
                     <a:solidFill>
                       <a:srgbClr val="000000"/>
                     </a:solidFill>
@@ -12515,7 +12515,7 @@
               </a:ln>
               <a:extLst>
                 <a:ext uri="{91240B29-F687-4f45-9708-019B960494DF}">
-                  <a14:hiddenLine xmlns="" xmlns:a14="http://schemas.microsoft.com/office/drawing/2010/main" w="9525">
+                  <a14:hiddenLine xmlns:a14="http://schemas.microsoft.com/office/drawing/2010/main" xmlns="" w="9525">
                     <a:solidFill>
                       <a:srgbClr val="000000"/>
                     </a:solidFill>
@@ -12549,7 +12549,7 @@
               </a:ln>
               <a:extLst>
                 <a:ext uri="{91240B29-F687-4f45-9708-019B960494DF}">
-                  <a14:hiddenLine xmlns="" xmlns:a14="http://schemas.microsoft.com/office/drawing/2010/main" w="9525">
+                  <a14:hiddenLine xmlns:a14="http://schemas.microsoft.com/office/drawing/2010/main" xmlns="" w="9525">
                     <a:solidFill>
                       <a:srgbClr val="000000"/>
                     </a:solidFill>
@@ -12614,7 +12614,7 @@
               </a:ln>
               <a:extLst>
                 <a:ext uri="{91240B29-F687-4f45-9708-019B960494DF}">
-                  <a14:hiddenLine xmlns="" xmlns:a14="http://schemas.microsoft.com/office/drawing/2010/main" w="9525">
+                  <a14:hiddenLine xmlns:a14="http://schemas.microsoft.com/office/drawing/2010/main" xmlns="" w="9525">
                     <a:solidFill>
                       <a:srgbClr val="000000"/>
                     </a:solidFill>
@@ -12704,7 +12704,7 @@
               </a:ln>
               <a:extLst>
                 <a:ext uri="{91240B29-F687-4f45-9708-019B960494DF}">
-                  <a14:hiddenLine xmlns="" xmlns:a14="http://schemas.microsoft.com/office/drawing/2010/main" w="9525">
+                  <a14:hiddenLine xmlns:a14="http://schemas.microsoft.com/office/drawing/2010/main" xmlns="" w="9525">
                     <a:solidFill>
                       <a:srgbClr val="000000"/>
                     </a:solidFill>
@@ -12766,7 +12766,7 @@
               </a:ln>
               <a:extLst>
                 <a:ext uri="{91240B29-F687-4f45-9708-019B960494DF}">
-                  <a14:hiddenLine xmlns="" xmlns:a14="http://schemas.microsoft.com/office/drawing/2010/main" w="9525">
+                  <a14:hiddenLine xmlns:a14="http://schemas.microsoft.com/office/drawing/2010/main" xmlns="" w="9525">
                     <a:solidFill>
                       <a:srgbClr val="000000"/>
                     </a:solidFill>
@@ -12856,7 +12856,7 @@
               </a:ln>
               <a:extLst>
                 <a:ext uri="{91240B29-F687-4f45-9708-019B960494DF}">
-                  <a14:hiddenLine xmlns="" xmlns:a14="http://schemas.microsoft.com/office/drawing/2010/main" w="9525">
+                  <a14:hiddenLine xmlns:a14="http://schemas.microsoft.com/office/drawing/2010/main" xmlns="" w="9525">
                     <a:solidFill>
                       <a:srgbClr val="000000"/>
                     </a:solidFill>
@@ -12921,7 +12921,7 @@
               </a:ln>
               <a:extLst>
                 <a:ext uri="{91240B29-F687-4f45-9708-019B960494DF}">
-                  <a14:hiddenLine xmlns="" xmlns:a14="http://schemas.microsoft.com/office/drawing/2010/main" w="9525">
+                  <a14:hiddenLine xmlns:a14="http://schemas.microsoft.com/office/drawing/2010/main" xmlns="" w="9525">
                     <a:solidFill>
                       <a:srgbClr val="000000"/>
                     </a:solidFill>
@@ -12983,7 +12983,7 @@
               </a:ln>
               <a:extLst>
                 <a:ext uri="{91240B29-F687-4f45-9708-019B960494DF}">
-                  <a14:hiddenLine xmlns="" xmlns:a14="http://schemas.microsoft.com/office/drawing/2010/main" w="9525">
+                  <a14:hiddenLine xmlns:a14="http://schemas.microsoft.com/office/drawing/2010/main" xmlns="" w="9525">
                     <a:solidFill>
                       <a:srgbClr val="000000"/>
                     </a:solidFill>
@@ -13073,7 +13073,7 @@
               </a:ln>
               <a:extLst>
                 <a:ext uri="{91240B29-F687-4f45-9708-019B960494DF}">
-                  <a14:hiddenLine xmlns="" xmlns:a14="http://schemas.microsoft.com/office/drawing/2010/main" w="9525">
+                  <a14:hiddenLine xmlns:a14="http://schemas.microsoft.com/office/drawing/2010/main" xmlns="" w="9525">
                     <a:solidFill>
                       <a:srgbClr val="000000"/>
                     </a:solidFill>
@@ -13163,7 +13163,7 @@
               </a:ln>
               <a:extLst>
                 <a:ext uri="{91240B29-F687-4f45-9708-019B960494DF}">
-                  <a14:hiddenLine xmlns="" xmlns:a14="http://schemas.microsoft.com/office/drawing/2010/main" w="9525">
+                  <a14:hiddenLine xmlns:a14="http://schemas.microsoft.com/office/drawing/2010/main" xmlns="" w="9525">
                     <a:solidFill>
                       <a:srgbClr val="000000"/>
                     </a:solidFill>
@@ -13228,7 +13228,7 @@
               </a:ln>
               <a:extLst>
                 <a:ext uri="{91240B29-F687-4f45-9708-019B960494DF}">
-                  <a14:hiddenLine xmlns="" xmlns:a14="http://schemas.microsoft.com/office/drawing/2010/main" w="9525">
+                  <a14:hiddenLine xmlns:a14="http://schemas.microsoft.com/office/drawing/2010/main" xmlns="" w="9525">
                     <a:solidFill>
                       <a:srgbClr val="000000"/>
                     </a:solidFill>
@@ -13348,7 +13348,7 @@
               </a:ln>
               <a:extLst>
                 <a:ext uri="{91240B29-F687-4f45-9708-019B960494DF}">
-                  <a14:hiddenLine xmlns="" xmlns:a14="http://schemas.microsoft.com/office/drawing/2010/main" w="9525">
+                  <a14:hiddenLine xmlns:a14="http://schemas.microsoft.com/office/drawing/2010/main" xmlns="" w="9525">
                     <a:solidFill>
                       <a:srgbClr val="000000"/>
                     </a:solidFill>
@@ -13429,7 +13429,7 @@
               </a:ln>
               <a:extLst>
                 <a:ext uri="{91240B29-F687-4f45-9708-019B960494DF}">
-                  <a14:hiddenLine xmlns="" xmlns:a14="http://schemas.microsoft.com/office/drawing/2010/main" w="9525">
+                  <a14:hiddenLine xmlns:a14="http://schemas.microsoft.com/office/drawing/2010/main" xmlns="" w="9525">
                     <a:solidFill>
                       <a:srgbClr val="000000"/>
                     </a:solidFill>
@@ -13544,7 +13544,7 @@
               </a:ln>
               <a:extLst>
                 <a:ext uri="{91240B29-F687-4f45-9708-019B960494DF}">
-                  <a14:hiddenLine xmlns="" xmlns:a14="http://schemas.microsoft.com/office/drawing/2010/main" w="9525">
+                  <a14:hiddenLine xmlns:a14="http://schemas.microsoft.com/office/drawing/2010/main" xmlns="" w="9525">
                     <a:solidFill>
                       <a:srgbClr val="000000"/>
                     </a:solidFill>
@@ -13634,7 +13634,7 @@
               </a:ln>
               <a:extLst>
                 <a:ext uri="{91240B29-F687-4f45-9708-019B960494DF}">
-                  <a14:hiddenLine xmlns="" xmlns:a14="http://schemas.microsoft.com/office/drawing/2010/main" w="9525">
+                  <a14:hiddenLine xmlns:a14="http://schemas.microsoft.com/office/drawing/2010/main" xmlns="" w="9525">
                     <a:solidFill>
                       <a:srgbClr val="000000"/>
                     </a:solidFill>
@@ -13699,7 +13699,7 @@
               </a:ln>
               <a:extLst>
                 <a:ext uri="{91240B29-F687-4f45-9708-019B960494DF}">
-                  <a14:hiddenLine xmlns="" xmlns:a14="http://schemas.microsoft.com/office/drawing/2010/main" w="9525">
+                  <a14:hiddenLine xmlns:a14="http://schemas.microsoft.com/office/drawing/2010/main" xmlns="" w="9525">
                     <a:solidFill>
                       <a:srgbClr val="000000"/>
                     </a:solidFill>
@@ -13789,7 +13789,7 @@
               </a:ln>
               <a:extLst>
                 <a:ext uri="{91240B29-F687-4f45-9708-019B960494DF}">
-                  <a14:hiddenLine xmlns="" xmlns:a14="http://schemas.microsoft.com/office/drawing/2010/main" w="9525">
+                  <a14:hiddenLine xmlns:a14="http://schemas.microsoft.com/office/drawing/2010/main" xmlns="" w="9525">
                     <a:solidFill>
                       <a:srgbClr val="000000"/>
                     </a:solidFill>
@@ -13857,7 +13857,7 @@
               </a:ln>
               <a:extLst>
                 <a:ext uri="{91240B29-F687-4f45-9708-019B960494DF}">
-                  <a14:hiddenLine xmlns="" xmlns:a14="http://schemas.microsoft.com/office/drawing/2010/main" w="9525">
+                  <a14:hiddenLine xmlns:a14="http://schemas.microsoft.com/office/drawing/2010/main" xmlns="" w="9525">
                     <a:solidFill>
                       <a:srgbClr val="000000"/>
                     </a:solidFill>
@@ -13947,7 +13947,7 @@
               </a:ln>
               <a:extLst>
                 <a:ext uri="{91240B29-F687-4f45-9708-019B960494DF}">
-                  <a14:hiddenLine xmlns="" xmlns:a14="http://schemas.microsoft.com/office/drawing/2010/main" w="9525">
+                  <a14:hiddenLine xmlns:a14="http://schemas.microsoft.com/office/drawing/2010/main" xmlns="" w="9525">
                     <a:solidFill>
                       <a:srgbClr val="000000"/>
                     </a:solidFill>
@@ -14015,7 +14015,7 @@
               </a:ln>
               <a:extLst>
                 <a:ext uri="{91240B29-F687-4f45-9708-019B960494DF}">
-                  <a14:hiddenLine xmlns="" xmlns:a14="http://schemas.microsoft.com/office/drawing/2010/main" w="9525">
+                  <a14:hiddenLine xmlns:a14="http://schemas.microsoft.com/office/drawing/2010/main" xmlns="" w="9525">
                     <a:solidFill>
                       <a:srgbClr val="000000"/>
                     </a:solidFill>
@@ -14105,7 +14105,7 @@
               </a:ln>
               <a:extLst>
                 <a:ext uri="{91240B29-F687-4f45-9708-019B960494DF}">
-                  <a14:hiddenLine xmlns="" xmlns:a14="http://schemas.microsoft.com/office/drawing/2010/main" w="9525">
+                  <a14:hiddenLine xmlns:a14="http://schemas.microsoft.com/office/drawing/2010/main" xmlns="" w="9525">
                     <a:solidFill>
                       <a:srgbClr val="000000"/>
                     </a:solidFill>
@@ -14139,7 +14139,7 @@
               </a:ln>
               <a:extLst>
                 <a:ext uri="{91240B29-F687-4f45-9708-019B960494DF}">
-                  <a14:hiddenLine xmlns="" xmlns:a14="http://schemas.microsoft.com/office/drawing/2010/main" w="9525">
+                  <a14:hiddenLine xmlns:a14="http://schemas.microsoft.com/office/drawing/2010/main" xmlns="" w="9525">
                     <a:solidFill>
                       <a:srgbClr val="000000"/>
                     </a:solidFill>
@@ -14280,7 +14280,7 @@
             <a:fld id="{48A87A34-81AB-432B-8DAE-1953F412C126}" type="datetimeFigureOut">
               <a:rPr lang="en-US" dirty="0"/>
               <a:pPr/>
-              <a:t>7/10/2024</a:t>
+              <a:t>7/23/2024</a:t>
             </a:fld>
             <a:endParaRPr lang="en-US" dirty="0"/>
           </a:p>
@@ -18996,7 +18996,7 @@
           <a:noFill/>
           <a:extLst>
             <a:ext uri="{909E8E84-426E-40dd-AFC4-6F175D3DCCD1}">
-              <a14:hiddenFill xmlns:p14="http://schemas.microsoft.com/office/powerpoint/2010/main" xmlns:a14="http://schemas.microsoft.com/office/drawing/2010/main" xmlns:a16="http://schemas.microsoft.com/office/drawing/2014/main" xmlns="">
+              <a14:hiddenFill xmlns="" xmlns:a16="http://schemas.microsoft.com/office/drawing/2014/main" xmlns:a14="http://schemas.microsoft.com/office/drawing/2010/main" xmlns:p14="http://schemas.microsoft.com/office/powerpoint/2010/main">
                 <a:solidFill>
                   <a:srgbClr val="FFFFFF"/>
                 </a:solidFill>
@@ -19087,7 +19087,7 @@
             </a:ln>
             <a:extLst>
               <a:ext uri="{91240B29-F687-4f45-9708-019B960494DF}">
-                <a14:hiddenLine xmlns:p14="http://schemas.microsoft.com/office/powerpoint/2010/main" xmlns:a14="http://schemas.microsoft.com/office/drawing/2010/main" xmlns:a16="http://schemas.microsoft.com/office/drawing/2014/main" xmlns="" w="9525">
+                <a14:hiddenLine xmlns="" xmlns:a16="http://schemas.microsoft.com/office/drawing/2014/main" xmlns:a14="http://schemas.microsoft.com/office/drawing/2010/main" xmlns:p14="http://schemas.microsoft.com/office/powerpoint/2010/main" w="9525">
                   <a:solidFill>
                     <a:srgbClr val="000000"/>
                   </a:solidFill>
@@ -19199,7 +19199,7 @@
             </a:ln>
             <a:extLst>
               <a:ext uri="{91240B29-F687-4f45-9708-019B960494DF}">
-                <a14:hiddenLine xmlns:p14="http://schemas.microsoft.com/office/powerpoint/2010/main" xmlns:a14="http://schemas.microsoft.com/office/drawing/2010/main" xmlns:a16="http://schemas.microsoft.com/office/drawing/2014/main" xmlns="" w="9525">
+                <a14:hiddenLine xmlns="" xmlns:a16="http://schemas.microsoft.com/office/drawing/2014/main" xmlns:a14="http://schemas.microsoft.com/office/drawing/2010/main" xmlns:p14="http://schemas.microsoft.com/office/powerpoint/2010/main" w="9525">
                   <a:solidFill>
                     <a:srgbClr val="000000"/>
                   </a:solidFill>
@@ -19311,7 +19311,7 @@
             </a:ln>
             <a:extLst>
               <a:ext uri="{91240B29-F687-4f45-9708-019B960494DF}">
-                <a14:hiddenLine xmlns:p14="http://schemas.microsoft.com/office/powerpoint/2010/main" xmlns:a14="http://schemas.microsoft.com/office/drawing/2010/main" xmlns:a16="http://schemas.microsoft.com/office/drawing/2014/main" xmlns="" w="9525">
+                <a14:hiddenLine xmlns="" xmlns:a16="http://schemas.microsoft.com/office/drawing/2014/main" xmlns:a14="http://schemas.microsoft.com/office/drawing/2010/main" xmlns:p14="http://schemas.microsoft.com/office/powerpoint/2010/main" w="9525">
                   <a:solidFill>
                     <a:srgbClr val="000000"/>
                   </a:solidFill>
@@ -19367,7 +19367,7 @@
             </a:ln>
             <a:extLst>
               <a:ext uri="{91240B29-F687-4f45-9708-019B960494DF}">
-                <a14:hiddenLine xmlns:p14="http://schemas.microsoft.com/office/powerpoint/2010/main" xmlns:a14="http://schemas.microsoft.com/office/drawing/2010/main" xmlns:a16="http://schemas.microsoft.com/office/drawing/2014/main" xmlns="" w="9525">
+                <a14:hiddenLine xmlns="" xmlns:a16="http://schemas.microsoft.com/office/drawing/2014/main" xmlns:a14="http://schemas.microsoft.com/office/drawing/2010/main" xmlns:p14="http://schemas.microsoft.com/office/powerpoint/2010/main" w="9525">
                   <a:solidFill>
                     <a:srgbClr val="000000"/>
                   </a:solidFill>
@@ -19479,7 +19479,7 @@
             </a:ln>
             <a:extLst>
               <a:ext uri="{91240B29-F687-4f45-9708-019B960494DF}">
-                <a14:hiddenLine xmlns:p14="http://schemas.microsoft.com/office/powerpoint/2010/main" xmlns:a14="http://schemas.microsoft.com/office/drawing/2010/main" xmlns:a16="http://schemas.microsoft.com/office/drawing/2014/main" xmlns="" w="9525">
+                <a14:hiddenLine xmlns="" xmlns:a16="http://schemas.microsoft.com/office/drawing/2014/main" xmlns:a14="http://schemas.microsoft.com/office/drawing/2010/main" xmlns:p14="http://schemas.microsoft.com/office/powerpoint/2010/main" w="9525">
                   <a:solidFill>
                     <a:srgbClr val="000000"/>
                   </a:solidFill>
@@ -19563,7 +19563,7 @@
             </a:ln>
             <a:extLst>
               <a:ext uri="{91240B29-F687-4f45-9708-019B960494DF}">
-                <a14:hiddenLine xmlns:p14="http://schemas.microsoft.com/office/powerpoint/2010/main" xmlns:a14="http://schemas.microsoft.com/office/drawing/2010/main" xmlns:a16="http://schemas.microsoft.com/office/drawing/2014/main" xmlns="" w="9525">
+                <a14:hiddenLine xmlns="" xmlns:a16="http://schemas.microsoft.com/office/drawing/2014/main" xmlns:a14="http://schemas.microsoft.com/office/drawing/2010/main" xmlns:p14="http://schemas.microsoft.com/office/powerpoint/2010/main" w="9525">
                   <a:solidFill>
                     <a:srgbClr val="000000"/>
                   </a:solidFill>
@@ -19647,7 +19647,7 @@
             </a:ln>
             <a:extLst>
               <a:ext uri="{91240B29-F687-4f45-9708-019B960494DF}">
-                <a14:hiddenLine xmlns:p14="http://schemas.microsoft.com/office/powerpoint/2010/main" xmlns:a14="http://schemas.microsoft.com/office/drawing/2010/main" xmlns:a16="http://schemas.microsoft.com/office/drawing/2014/main" xmlns="" w="9525">
+                <a14:hiddenLine xmlns="" xmlns:a16="http://schemas.microsoft.com/office/drawing/2014/main" xmlns:a14="http://schemas.microsoft.com/office/drawing/2010/main" xmlns:p14="http://schemas.microsoft.com/office/powerpoint/2010/main" w="9525">
                   <a:solidFill>
                     <a:srgbClr val="000000"/>
                   </a:solidFill>
@@ -19759,7 +19759,7 @@
             </a:ln>
             <a:extLst>
               <a:ext uri="{91240B29-F687-4f45-9708-019B960494DF}">
-                <a14:hiddenLine xmlns:p14="http://schemas.microsoft.com/office/powerpoint/2010/main" xmlns:a14="http://schemas.microsoft.com/office/drawing/2010/main" xmlns:a16="http://schemas.microsoft.com/office/drawing/2014/main" xmlns="" w="9525">
+                <a14:hiddenLine xmlns="" xmlns:a16="http://schemas.microsoft.com/office/drawing/2014/main" xmlns:a14="http://schemas.microsoft.com/office/drawing/2010/main" xmlns:p14="http://schemas.microsoft.com/office/powerpoint/2010/main" w="9525">
                   <a:solidFill>
                     <a:srgbClr val="000000"/>
                   </a:solidFill>
@@ -19843,7 +19843,7 @@
             </a:ln>
             <a:extLst>
               <a:ext uri="{91240B29-F687-4f45-9708-019B960494DF}">
-                <a14:hiddenLine xmlns:p14="http://schemas.microsoft.com/office/powerpoint/2010/main" xmlns:a14="http://schemas.microsoft.com/office/drawing/2010/main" xmlns:a16="http://schemas.microsoft.com/office/drawing/2014/main" xmlns="" w="9525">
+                <a14:hiddenLine xmlns="" xmlns:a16="http://schemas.microsoft.com/office/drawing/2014/main" xmlns:a14="http://schemas.microsoft.com/office/drawing/2010/main" xmlns:p14="http://schemas.microsoft.com/office/powerpoint/2010/main" w="9525">
                   <a:solidFill>
                     <a:srgbClr val="000000"/>
                   </a:solidFill>
@@ -19927,7 +19927,7 @@
             </a:ln>
             <a:extLst>
               <a:ext uri="{91240B29-F687-4f45-9708-019B960494DF}">
-                <a14:hiddenLine xmlns:p14="http://schemas.microsoft.com/office/powerpoint/2010/main" xmlns:a14="http://schemas.microsoft.com/office/drawing/2010/main" xmlns:a16="http://schemas.microsoft.com/office/drawing/2014/main" xmlns="" w="9525">
+                <a14:hiddenLine xmlns="" xmlns:a16="http://schemas.microsoft.com/office/drawing/2014/main" xmlns:a14="http://schemas.microsoft.com/office/drawing/2010/main" xmlns:p14="http://schemas.microsoft.com/office/powerpoint/2010/main" w="9525">
                   <a:solidFill>
                     <a:srgbClr val="000000"/>
                   </a:solidFill>
@@ -20039,7 +20039,7 @@
             </a:ln>
             <a:extLst>
               <a:ext uri="{91240B29-F687-4f45-9708-019B960494DF}">
-                <a14:hiddenLine xmlns:p14="http://schemas.microsoft.com/office/powerpoint/2010/main" xmlns:a14="http://schemas.microsoft.com/office/drawing/2010/main" xmlns:a16="http://schemas.microsoft.com/office/drawing/2014/main" xmlns="" w="9525">
+                <a14:hiddenLine xmlns="" xmlns:a16="http://schemas.microsoft.com/office/drawing/2014/main" xmlns:a14="http://schemas.microsoft.com/office/drawing/2010/main" xmlns:p14="http://schemas.microsoft.com/office/powerpoint/2010/main" w="9525">
                   <a:solidFill>
                     <a:srgbClr val="000000"/>
                   </a:solidFill>
@@ -20151,7 +20151,7 @@
             </a:ln>
             <a:extLst>
               <a:ext uri="{91240B29-F687-4f45-9708-019B960494DF}">
-                <a14:hiddenLine xmlns:p14="http://schemas.microsoft.com/office/powerpoint/2010/main" xmlns:a14="http://schemas.microsoft.com/office/drawing/2010/main" xmlns:a16="http://schemas.microsoft.com/office/drawing/2014/main" xmlns="" w="9525">
+                <a14:hiddenLine xmlns="" xmlns:a16="http://schemas.microsoft.com/office/drawing/2014/main" xmlns:a14="http://schemas.microsoft.com/office/drawing/2010/main" xmlns:p14="http://schemas.microsoft.com/office/powerpoint/2010/main" w="9525">
                   <a:solidFill>
                     <a:srgbClr val="000000"/>
                   </a:solidFill>
@@ -20235,7 +20235,7 @@
             </a:ln>
             <a:extLst>
               <a:ext uri="{91240B29-F687-4f45-9708-019B960494DF}">
-                <a14:hiddenLine xmlns:p14="http://schemas.microsoft.com/office/powerpoint/2010/main" xmlns:a14="http://schemas.microsoft.com/office/drawing/2010/main" xmlns:a16="http://schemas.microsoft.com/office/drawing/2014/main" xmlns="" w="9525">
+                <a14:hiddenLine xmlns="" xmlns:a16="http://schemas.microsoft.com/office/drawing/2014/main" xmlns:a14="http://schemas.microsoft.com/office/drawing/2010/main" xmlns:p14="http://schemas.microsoft.com/office/powerpoint/2010/main" w="9525">
                   <a:solidFill>
                     <a:srgbClr val="000000"/>
                   </a:solidFill>
@@ -20367,7 +20367,7 @@
             </a:ln>
             <a:extLst>
               <a:ext uri="{91240B29-F687-4f45-9708-019B960494DF}">
-                <a14:hiddenLine xmlns:p14="http://schemas.microsoft.com/office/powerpoint/2010/main" xmlns:a14="http://schemas.microsoft.com/office/drawing/2010/main" xmlns:a16="http://schemas.microsoft.com/office/drawing/2014/main" xmlns="" w="9525">
+                <a14:hiddenLine xmlns="" xmlns:a16="http://schemas.microsoft.com/office/drawing/2014/main" xmlns:a14="http://schemas.microsoft.com/office/drawing/2010/main" xmlns:p14="http://schemas.microsoft.com/office/powerpoint/2010/main" w="9525">
                   <a:solidFill>
                     <a:srgbClr val="000000"/>
                   </a:solidFill>
@@ -20451,7 +20451,7 @@
             </a:ln>
             <a:extLst>
               <a:ext uri="{91240B29-F687-4f45-9708-019B960494DF}">
-                <a14:hiddenLine xmlns:p14="http://schemas.microsoft.com/office/powerpoint/2010/main" xmlns:a14="http://schemas.microsoft.com/office/drawing/2010/main" xmlns:a16="http://schemas.microsoft.com/office/drawing/2014/main" xmlns="" w="9525">
+                <a14:hiddenLine xmlns="" xmlns:a16="http://schemas.microsoft.com/office/drawing/2014/main" xmlns:a14="http://schemas.microsoft.com/office/drawing/2010/main" xmlns:p14="http://schemas.microsoft.com/office/powerpoint/2010/main" w="9525">
                   <a:solidFill>
                     <a:srgbClr val="000000"/>
                   </a:solidFill>
@@ -20563,7 +20563,7 @@
             </a:ln>
             <a:extLst>
               <a:ext uri="{91240B29-F687-4f45-9708-019B960494DF}">
-                <a14:hiddenLine xmlns:p14="http://schemas.microsoft.com/office/powerpoint/2010/main" xmlns:a14="http://schemas.microsoft.com/office/drawing/2010/main" xmlns:a16="http://schemas.microsoft.com/office/drawing/2014/main" xmlns="" w="9525">
+                <a14:hiddenLine xmlns="" xmlns:a16="http://schemas.microsoft.com/office/drawing/2014/main" xmlns:a14="http://schemas.microsoft.com/office/drawing/2010/main" xmlns:p14="http://schemas.microsoft.com/office/powerpoint/2010/main" w="9525">
                   <a:solidFill>
                     <a:srgbClr val="000000"/>
                   </a:solidFill>
@@ -20675,7 +20675,7 @@
             </a:ln>
             <a:extLst>
               <a:ext uri="{91240B29-F687-4f45-9708-019B960494DF}">
-                <a14:hiddenLine xmlns:p14="http://schemas.microsoft.com/office/powerpoint/2010/main" xmlns:a14="http://schemas.microsoft.com/office/drawing/2010/main" xmlns:a16="http://schemas.microsoft.com/office/drawing/2014/main" xmlns="" w="9525">
+                <a14:hiddenLine xmlns="" xmlns:a16="http://schemas.microsoft.com/office/drawing/2014/main" xmlns:a14="http://schemas.microsoft.com/office/drawing/2010/main" xmlns:p14="http://schemas.microsoft.com/office/powerpoint/2010/main" w="9525">
                   <a:solidFill>
                     <a:srgbClr val="000000"/>
                   </a:solidFill>
@@ -20759,7 +20759,7 @@
             </a:ln>
             <a:extLst>
               <a:ext uri="{91240B29-F687-4f45-9708-019B960494DF}">
-                <a14:hiddenLine xmlns:p14="http://schemas.microsoft.com/office/powerpoint/2010/main" xmlns:a14="http://schemas.microsoft.com/office/drawing/2010/main" xmlns:a16="http://schemas.microsoft.com/office/drawing/2014/main" xmlns="" w="9525">
+                <a14:hiddenLine xmlns="" xmlns:a16="http://schemas.microsoft.com/office/drawing/2014/main" xmlns:a14="http://schemas.microsoft.com/office/drawing/2010/main" xmlns:p14="http://schemas.microsoft.com/office/powerpoint/2010/main" w="9525">
                   <a:solidFill>
                     <a:srgbClr val="000000"/>
                   </a:solidFill>
@@ -20871,7 +20871,7 @@
             </a:ln>
             <a:extLst>
               <a:ext uri="{91240B29-F687-4f45-9708-019B960494DF}">
-                <a14:hiddenLine xmlns:p14="http://schemas.microsoft.com/office/powerpoint/2010/main" xmlns:a14="http://schemas.microsoft.com/office/drawing/2010/main" xmlns:a16="http://schemas.microsoft.com/office/drawing/2014/main" xmlns="" w="9525">
+                <a14:hiddenLine xmlns="" xmlns:a16="http://schemas.microsoft.com/office/drawing/2014/main" xmlns:a14="http://schemas.microsoft.com/office/drawing/2010/main" xmlns:p14="http://schemas.microsoft.com/office/powerpoint/2010/main" w="9525">
                   <a:solidFill>
                     <a:srgbClr val="000000"/>
                   </a:solidFill>
@@ -20983,7 +20983,7 @@
             </a:ln>
             <a:extLst>
               <a:ext uri="{91240B29-F687-4f45-9708-019B960494DF}">
-                <a14:hiddenLine xmlns:p14="http://schemas.microsoft.com/office/powerpoint/2010/main" xmlns:a14="http://schemas.microsoft.com/office/drawing/2010/main" xmlns:a16="http://schemas.microsoft.com/office/drawing/2014/main" xmlns="" w="9525">
+                <a14:hiddenLine xmlns="" xmlns:a16="http://schemas.microsoft.com/office/drawing/2014/main" xmlns:a14="http://schemas.microsoft.com/office/drawing/2010/main" xmlns:p14="http://schemas.microsoft.com/office/powerpoint/2010/main" w="9525">
                   <a:solidFill>
                     <a:srgbClr val="000000"/>
                   </a:solidFill>
@@ -21061,7 +21061,7 @@
             </a:ln>
             <a:extLst>
               <a:ext uri="{91240B29-F687-4f45-9708-019B960494DF}">
-                <a14:hiddenLine xmlns:p14="http://schemas.microsoft.com/office/powerpoint/2010/main" xmlns:a14="http://schemas.microsoft.com/office/drawing/2010/main" xmlns:a16="http://schemas.microsoft.com/office/drawing/2014/main" xmlns="" w="9525">
+                <a14:hiddenLine xmlns="" xmlns:a16="http://schemas.microsoft.com/office/drawing/2014/main" xmlns:a14="http://schemas.microsoft.com/office/drawing/2010/main" xmlns:p14="http://schemas.microsoft.com/office/powerpoint/2010/main" w="9525">
                   <a:solidFill>
                     <a:srgbClr val="000000"/>
                   </a:solidFill>
@@ -21173,7 +21173,7 @@
             </a:ln>
             <a:extLst>
               <a:ext uri="{91240B29-F687-4f45-9708-019B960494DF}">
-                <a14:hiddenLine xmlns:p14="http://schemas.microsoft.com/office/powerpoint/2010/main" xmlns:a14="http://schemas.microsoft.com/office/drawing/2010/main" xmlns:a16="http://schemas.microsoft.com/office/drawing/2014/main" xmlns="" w="9525">
+                <a14:hiddenLine xmlns="" xmlns:a16="http://schemas.microsoft.com/office/drawing/2014/main" xmlns:a14="http://schemas.microsoft.com/office/drawing/2010/main" xmlns:p14="http://schemas.microsoft.com/office/powerpoint/2010/main" w="9525">
                   <a:solidFill>
                     <a:srgbClr val="000000"/>
                   </a:solidFill>
@@ -21251,7 +21251,7 @@
             </a:ln>
             <a:extLst>
               <a:ext uri="{91240B29-F687-4f45-9708-019B960494DF}">
-                <a14:hiddenLine xmlns:p14="http://schemas.microsoft.com/office/powerpoint/2010/main" xmlns:a14="http://schemas.microsoft.com/office/drawing/2010/main" xmlns:a16="http://schemas.microsoft.com/office/drawing/2014/main" xmlns="" w="9525">
+                <a14:hiddenLine xmlns="" xmlns:a16="http://schemas.microsoft.com/office/drawing/2014/main" xmlns:a14="http://schemas.microsoft.com/office/drawing/2010/main" xmlns:p14="http://schemas.microsoft.com/office/powerpoint/2010/main" w="9525">
                   <a:solidFill>
                     <a:srgbClr val="000000"/>
                   </a:solidFill>
@@ -21363,7 +21363,7 @@
             </a:ln>
             <a:extLst>
               <a:ext uri="{91240B29-F687-4f45-9708-019B960494DF}">
-                <a14:hiddenLine xmlns:p14="http://schemas.microsoft.com/office/powerpoint/2010/main" xmlns:a14="http://schemas.microsoft.com/office/drawing/2010/main" xmlns:a16="http://schemas.microsoft.com/office/drawing/2014/main" xmlns="" w="9525">
+                <a14:hiddenLine xmlns="" xmlns:a16="http://schemas.microsoft.com/office/drawing/2014/main" xmlns:a14="http://schemas.microsoft.com/office/drawing/2010/main" xmlns:p14="http://schemas.microsoft.com/office/powerpoint/2010/main" w="9525">
                   <a:solidFill>
                     <a:srgbClr val="000000"/>
                   </a:solidFill>
@@ -21453,7 +21453,7 @@
             </a:ln>
             <a:extLst>
               <a:ext uri="{91240B29-F687-4f45-9708-019B960494DF}">
-                <a14:hiddenLine xmlns:p14="http://schemas.microsoft.com/office/powerpoint/2010/main" xmlns:a14="http://schemas.microsoft.com/office/drawing/2010/main" xmlns:a16="http://schemas.microsoft.com/office/drawing/2014/main" xmlns="" w="9525">
+                <a14:hiddenLine xmlns="" xmlns:a16="http://schemas.microsoft.com/office/drawing/2014/main" xmlns:a14="http://schemas.microsoft.com/office/drawing/2010/main" xmlns:p14="http://schemas.microsoft.com/office/powerpoint/2010/main" w="9525">
                   <a:solidFill>
                     <a:srgbClr val="000000"/>
                   </a:solidFill>
@@ -21565,7 +21565,7 @@
             </a:ln>
             <a:extLst>
               <a:ext uri="{91240B29-F687-4f45-9708-019B960494DF}">
-                <a14:hiddenLine xmlns:p14="http://schemas.microsoft.com/office/powerpoint/2010/main" xmlns:a14="http://schemas.microsoft.com/office/drawing/2010/main" xmlns:a16="http://schemas.microsoft.com/office/drawing/2014/main" xmlns="" w="9525">
+                <a14:hiddenLine xmlns="" xmlns:a16="http://schemas.microsoft.com/office/drawing/2014/main" xmlns:a14="http://schemas.microsoft.com/office/drawing/2010/main" xmlns:p14="http://schemas.microsoft.com/office/powerpoint/2010/main" w="9525">
                   <a:solidFill>
                     <a:srgbClr val="000000"/>
                   </a:solidFill>
@@ -21655,7 +21655,7 @@
             </a:ln>
             <a:extLst>
               <a:ext uri="{91240B29-F687-4f45-9708-019B960494DF}">
-                <a14:hiddenLine xmlns:p14="http://schemas.microsoft.com/office/powerpoint/2010/main" xmlns:a14="http://schemas.microsoft.com/office/drawing/2010/main" xmlns:a16="http://schemas.microsoft.com/office/drawing/2014/main" xmlns="" w="9525">
+                <a14:hiddenLine xmlns="" xmlns:a16="http://schemas.microsoft.com/office/drawing/2014/main" xmlns:a14="http://schemas.microsoft.com/office/drawing/2010/main" xmlns:p14="http://schemas.microsoft.com/office/powerpoint/2010/main" w="9525">
                   <a:solidFill>
                     <a:srgbClr val="000000"/>
                   </a:solidFill>
@@ -21767,7 +21767,7 @@
             </a:ln>
             <a:extLst>
               <a:ext uri="{91240B29-F687-4f45-9708-019B960494DF}">
-                <a14:hiddenLine xmlns:p14="http://schemas.microsoft.com/office/powerpoint/2010/main" xmlns:a14="http://schemas.microsoft.com/office/drawing/2010/main" xmlns:a16="http://schemas.microsoft.com/office/drawing/2014/main" xmlns="" w="9525">
+                <a14:hiddenLine xmlns="" xmlns:a16="http://schemas.microsoft.com/office/drawing/2014/main" xmlns:a14="http://schemas.microsoft.com/office/drawing/2010/main" xmlns:p14="http://schemas.microsoft.com/office/powerpoint/2010/main" w="9525">
                   <a:solidFill>
                     <a:srgbClr val="000000"/>
                   </a:solidFill>
@@ -21823,7 +21823,7 @@
             </a:ln>
             <a:extLst>
               <a:ext uri="{91240B29-F687-4f45-9708-019B960494DF}">
-                <a14:hiddenLine xmlns:p14="http://schemas.microsoft.com/office/powerpoint/2010/main" xmlns:a14="http://schemas.microsoft.com/office/drawing/2010/main" xmlns:a16="http://schemas.microsoft.com/office/drawing/2014/main" xmlns="" w="9525">
+                <a14:hiddenLine xmlns="" xmlns:a16="http://schemas.microsoft.com/office/drawing/2014/main" xmlns:a14="http://schemas.microsoft.com/office/drawing/2010/main" xmlns:p14="http://schemas.microsoft.com/office/powerpoint/2010/main" w="9525">
                   <a:solidFill>
                     <a:srgbClr val="000000"/>
                   </a:solidFill>
@@ -21935,7 +21935,7 @@
             </a:ln>
             <a:extLst>
               <a:ext uri="{91240B29-F687-4f45-9708-019B960494DF}">
-                <a14:hiddenLine xmlns:p14="http://schemas.microsoft.com/office/powerpoint/2010/main" xmlns:a14="http://schemas.microsoft.com/office/drawing/2010/main" xmlns:a16="http://schemas.microsoft.com/office/drawing/2014/main" xmlns="" w="9525">
+                <a14:hiddenLine xmlns="" xmlns:a16="http://schemas.microsoft.com/office/drawing/2014/main" xmlns:a14="http://schemas.microsoft.com/office/drawing/2010/main" xmlns:p14="http://schemas.microsoft.com/office/powerpoint/2010/main" w="9525">
                   <a:solidFill>
                     <a:srgbClr val="000000"/>
                   </a:solidFill>
@@ -22019,7 +22019,7 @@
             </a:ln>
             <a:extLst>
               <a:ext uri="{91240B29-F687-4f45-9708-019B960494DF}">
-                <a14:hiddenLine xmlns:p14="http://schemas.microsoft.com/office/powerpoint/2010/main" xmlns:a14="http://schemas.microsoft.com/office/drawing/2010/main" xmlns:a16="http://schemas.microsoft.com/office/drawing/2014/main" xmlns="" w="9525">
+                <a14:hiddenLine xmlns="" xmlns:a16="http://schemas.microsoft.com/office/drawing/2014/main" xmlns:a14="http://schemas.microsoft.com/office/drawing/2010/main" xmlns:p14="http://schemas.microsoft.com/office/powerpoint/2010/main" w="9525">
                   <a:solidFill>
                     <a:srgbClr val="000000"/>
                   </a:solidFill>
@@ -22103,7 +22103,7 @@
             </a:ln>
             <a:extLst>
               <a:ext uri="{91240B29-F687-4f45-9708-019B960494DF}">
-                <a14:hiddenLine xmlns:p14="http://schemas.microsoft.com/office/powerpoint/2010/main" xmlns:a14="http://schemas.microsoft.com/office/drawing/2010/main" xmlns:a16="http://schemas.microsoft.com/office/drawing/2014/main" xmlns="" w="9525">
+                <a14:hiddenLine xmlns="" xmlns:a16="http://schemas.microsoft.com/office/drawing/2014/main" xmlns:a14="http://schemas.microsoft.com/office/drawing/2010/main" xmlns:p14="http://schemas.microsoft.com/office/powerpoint/2010/main" w="9525">
                   <a:solidFill>
                     <a:srgbClr val="000000"/>
                   </a:solidFill>
@@ -22215,7 +22215,7 @@
             </a:ln>
             <a:extLst>
               <a:ext uri="{91240B29-F687-4f45-9708-019B960494DF}">
-                <a14:hiddenLine xmlns:p14="http://schemas.microsoft.com/office/powerpoint/2010/main" xmlns:a14="http://schemas.microsoft.com/office/drawing/2010/main" xmlns:a16="http://schemas.microsoft.com/office/drawing/2014/main" xmlns="" w="9525">
+                <a14:hiddenLine xmlns="" xmlns:a16="http://schemas.microsoft.com/office/drawing/2014/main" xmlns:a14="http://schemas.microsoft.com/office/drawing/2010/main" xmlns:p14="http://schemas.microsoft.com/office/powerpoint/2010/main" w="9525">
                   <a:solidFill>
                     <a:srgbClr val="000000"/>
                   </a:solidFill>
@@ -22305,7 +22305,7 @@
             </a:ln>
             <a:extLst>
               <a:ext uri="{91240B29-F687-4f45-9708-019B960494DF}">
-                <a14:hiddenLine xmlns:p14="http://schemas.microsoft.com/office/powerpoint/2010/main" xmlns:a14="http://schemas.microsoft.com/office/drawing/2010/main" xmlns:a16="http://schemas.microsoft.com/office/drawing/2014/main" xmlns="" w="9525">
+                <a14:hiddenLine xmlns="" xmlns:a16="http://schemas.microsoft.com/office/drawing/2014/main" xmlns:a14="http://schemas.microsoft.com/office/drawing/2010/main" xmlns:p14="http://schemas.microsoft.com/office/powerpoint/2010/main" w="9525">
                   <a:solidFill>
                     <a:srgbClr val="000000"/>
                   </a:solidFill>
@@ -22389,7 +22389,7 @@
             </a:ln>
             <a:extLst>
               <a:ext uri="{91240B29-F687-4f45-9708-019B960494DF}">
-                <a14:hiddenLine xmlns:p14="http://schemas.microsoft.com/office/powerpoint/2010/main" xmlns:a14="http://schemas.microsoft.com/office/drawing/2010/main" xmlns:a16="http://schemas.microsoft.com/office/drawing/2014/main" xmlns="" w="9525">
+                <a14:hiddenLine xmlns="" xmlns:a16="http://schemas.microsoft.com/office/drawing/2014/main" xmlns:a14="http://schemas.microsoft.com/office/drawing/2010/main" xmlns:p14="http://schemas.microsoft.com/office/powerpoint/2010/main" w="9525">
                   <a:solidFill>
                     <a:srgbClr val="000000"/>
                   </a:solidFill>
@@ -22501,7 +22501,7 @@
             </a:ln>
             <a:extLst>
               <a:ext uri="{91240B29-F687-4f45-9708-019B960494DF}">
-                <a14:hiddenLine xmlns:p14="http://schemas.microsoft.com/office/powerpoint/2010/main" xmlns:a14="http://schemas.microsoft.com/office/drawing/2010/main" xmlns:a16="http://schemas.microsoft.com/office/drawing/2014/main" xmlns="" w="9525">
+                <a14:hiddenLine xmlns="" xmlns:a16="http://schemas.microsoft.com/office/drawing/2014/main" xmlns:a14="http://schemas.microsoft.com/office/drawing/2010/main" xmlns:p14="http://schemas.microsoft.com/office/powerpoint/2010/main" w="9525">
                   <a:solidFill>
                     <a:srgbClr val="000000"/>
                   </a:solidFill>
@@ -22585,7 +22585,7 @@
             </a:ln>
             <a:extLst>
               <a:ext uri="{91240B29-F687-4f45-9708-019B960494DF}">
-                <a14:hiddenLine xmlns:p14="http://schemas.microsoft.com/office/powerpoint/2010/main" xmlns:a14="http://schemas.microsoft.com/office/drawing/2010/main" xmlns:a16="http://schemas.microsoft.com/office/drawing/2014/main" xmlns="" w="9525">
+                <a14:hiddenLine xmlns="" xmlns:a16="http://schemas.microsoft.com/office/drawing/2014/main" xmlns:a14="http://schemas.microsoft.com/office/drawing/2010/main" xmlns:p14="http://schemas.microsoft.com/office/powerpoint/2010/main" w="9525">
                   <a:solidFill>
                     <a:srgbClr val="000000"/>
                   </a:solidFill>
@@ -22697,7 +22697,7 @@
             </a:ln>
             <a:extLst>
               <a:ext uri="{91240B29-F687-4f45-9708-019B960494DF}">
-                <a14:hiddenLine xmlns:p14="http://schemas.microsoft.com/office/powerpoint/2010/main" xmlns:a14="http://schemas.microsoft.com/office/drawing/2010/main" xmlns:a16="http://schemas.microsoft.com/office/drawing/2014/main" xmlns="" w="9525">
+                <a14:hiddenLine xmlns="" xmlns:a16="http://schemas.microsoft.com/office/drawing/2014/main" xmlns:a14="http://schemas.microsoft.com/office/drawing/2010/main" xmlns:p14="http://schemas.microsoft.com/office/powerpoint/2010/main" w="9525">
                   <a:solidFill>
                     <a:srgbClr val="000000"/>
                   </a:solidFill>
@@ -22781,7 +22781,7 @@
             </a:ln>
             <a:extLst>
               <a:ext uri="{91240B29-F687-4f45-9708-019B960494DF}">
-                <a14:hiddenLine xmlns:p14="http://schemas.microsoft.com/office/powerpoint/2010/main" xmlns:a14="http://schemas.microsoft.com/office/drawing/2010/main" xmlns:a16="http://schemas.microsoft.com/office/drawing/2014/main" xmlns="" w="9525">
+                <a14:hiddenLine xmlns="" xmlns:a16="http://schemas.microsoft.com/office/drawing/2014/main" xmlns:a14="http://schemas.microsoft.com/office/drawing/2010/main" xmlns:p14="http://schemas.microsoft.com/office/powerpoint/2010/main" w="9525">
                   <a:solidFill>
                     <a:srgbClr val="000000"/>
                   </a:solidFill>
@@ -22893,7 +22893,7 @@
             </a:ln>
             <a:extLst>
               <a:ext uri="{91240B29-F687-4f45-9708-019B960494DF}">
-                <a14:hiddenLine xmlns:p14="http://schemas.microsoft.com/office/powerpoint/2010/main" xmlns:a14="http://schemas.microsoft.com/office/drawing/2010/main" xmlns:a16="http://schemas.microsoft.com/office/drawing/2014/main" xmlns="" w="9525">
+                <a14:hiddenLine xmlns="" xmlns:a16="http://schemas.microsoft.com/office/drawing/2014/main" xmlns:a14="http://schemas.microsoft.com/office/drawing/2010/main" xmlns:p14="http://schemas.microsoft.com/office/powerpoint/2010/main" w="9525">
                   <a:solidFill>
                     <a:srgbClr val="000000"/>
                   </a:solidFill>
@@ -22949,7 +22949,7 @@
             </a:ln>
             <a:extLst>
               <a:ext uri="{91240B29-F687-4f45-9708-019B960494DF}">
-                <a14:hiddenLine xmlns:p14="http://schemas.microsoft.com/office/powerpoint/2010/main" xmlns:a14="http://schemas.microsoft.com/office/drawing/2010/main" xmlns:a16="http://schemas.microsoft.com/office/drawing/2014/main" xmlns="" w="9525">
+                <a14:hiddenLine xmlns="" xmlns:a16="http://schemas.microsoft.com/office/drawing/2014/main" xmlns:a14="http://schemas.microsoft.com/office/drawing/2010/main" xmlns:p14="http://schemas.microsoft.com/office/powerpoint/2010/main" w="9525">
                   <a:solidFill>
                     <a:srgbClr val="000000"/>
                   </a:solidFill>
@@ -23036,7 +23036,7 @@
             </a:ln>
             <a:extLst>
               <a:ext uri="{91240B29-F687-4f45-9708-019B960494DF}">
-                <a14:hiddenLine xmlns:p14="http://schemas.microsoft.com/office/powerpoint/2010/main" xmlns:a14="http://schemas.microsoft.com/office/drawing/2010/main" xmlns:a16="http://schemas.microsoft.com/office/drawing/2014/main" xmlns="" w="9525">
+                <a14:hiddenLine xmlns="" xmlns:a16="http://schemas.microsoft.com/office/drawing/2014/main" xmlns:a14="http://schemas.microsoft.com/office/drawing/2010/main" xmlns:p14="http://schemas.microsoft.com/office/powerpoint/2010/main" w="9525">
                   <a:solidFill>
                     <a:srgbClr val="000000"/>
                   </a:solidFill>
@@ -23148,7 +23148,7 @@
             </a:ln>
             <a:extLst>
               <a:ext uri="{91240B29-F687-4f45-9708-019B960494DF}">
-                <a14:hiddenLine xmlns:p14="http://schemas.microsoft.com/office/powerpoint/2010/main" xmlns:a14="http://schemas.microsoft.com/office/drawing/2010/main" xmlns:a16="http://schemas.microsoft.com/office/drawing/2014/main" xmlns="" w="9525">
+                <a14:hiddenLine xmlns="" xmlns:a16="http://schemas.microsoft.com/office/drawing/2014/main" xmlns:a14="http://schemas.microsoft.com/office/drawing/2010/main" xmlns:p14="http://schemas.microsoft.com/office/powerpoint/2010/main" w="9525">
                   <a:solidFill>
                     <a:srgbClr val="000000"/>
                   </a:solidFill>
@@ -23232,7 +23232,7 @@
             </a:ln>
             <a:extLst>
               <a:ext uri="{91240B29-F687-4f45-9708-019B960494DF}">
-                <a14:hiddenLine xmlns:p14="http://schemas.microsoft.com/office/powerpoint/2010/main" xmlns:a14="http://schemas.microsoft.com/office/drawing/2010/main" xmlns:a16="http://schemas.microsoft.com/office/drawing/2014/main" xmlns="" w="9525">
+                <a14:hiddenLine xmlns="" xmlns:a16="http://schemas.microsoft.com/office/drawing/2014/main" xmlns:a14="http://schemas.microsoft.com/office/drawing/2010/main" xmlns:p14="http://schemas.microsoft.com/office/powerpoint/2010/main" w="9525">
                   <a:solidFill>
                     <a:srgbClr val="000000"/>
                   </a:solidFill>
@@ -23344,7 +23344,7 @@
             </a:ln>
             <a:extLst>
               <a:ext uri="{91240B29-F687-4f45-9708-019B960494DF}">
-                <a14:hiddenLine xmlns:p14="http://schemas.microsoft.com/office/powerpoint/2010/main" xmlns:a14="http://schemas.microsoft.com/office/drawing/2010/main" xmlns:a16="http://schemas.microsoft.com/office/drawing/2014/main" xmlns="" w="9525">
+                <a14:hiddenLine xmlns="" xmlns:a16="http://schemas.microsoft.com/office/drawing/2014/main" xmlns:a14="http://schemas.microsoft.com/office/drawing/2010/main" xmlns:p14="http://schemas.microsoft.com/office/powerpoint/2010/main" w="9525">
                   <a:solidFill>
                     <a:srgbClr val="000000"/>
                   </a:solidFill>
@@ -23456,7 +23456,7 @@
             </a:ln>
             <a:extLst>
               <a:ext uri="{91240B29-F687-4f45-9708-019B960494DF}">
-                <a14:hiddenLine xmlns:p14="http://schemas.microsoft.com/office/powerpoint/2010/main" xmlns:a14="http://schemas.microsoft.com/office/drawing/2010/main" xmlns:a16="http://schemas.microsoft.com/office/drawing/2014/main" xmlns="" w="9525">
+                <a14:hiddenLine xmlns="" xmlns:a16="http://schemas.microsoft.com/office/drawing/2014/main" xmlns:a14="http://schemas.microsoft.com/office/drawing/2010/main" xmlns:p14="http://schemas.microsoft.com/office/powerpoint/2010/main" w="9525">
                   <a:solidFill>
                     <a:srgbClr val="000000"/>
                   </a:solidFill>
@@ -23543,7 +23543,7 @@
             </a:ln>
             <a:extLst>
               <a:ext uri="{91240B29-F687-4f45-9708-019B960494DF}">
-                <a14:hiddenLine xmlns:p14="http://schemas.microsoft.com/office/powerpoint/2010/main" xmlns:a14="http://schemas.microsoft.com/office/drawing/2010/main" xmlns:a16="http://schemas.microsoft.com/office/drawing/2014/main" xmlns="" w="9525">
+                <a14:hiddenLine xmlns="" xmlns:a16="http://schemas.microsoft.com/office/drawing/2014/main" xmlns:a14="http://schemas.microsoft.com/office/drawing/2010/main" xmlns:p14="http://schemas.microsoft.com/office/powerpoint/2010/main" w="9525">
                   <a:solidFill>
                     <a:srgbClr val="000000"/>
                   </a:solidFill>
@@ -23627,7 +23627,7 @@
             </a:ln>
             <a:extLst>
               <a:ext uri="{91240B29-F687-4f45-9708-019B960494DF}">
-                <a14:hiddenLine xmlns:p14="http://schemas.microsoft.com/office/powerpoint/2010/main" xmlns:a14="http://schemas.microsoft.com/office/drawing/2010/main" xmlns:a16="http://schemas.microsoft.com/office/drawing/2014/main" xmlns="" w="9525">
+                <a14:hiddenLine xmlns="" xmlns:a16="http://schemas.microsoft.com/office/drawing/2014/main" xmlns:a14="http://schemas.microsoft.com/office/drawing/2010/main" xmlns:p14="http://schemas.microsoft.com/office/powerpoint/2010/main" w="9525">
                   <a:solidFill>
                     <a:srgbClr val="000000"/>
                   </a:solidFill>
@@ -23739,7 +23739,7 @@
             </a:ln>
             <a:extLst>
               <a:ext uri="{91240B29-F687-4f45-9708-019B960494DF}">
-                <a14:hiddenLine xmlns:p14="http://schemas.microsoft.com/office/powerpoint/2010/main" xmlns:a14="http://schemas.microsoft.com/office/drawing/2010/main" xmlns:a16="http://schemas.microsoft.com/office/drawing/2014/main" xmlns="" w="9525">
+                <a14:hiddenLine xmlns="" xmlns:a16="http://schemas.microsoft.com/office/drawing/2014/main" xmlns:a14="http://schemas.microsoft.com/office/drawing/2010/main" xmlns:p14="http://schemas.microsoft.com/office/powerpoint/2010/main" w="9525">
                   <a:solidFill>
                     <a:srgbClr val="000000"/>
                   </a:solidFill>
@@ -23851,7 +23851,7 @@
             </a:ln>
             <a:extLst>
               <a:ext uri="{91240B29-F687-4f45-9708-019B960494DF}">
-                <a14:hiddenLine xmlns:p14="http://schemas.microsoft.com/office/powerpoint/2010/main" xmlns:a14="http://schemas.microsoft.com/office/drawing/2010/main" xmlns:a16="http://schemas.microsoft.com/office/drawing/2014/main" xmlns="" w="9525">
+                <a14:hiddenLine xmlns="" xmlns:a16="http://schemas.microsoft.com/office/drawing/2014/main" xmlns:a14="http://schemas.microsoft.com/office/drawing/2010/main" xmlns:p14="http://schemas.microsoft.com/office/powerpoint/2010/main" w="9525">
                   <a:solidFill>
                     <a:srgbClr val="000000"/>
                   </a:solidFill>
@@ -23935,7 +23935,7 @@
             </a:ln>
             <a:extLst>
               <a:ext uri="{91240B29-F687-4f45-9708-019B960494DF}">
-                <a14:hiddenLine xmlns:p14="http://schemas.microsoft.com/office/powerpoint/2010/main" xmlns:a14="http://schemas.microsoft.com/office/drawing/2010/main" xmlns:a16="http://schemas.microsoft.com/office/drawing/2014/main" xmlns="" w="9525">
+                <a14:hiddenLine xmlns="" xmlns:a16="http://schemas.microsoft.com/office/drawing/2014/main" xmlns:a14="http://schemas.microsoft.com/office/drawing/2010/main" xmlns:p14="http://schemas.microsoft.com/office/powerpoint/2010/main" w="9525">
                   <a:solidFill>
                     <a:srgbClr val="000000"/>
                   </a:solidFill>
@@ -24077,7 +24077,7 @@
             </a:ln>
             <a:extLst>
               <a:ext uri="{91240B29-F687-4f45-9708-019B960494DF}">
-                <a14:hiddenLine xmlns:p14="http://schemas.microsoft.com/office/powerpoint/2010/main" xmlns:a14="http://schemas.microsoft.com/office/drawing/2010/main" xmlns:a16="http://schemas.microsoft.com/office/drawing/2014/main" xmlns="" w="9525">
+                <a14:hiddenLine xmlns="" xmlns:a16="http://schemas.microsoft.com/office/drawing/2014/main" xmlns:a14="http://schemas.microsoft.com/office/drawing/2010/main" xmlns:p14="http://schemas.microsoft.com/office/powerpoint/2010/main" w="9525">
                   <a:solidFill>
                     <a:srgbClr val="000000"/>
                   </a:solidFill>
@@ -24167,7 +24167,7 @@
             </a:ln>
             <a:extLst>
               <a:ext uri="{91240B29-F687-4f45-9708-019B960494DF}">
-                <a14:hiddenLine xmlns:p14="http://schemas.microsoft.com/office/powerpoint/2010/main" xmlns:a14="http://schemas.microsoft.com/office/drawing/2010/main" xmlns:a16="http://schemas.microsoft.com/office/drawing/2014/main" xmlns="" w="9525">
+                <a14:hiddenLine xmlns="" xmlns:a16="http://schemas.microsoft.com/office/drawing/2014/main" xmlns:a14="http://schemas.microsoft.com/office/drawing/2010/main" xmlns:p14="http://schemas.microsoft.com/office/powerpoint/2010/main" w="9525">
                   <a:solidFill>
                     <a:srgbClr val="000000"/>
                   </a:solidFill>
@@ -24279,7 +24279,7 @@
             </a:ln>
             <a:extLst>
               <a:ext uri="{91240B29-F687-4f45-9708-019B960494DF}">
-                <a14:hiddenLine xmlns:p14="http://schemas.microsoft.com/office/powerpoint/2010/main" xmlns:a14="http://schemas.microsoft.com/office/drawing/2010/main" xmlns:a16="http://schemas.microsoft.com/office/drawing/2014/main" xmlns="" w="9525">
+                <a14:hiddenLine xmlns="" xmlns:a16="http://schemas.microsoft.com/office/drawing/2014/main" xmlns:a14="http://schemas.microsoft.com/office/drawing/2010/main" xmlns:p14="http://schemas.microsoft.com/office/powerpoint/2010/main" w="9525">
                   <a:solidFill>
                     <a:srgbClr val="000000"/>
                   </a:solidFill>
@@ -24443,7 +24443,7 @@
             <a:noFill/>
             <a:extLst>
               <a:ext uri="{909E8E84-426E-40dd-AFC4-6F175D3DCCD1}">
-                <a14:hiddenFill xmlns:p14="http://schemas.microsoft.com/office/powerpoint/2010/main" xmlns:a14="http://schemas.microsoft.com/office/drawing/2010/main" xmlns:a16="http://schemas.microsoft.com/office/drawing/2014/main" xmlns="">
+                <a14:hiddenFill xmlns="" xmlns:a16="http://schemas.microsoft.com/office/drawing/2014/main" xmlns:a14="http://schemas.microsoft.com/office/drawing/2010/main" xmlns:p14="http://schemas.microsoft.com/office/powerpoint/2010/main">
                   <a:solidFill>
                     <a:srgbClr val="FFFFFF"/>
                   </a:solidFill>
@@ -36484,7 +36484,7 @@
           <a:p>
             <a:r>
               <a:rPr lang="en-US" dirty="0"/>
-              <a:t>Normally programming normally involves computers, which use electricity.  It is important to make sure all power-cords are not frayed, and too keep liquids far away to prevent electric shock.</a:t>
+              <a:t>Normally programming normally involves computers, which use electricity.  It is important to make sure all power-cords are not frayed, and to keep liquids far away to prevent electric shock.</a:t>
             </a:r>
           </a:p>
           <a:p>
@@ -37001,7 +37001,7 @@
             </a:pPr>
             <a:r>
               <a:rPr lang="en-US" sz="1500" dirty="0"/>
-              <a:t>The picture on the left is the loom.</a:t>
+              <a:t>The picture on the right is the loom.</a:t>
             </a:r>
           </a:p>
           <a:p>
@@ -37016,7 +37016,7 @@
             </a:pPr>
             <a:r>
               <a:rPr lang="en-US" sz="1500" dirty="0"/>
-              <a:t>The picture on the right is a portrait of Jacquard was woven in silk on a Jacquard loom and required 24,000 punched cards to create (1839). One of these portraits in the possession of Charles Babbage inspired him in using perforated cards in his Difference Engine.</a:t>
+              <a:t>The picture on the left is a portrait of Jacquard was woven in silk on a Jacquard loom and required 24,000 punched cards to create (1839). One of these portraits in the possession of Charles Babbage inspired him in using perforated cards in his Difference Engine.</a:t>
             </a:r>
           </a:p>
           <a:p>
@@ -37640,7 +37640,7 @@
           <a:noFill/>
           <a:extLst>
             <a:ext uri="{909E8E84-426E-40dd-AFC4-6F175D3DCCD1}">
-              <a14:hiddenFill xmlns:p14="http://schemas.microsoft.com/office/powerpoint/2010/main" xmlns:a14="http://schemas.microsoft.com/office/drawing/2010/main" xmlns:a16="http://schemas.microsoft.com/office/drawing/2014/main" xmlns="">
+              <a14:hiddenFill xmlns="" xmlns:a16="http://schemas.microsoft.com/office/drawing/2014/main" xmlns:a14="http://schemas.microsoft.com/office/drawing/2010/main" xmlns:p14="http://schemas.microsoft.com/office/powerpoint/2010/main">
                 <a:solidFill>
                   <a:srgbClr val="FFFFFF"/>
                 </a:solidFill>
@@ -37731,7 +37731,7 @@
             </a:ln>
             <a:extLst>
               <a:ext uri="{91240B29-F687-4f45-9708-019B960494DF}">
-                <a14:hiddenLine xmlns:p14="http://schemas.microsoft.com/office/powerpoint/2010/main" xmlns:a14="http://schemas.microsoft.com/office/drawing/2010/main" xmlns:a16="http://schemas.microsoft.com/office/drawing/2014/main" xmlns="" w="9525">
+                <a14:hiddenLine xmlns="" xmlns:a16="http://schemas.microsoft.com/office/drawing/2014/main" xmlns:a14="http://schemas.microsoft.com/office/drawing/2010/main" xmlns:p14="http://schemas.microsoft.com/office/powerpoint/2010/main" w="9525">
                   <a:solidFill>
                     <a:srgbClr val="000000"/>
                   </a:solidFill>
@@ -37843,7 +37843,7 @@
             </a:ln>
             <a:extLst>
               <a:ext uri="{91240B29-F687-4f45-9708-019B960494DF}">
-                <a14:hiddenLine xmlns:p14="http://schemas.microsoft.com/office/powerpoint/2010/main" xmlns:a14="http://schemas.microsoft.com/office/drawing/2010/main" xmlns:a16="http://schemas.microsoft.com/office/drawing/2014/main" xmlns="" w="9525">
+                <a14:hiddenLine xmlns="" xmlns:a16="http://schemas.microsoft.com/office/drawing/2014/main" xmlns:a14="http://schemas.microsoft.com/office/drawing/2010/main" xmlns:p14="http://schemas.microsoft.com/office/powerpoint/2010/main" w="9525">
                   <a:solidFill>
                     <a:srgbClr val="000000"/>
                   </a:solidFill>
@@ -37955,7 +37955,7 @@
             </a:ln>
             <a:extLst>
               <a:ext uri="{91240B29-F687-4f45-9708-019B960494DF}">
-                <a14:hiddenLine xmlns:p14="http://schemas.microsoft.com/office/powerpoint/2010/main" xmlns:a14="http://schemas.microsoft.com/office/drawing/2010/main" xmlns:a16="http://schemas.microsoft.com/office/drawing/2014/main" xmlns="" w="9525">
+                <a14:hiddenLine xmlns="" xmlns:a16="http://schemas.microsoft.com/office/drawing/2014/main" xmlns:a14="http://schemas.microsoft.com/office/drawing/2010/main" xmlns:p14="http://schemas.microsoft.com/office/powerpoint/2010/main" w="9525">
                   <a:solidFill>
                     <a:srgbClr val="000000"/>
                   </a:solidFill>
@@ -38011,7 +38011,7 @@
             </a:ln>
             <a:extLst>
               <a:ext uri="{91240B29-F687-4f45-9708-019B960494DF}">
-                <a14:hiddenLine xmlns:p14="http://schemas.microsoft.com/office/powerpoint/2010/main" xmlns:a14="http://schemas.microsoft.com/office/drawing/2010/main" xmlns:a16="http://schemas.microsoft.com/office/drawing/2014/main" xmlns="" w="9525">
+                <a14:hiddenLine xmlns="" xmlns:a16="http://schemas.microsoft.com/office/drawing/2014/main" xmlns:a14="http://schemas.microsoft.com/office/drawing/2010/main" xmlns:p14="http://schemas.microsoft.com/office/powerpoint/2010/main" w="9525">
                   <a:solidFill>
                     <a:srgbClr val="000000"/>
                   </a:solidFill>
@@ -38123,7 +38123,7 @@
             </a:ln>
             <a:extLst>
               <a:ext uri="{91240B29-F687-4f45-9708-019B960494DF}">
-                <a14:hiddenLine xmlns:p14="http://schemas.microsoft.com/office/powerpoint/2010/main" xmlns:a14="http://schemas.microsoft.com/office/drawing/2010/main" xmlns:a16="http://schemas.microsoft.com/office/drawing/2014/main" xmlns="" w="9525">
+                <a14:hiddenLine xmlns="" xmlns:a16="http://schemas.microsoft.com/office/drawing/2014/main" xmlns:a14="http://schemas.microsoft.com/office/drawing/2010/main" xmlns:p14="http://schemas.microsoft.com/office/powerpoint/2010/main" w="9525">
                   <a:solidFill>
                     <a:srgbClr val="000000"/>
                   </a:solidFill>
@@ -38207,7 +38207,7 @@
             </a:ln>
             <a:extLst>
               <a:ext uri="{91240B29-F687-4f45-9708-019B960494DF}">
-                <a14:hiddenLine xmlns:p14="http://schemas.microsoft.com/office/powerpoint/2010/main" xmlns:a14="http://schemas.microsoft.com/office/drawing/2010/main" xmlns:a16="http://schemas.microsoft.com/office/drawing/2014/main" xmlns="" w="9525">
+                <a14:hiddenLine xmlns="" xmlns:a16="http://schemas.microsoft.com/office/drawing/2014/main" xmlns:a14="http://schemas.microsoft.com/office/drawing/2010/main" xmlns:p14="http://schemas.microsoft.com/office/powerpoint/2010/main" w="9525">
                   <a:solidFill>
                     <a:srgbClr val="000000"/>
                   </a:solidFill>
@@ -38291,7 +38291,7 @@
             </a:ln>
             <a:extLst>
               <a:ext uri="{91240B29-F687-4f45-9708-019B960494DF}">
-                <a14:hiddenLine xmlns:p14="http://schemas.microsoft.com/office/powerpoint/2010/main" xmlns:a14="http://schemas.microsoft.com/office/drawing/2010/main" xmlns:a16="http://schemas.microsoft.com/office/drawing/2014/main" xmlns="" w="9525">
+                <a14:hiddenLine xmlns="" xmlns:a16="http://schemas.microsoft.com/office/drawing/2014/main" xmlns:a14="http://schemas.microsoft.com/office/drawing/2010/main" xmlns:p14="http://schemas.microsoft.com/office/powerpoint/2010/main" w="9525">
                   <a:solidFill>
                     <a:srgbClr val="000000"/>
                   </a:solidFill>
@@ -38403,7 +38403,7 @@
             </a:ln>
             <a:extLst>
               <a:ext uri="{91240B29-F687-4f45-9708-019B960494DF}">
-                <a14:hiddenLine xmlns:p14="http://schemas.microsoft.com/office/powerpoint/2010/main" xmlns:a14="http://schemas.microsoft.com/office/drawing/2010/main" xmlns:a16="http://schemas.microsoft.com/office/drawing/2014/main" xmlns="" w="9525">
+                <a14:hiddenLine xmlns="" xmlns:a16="http://schemas.microsoft.com/office/drawing/2014/main" xmlns:a14="http://schemas.microsoft.com/office/drawing/2010/main" xmlns:p14="http://schemas.microsoft.com/office/powerpoint/2010/main" w="9525">
                   <a:solidFill>
                     <a:srgbClr val="000000"/>
                   </a:solidFill>
@@ -38487,7 +38487,7 @@
             </a:ln>
             <a:extLst>
               <a:ext uri="{91240B29-F687-4f45-9708-019B960494DF}">
-                <a14:hiddenLine xmlns:p14="http://schemas.microsoft.com/office/powerpoint/2010/main" xmlns:a14="http://schemas.microsoft.com/office/drawing/2010/main" xmlns:a16="http://schemas.microsoft.com/office/drawing/2014/main" xmlns="" w="9525">
+                <a14:hiddenLine xmlns="" xmlns:a16="http://schemas.microsoft.com/office/drawing/2014/main" xmlns:a14="http://schemas.microsoft.com/office/drawing/2010/main" xmlns:p14="http://schemas.microsoft.com/office/powerpoint/2010/main" w="9525">
                   <a:solidFill>
                     <a:srgbClr val="000000"/>
                   </a:solidFill>
@@ -38571,7 +38571,7 @@
             </a:ln>
             <a:extLst>
               <a:ext uri="{91240B29-F687-4f45-9708-019B960494DF}">
-                <a14:hiddenLine xmlns:p14="http://schemas.microsoft.com/office/powerpoint/2010/main" xmlns:a14="http://schemas.microsoft.com/office/drawing/2010/main" xmlns:a16="http://schemas.microsoft.com/office/drawing/2014/main" xmlns="" w="9525">
+                <a14:hiddenLine xmlns="" xmlns:a16="http://schemas.microsoft.com/office/drawing/2014/main" xmlns:a14="http://schemas.microsoft.com/office/drawing/2010/main" xmlns:p14="http://schemas.microsoft.com/office/powerpoint/2010/main" w="9525">
                   <a:solidFill>
                     <a:srgbClr val="000000"/>
                   </a:solidFill>
@@ -38683,7 +38683,7 @@
             </a:ln>
             <a:extLst>
               <a:ext uri="{91240B29-F687-4f45-9708-019B960494DF}">
-                <a14:hiddenLine xmlns:p14="http://schemas.microsoft.com/office/powerpoint/2010/main" xmlns:a14="http://schemas.microsoft.com/office/drawing/2010/main" xmlns:a16="http://schemas.microsoft.com/office/drawing/2014/main" xmlns="" w="9525">
+                <a14:hiddenLine xmlns="" xmlns:a16="http://schemas.microsoft.com/office/drawing/2014/main" xmlns:a14="http://schemas.microsoft.com/office/drawing/2010/main" xmlns:p14="http://schemas.microsoft.com/office/powerpoint/2010/main" w="9525">
                   <a:solidFill>
                     <a:srgbClr val="000000"/>
                   </a:solidFill>
@@ -38795,7 +38795,7 @@
             </a:ln>
             <a:extLst>
               <a:ext uri="{91240B29-F687-4f45-9708-019B960494DF}">
-                <a14:hiddenLine xmlns:p14="http://schemas.microsoft.com/office/powerpoint/2010/main" xmlns:a14="http://schemas.microsoft.com/office/drawing/2010/main" xmlns:a16="http://schemas.microsoft.com/office/drawing/2014/main" xmlns="" w="9525">
+                <a14:hiddenLine xmlns="" xmlns:a16="http://schemas.microsoft.com/office/drawing/2014/main" xmlns:a14="http://schemas.microsoft.com/office/drawing/2010/main" xmlns:p14="http://schemas.microsoft.com/office/powerpoint/2010/main" w="9525">
                   <a:solidFill>
                     <a:srgbClr val="000000"/>
                   </a:solidFill>
@@ -38879,7 +38879,7 @@
             </a:ln>
             <a:extLst>
               <a:ext uri="{91240B29-F687-4f45-9708-019B960494DF}">
-                <a14:hiddenLine xmlns:p14="http://schemas.microsoft.com/office/powerpoint/2010/main" xmlns:a14="http://schemas.microsoft.com/office/drawing/2010/main" xmlns:a16="http://schemas.microsoft.com/office/drawing/2014/main" xmlns="" w="9525">
+                <a14:hiddenLine xmlns="" xmlns:a16="http://schemas.microsoft.com/office/drawing/2014/main" xmlns:a14="http://schemas.microsoft.com/office/drawing/2010/main" xmlns:p14="http://schemas.microsoft.com/office/powerpoint/2010/main" w="9525">
                   <a:solidFill>
                     <a:srgbClr val="000000"/>
                   </a:solidFill>
@@ -39011,7 +39011,7 @@
             </a:ln>
             <a:extLst>
               <a:ext uri="{91240B29-F687-4f45-9708-019B960494DF}">
-                <a14:hiddenLine xmlns:p14="http://schemas.microsoft.com/office/powerpoint/2010/main" xmlns:a14="http://schemas.microsoft.com/office/drawing/2010/main" xmlns:a16="http://schemas.microsoft.com/office/drawing/2014/main" xmlns="" w="9525">
+                <a14:hiddenLine xmlns="" xmlns:a16="http://schemas.microsoft.com/office/drawing/2014/main" xmlns:a14="http://schemas.microsoft.com/office/drawing/2010/main" xmlns:p14="http://schemas.microsoft.com/office/powerpoint/2010/main" w="9525">
                   <a:solidFill>
                     <a:srgbClr val="000000"/>
                   </a:solidFill>
@@ -39095,7 +39095,7 @@
             </a:ln>
             <a:extLst>
               <a:ext uri="{91240B29-F687-4f45-9708-019B960494DF}">
-                <a14:hiddenLine xmlns:p14="http://schemas.microsoft.com/office/powerpoint/2010/main" xmlns:a14="http://schemas.microsoft.com/office/drawing/2010/main" xmlns:a16="http://schemas.microsoft.com/office/drawing/2014/main" xmlns="" w="9525">
+                <a14:hiddenLine xmlns="" xmlns:a16="http://schemas.microsoft.com/office/drawing/2014/main" xmlns:a14="http://schemas.microsoft.com/office/drawing/2010/main" xmlns:p14="http://schemas.microsoft.com/office/powerpoint/2010/main" w="9525">
                   <a:solidFill>
                     <a:srgbClr val="000000"/>
                   </a:solidFill>
@@ -39207,7 +39207,7 @@
             </a:ln>
             <a:extLst>
               <a:ext uri="{91240B29-F687-4f45-9708-019B960494DF}">
-                <a14:hiddenLine xmlns:p14="http://schemas.microsoft.com/office/powerpoint/2010/main" xmlns:a14="http://schemas.microsoft.com/office/drawing/2010/main" xmlns:a16="http://schemas.microsoft.com/office/drawing/2014/main" xmlns="" w="9525">
+                <a14:hiddenLine xmlns="" xmlns:a16="http://schemas.microsoft.com/office/drawing/2014/main" xmlns:a14="http://schemas.microsoft.com/office/drawing/2010/main" xmlns:p14="http://schemas.microsoft.com/office/powerpoint/2010/main" w="9525">
                   <a:solidFill>
                     <a:srgbClr val="000000"/>
                   </a:solidFill>
@@ -39319,7 +39319,7 @@
             </a:ln>
             <a:extLst>
               <a:ext uri="{91240B29-F687-4f45-9708-019B960494DF}">
-                <a14:hiddenLine xmlns:p14="http://schemas.microsoft.com/office/powerpoint/2010/main" xmlns:a14="http://schemas.microsoft.com/office/drawing/2010/main" xmlns:a16="http://schemas.microsoft.com/office/drawing/2014/main" xmlns="" w="9525">
+                <a14:hiddenLine xmlns="" xmlns:a16="http://schemas.microsoft.com/office/drawing/2014/main" xmlns:a14="http://schemas.microsoft.com/office/drawing/2010/main" xmlns:p14="http://schemas.microsoft.com/office/powerpoint/2010/main" w="9525">
                   <a:solidFill>
                     <a:srgbClr val="000000"/>
                   </a:solidFill>
@@ -39403,7 +39403,7 @@
             </a:ln>
             <a:extLst>
               <a:ext uri="{91240B29-F687-4f45-9708-019B960494DF}">
-                <a14:hiddenLine xmlns:p14="http://schemas.microsoft.com/office/powerpoint/2010/main" xmlns:a14="http://schemas.microsoft.com/office/drawing/2010/main" xmlns:a16="http://schemas.microsoft.com/office/drawing/2014/main" xmlns="" w="9525">
+                <a14:hiddenLine xmlns="" xmlns:a16="http://schemas.microsoft.com/office/drawing/2014/main" xmlns:a14="http://schemas.microsoft.com/office/drawing/2010/main" xmlns:p14="http://schemas.microsoft.com/office/powerpoint/2010/main" w="9525">
                   <a:solidFill>
                     <a:srgbClr val="000000"/>
                   </a:solidFill>
@@ -39515,7 +39515,7 @@
             </a:ln>
             <a:extLst>
               <a:ext uri="{91240B29-F687-4f45-9708-019B960494DF}">
-                <a14:hiddenLine xmlns:p14="http://schemas.microsoft.com/office/powerpoint/2010/main" xmlns:a14="http://schemas.microsoft.com/office/drawing/2010/main" xmlns:a16="http://schemas.microsoft.com/office/drawing/2014/main" xmlns="" w="9525">
+                <a14:hiddenLine xmlns="" xmlns:a16="http://schemas.microsoft.com/office/drawing/2014/main" xmlns:a14="http://schemas.microsoft.com/office/drawing/2010/main" xmlns:p14="http://schemas.microsoft.com/office/powerpoint/2010/main" w="9525">
                   <a:solidFill>
                     <a:srgbClr val="000000"/>
                   </a:solidFill>
@@ -39627,7 +39627,7 @@
             </a:ln>
             <a:extLst>
               <a:ext uri="{91240B29-F687-4f45-9708-019B960494DF}">
-                <a14:hiddenLine xmlns:p14="http://schemas.microsoft.com/office/powerpoint/2010/main" xmlns:a14="http://schemas.microsoft.com/office/drawing/2010/main" xmlns:a16="http://schemas.microsoft.com/office/drawing/2014/main" xmlns="" w="9525">
+                <a14:hiddenLine xmlns="" xmlns:a16="http://schemas.microsoft.com/office/drawing/2014/main" xmlns:a14="http://schemas.microsoft.com/office/drawing/2010/main" xmlns:p14="http://schemas.microsoft.com/office/powerpoint/2010/main" w="9525">
                   <a:solidFill>
                     <a:srgbClr val="000000"/>
                   </a:solidFill>
@@ -39705,7 +39705,7 @@
             </a:ln>
             <a:extLst>
               <a:ext uri="{91240B29-F687-4f45-9708-019B960494DF}">
-                <a14:hiddenLine xmlns:p14="http://schemas.microsoft.com/office/powerpoint/2010/main" xmlns:a14="http://schemas.microsoft.com/office/drawing/2010/main" xmlns:a16="http://schemas.microsoft.com/office/drawing/2014/main" xmlns="" w="9525">
+                <a14:hiddenLine xmlns="" xmlns:a16="http://schemas.microsoft.com/office/drawing/2014/main" xmlns:a14="http://schemas.microsoft.com/office/drawing/2010/main" xmlns:p14="http://schemas.microsoft.com/office/powerpoint/2010/main" w="9525">
                   <a:solidFill>
                     <a:srgbClr val="000000"/>
                   </a:solidFill>
@@ -39817,7 +39817,7 @@
             </a:ln>
             <a:extLst>
               <a:ext uri="{91240B29-F687-4f45-9708-019B960494DF}">
-                <a14:hiddenLine xmlns:p14="http://schemas.microsoft.com/office/powerpoint/2010/main" xmlns:a14="http://schemas.microsoft.com/office/drawing/2010/main" xmlns:a16="http://schemas.microsoft.com/office/drawing/2014/main" xmlns="" w="9525">
+                <a14:hiddenLine xmlns="" xmlns:a16="http://schemas.microsoft.com/office/drawing/2014/main" xmlns:a14="http://schemas.microsoft.com/office/drawing/2010/main" xmlns:p14="http://schemas.microsoft.com/office/powerpoint/2010/main" w="9525">
                   <a:solidFill>
                     <a:srgbClr val="000000"/>
                   </a:solidFill>
@@ -39895,7 +39895,7 @@
             </a:ln>
             <a:extLst>
               <a:ext uri="{91240B29-F687-4f45-9708-019B960494DF}">
-                <a14:hiddenLine xmlns:p14="http://schemas.microsoft.com/office/powerpoint/2010/main" xmlns:a14="http://schemas.microsoft.com/office/drawing/2010/main" xmlns:a16="http://schemas.microsoft.com/office/drawing/2014/main" xmlns="" w="9525">
+                <a14:hiddenLine xmlns="" xmlns:a16="http://schemas.microsoft.com/office/drawing/2014/main" xmlns:a14="http://schemas.microsoft.com/office/drawing/2010/main" xmlns:p14="http://schemas.microsoft.com/office/powerpoint/2010/main" w="9525">
                   <a:solidFill>
                     <a:srgbClr val="000000"/>
                   </a:solidFill>
@@ -40007,7 +40007,7 @@
             </a:ln>
             <a:extLst>
               <a:ext uri="{91240B29-F687-4f45-9708-019B960494DF}">
-                <a14:hiddenLine xmlns:p14="http://schemas.microsoft.com/office/powerpoint/2010/main" xmlns:a14="http://schemas.microsoft.com/office/drawing/2010/main" xmlns:a16="http://schemas.microsoft.com/office/drawing/2014/main" xmlns="" w="9525">
+                <a14:hiddenLine xmlns="" xmlns:a16="http://schemas.microsoft.com/office/drawing/2014/main" xmlns:a14="http://schemas.microsoft.com/office/drawing/2010/main" xmlns:p14="http://schemas.microsoft.com/office/powerpoint/2010/main" w="9525">
                   <a:solidFill>
                     <a:srgbClr val="000000"/>
                   </a:solidFill>
@@ -40097,7 +40097,7 @@
             </a:ln>
             <a:extLst>
               <a:ext uri="{91240B29-F687-4f45-9708-019B960494DF}">
-                <a14:hiddenLine xmlns:p14="http://schemas.microsoft.com/office/powerpoint/2010/main" xmlns:a14="http://schemas.microsoft.com/office/drawing/2010/main" xmlns:a16="http://schemas.microsoft.com/office/drawing/2014/main" xmlns="" w="9525">
+                <a14:hiddenLine xmlns="" xmlns:a16="http://schemas.microsoft.com/office/drawing/2014/main" xmlns:a14="http://schemas.microsoft.com/office/drawing/2010/main" xmlns:p14="http://schemas.microsoft.com/office/powerpoint/2010/main" w="9525">
                   <a:solidFill>
                     <a:srgbClr val="000000"/>
                   </a:solidFill>
@@ -40209,7 +40209,7 @@
             </a:ln>
             <a:extLst>
               <a:ext uri="{91240B29-F687-4f45-9708-019B960494DF}">
-                <a14:hiddenLine xmlns:p14="http://schemas.microsoft.com/office/powerpoint/2010/main" xmlns:a14="http://schemas.microsoft.com/office/drawing/2010/main" xmlns:a16="http://schemas.microsoft.com/office/drawing/2014/main" xmlns="" w="9525">
+                <a14:hiddenLine xmlns="" xmlns:a16="http://schemas.microsoft.com/office/drawing/2014/main" xmlns:a14="http://schemas.microsoft.com/office/drawing/2010/main" xmlns:p14="http://schemas.microsoft.com/office/powerpoint/2010/main" w="9525">
                   <a:solidFill>
                     <a:srgbClr val="000000"/>
                   </a:solidFill>
@@ -40299,7 +40299,7 @@
             </a:ln>
             <a:extLst>
               <a:ext uri="{91240B29-F687-4f45-9708-019B960494DF}">
-                <a14:hiddenLine xmlns:p14="http://schemas.microsoft.com/office/powerpoint/2010/main" xmlns:a14="http://schemas.microsoft.com/office/drawing/2010/main" xmlns:a16="http://schemas.microsoft.com/office/drawing/2014/main" xmlns="" w="9525">
+                <a14:hiddenLine xmlns="" xmlns:a16="http://schemas.microsoft.com/office/drawing/2014/main" xmlns:a14="http://schemas.microsoft.com/office/drawing/2010/main" xmlns:p14="http://schemas.microsoft.com/office/powerpoint/2010/main" w="9525">
                   <a:solidFill>
                     <a:srgbClr val="000000"/>
                   </a:solidFill>
@@ -40411,7 +40411,7 @@
             </a:ln>
             <a:extLst>
               <a:ext uri="{91240B29-F687-4f45-9708-019B960494DF}">
-                <a14:hiddenLine xmlns:p14="http://schemas.microsoft.com/office/powerpoint/2010/main" xmlns:a14="http://schemas.microsoft.com/office/drawing/2010/main" xmlns:a16="http://schemas.microsoft.com/office/drawing/2014/main" xmlns="" w="9525">
+                <a14:hiddenLine xmlns="" xmlns:a16="http://schemas.microsoft.com/office/drawing/2014/main" xmlns:a14="http://schemas.microsoft.com/office/drawing/2010/main" xmlns:p14="http://schemas.microsoft.com/office/powerpoint/2010/main" w="9525">
                   <a:solidFill>
                     <a:srgbClr val="000000"/>
                   </a:solidFill>
@@ -40467,7 +40467,7 @@
             </a:ln>
             <a:extLst>
               <a:ext uri="{91240B29-F687-4f45-9708-019B960494DF}">
-                <a14:hiddenLine xmlns:p14="http://schemas.microsoft.com/office/powerpoint/2010/main" xmlns:a14="http://schemas.microsoft.com/office/drawing/2010/main" xmlns:a16="http://schemas.microsoft.com/office/drawing/2014/main" xmlns="" w="9525">
+                <a14:hiddenLine xmlns="" xmlns:a16="http://schemas.microsoft.com/office/drawing/2014/main" xmlns:a14="http://schemas.microsoft.com/office/drawing/2010/main" xmlns:p14="http://schemas.microsoft.com/office/powerpoint/2010/main" w="9525">
                   <a:solidFill>
                     <a:srgbClr val="000000"/>
                   </a:solidFill>
@@ -40579,7 +40579,7 @@
             </a:ln>
             <a:extLst>
               <a:ext uri="{91240B29-F687-4f45-9708-019B960494DF}">
-                <a14:hiddenLine xmlns:p14="http://schemas.microsoft.com/office/powerpoint/2010/main" xmlns:a14="http://schemas.microsoft.com/office/drawing/2010/main" xmlns:a16="http://schemas.microsoft.com/office/drawing/2014/main" xmlns="" w="9525">
+                <a14:hiddenLine xmlns="" xmlns:a16="http://schemas.microsoft.com/office/drawing/2014/main" xmlns:a14="http://schemas.microsoft.com/office/drawing/2010/main" xmlns:p14="http://schemas.microsoft.com/office/powerpoint/2010/main" w="9525">
                   <a:solidFill>
                     <a:srgbClr val="000000"/>
                   </a:solidFill>
@@ -40663,7 +40663,7 @@
             </a:ln>
             <a:extLst>
               <a:ext uri="{91240B29-F687-4f45-9708-019B960494DF}">
-                <a14:hiddenLine xmlns:p14="http://schemas.microsoft.com/office/powerpoint/2010/main" xmlns:a14="http://schemas.microsoft.com/office/drawing/2010/main" xmlns:a16="http://schemas.microsoft.com/office/drawing/2014/main" xmlns="" w="9525">
+                <a14:hiddenLine xmlns="" xmlns:a16="http://schemas.microsoft.com/office/drawing/2014/main" xmlns:a14="http://schemas.microsoft.com/office/drawing/2010/main" xmlns:p14="http://schemas.microsoft.com/office/powerpoint/2010/main" w="9525">
                   <a:solidFill>
                     <a:srgbClr val="000000"/>
                   </a:solidFill>
@@ -40747,7 +40747,7 @@
             </a:ln>
             <a:extLst>
               <a:ext uri="{91240B29-F687-4f45-9708-019B960494DF}">
-                <a14:hiddenLine xmlns:p14="http://schemas.microsoft.com/office/powerpoint/2010/main" xmlns:a14="http://schemas.microsoft.com/office/drawing/2010/main" xmlns:a16="http://schemas.microsoft.com/office/drawing/2014/main" xmlns="" w="9525">
+                <a14:hiddenLine xmlns="" xmlns:a16="http://schemas.microsoft.com/office/drawing/2014/main" xmlns:a14="http://schemas.microsoft.com/office/drawing/2010/main" xmlns:p14="http://schemas.microsoft.com/office/powerpoint/2010/main" w="9525">
                   <a:solidFill>
                     <a:srgbClr val="000000"/>
                   </a:solidFill>
@@ -40859,7 +40859,7 @@
             </a:ln>
             <a:extLst>
               <a:ext uri="{91240B29-F687-4f45-9708-019B960494DF}">
-                <a14:hiddenLine xmlns:p14="http://schemas.microsoft.com/office/powerpoint/2010/main" xmlns:a14="http://schemas.microsoft.com/office/drawing/2010/main" xmlns:a16="http://schemas.microsoft.com/office/drawing/2014/main" xmlns="" w="9525">
+                <a14:hiddenLine xmlns="" xmlns:a16="http://schemas.microsoft.com/office/drawing/2014/main" xmlns:a14="http://schemas.microsoft.com/office/drawing/2010/main" xmlns:p14="http://schemas.microsoft.com/office/powerpoint/2010/main" w="9525">
                   <a:solidFill>
                     <a:srgbClr val="000000"/>
                   </a:solidFill>
@@ -40949,7 +40949,7 @@
             </a:ln>
             <a:extLst>
               <a:ext uri="{91240B29-F687-4f45-9708-019B960494DF}">
-                <a14:hiddenLine xmlns:p14="http://schemas.microsoft.com/office/powerpoint/2010/main" xmlns:a14="http://schemas.microsoft.com/office/drawing/2010/main" xmlns:a16="http://schemas.microsoft.com/office/drawing/2014/main" xmlns="" w="9525">
+                <a14:hiddenLine xmlns="" xmlns:a16="http://schemas.microsoft.com/office/drawing/2014/main" xmlns:a14="http://schemas.microsoft.com/office/drawing/2010/main" xmlns:p14="http://schemas.microsoft.com/office/powerpoint/2010/main" w="9525">
                   <a:solidFill>
                     <a:srgbClr val="000000"/>
                   </a:solidFill>
@@ -41033,7 +41033,7 @@
             </a:ln>
             <a:extLst>
               <a:ext uri="{91240B29-F687-4f45-9708-019B960494DF}">
-                <a14:hiddenLine xmlns:p14="http://schemas.microsoft.com/office/powerpoint/2010/main" xmlns:a14="http://schemas.microsoft.com/office/drawing/2010/main" xmlns:a16="http://schemas.microsoft.com/office/drawing/2014/main" xmlns="" w="9525">
+                <a14:hiddenLine xmlns="" xmlns:a16="http://schemas.microsoft.com/office/drawing/2014/main" xmlns:a14="http://schemas.microsoft.com/office/drawing/2010/main" xmlns:p14="http://schemas.microsoft.com/office/powerpoint/2010/main" w="9525">
                   <a:solidFill>
                     <a:srgbClr val="000000"/>
                   </a:solidFill>
@@ -41145,7 +41145,7 @@
             </a:ln>
             <a:extLst>
               <a:ext uri="{91240B29-F687-4f45-9708-019B960494DF}">
-                <a14:hiddenLine xmlns:p14="http://schemas.microsoft.com/office/powerpoint/2010/main" xmlns:a14="http://schemas.microsoft.com/office/drawing/2010/main" xmlns:a16="http://schemas.microsoft.com/office/drawing/2014/main" xmlns="" w="9525">
+                <a14:hiddenLine xmlns="" xmlns:a16="http://schemas.microsoft.com/office/drawing/2014/main" xmlns:a14="http://schemas.microsoft.com/office/drawing/2010/main" xmlns:p14="http://schemas.microsoft.com/office/powerpoint/2010/main" w="9525">
                   <a:solidFill>
                     <a:srgbClr val="000000"/>
                   </a:solidFill>
@@ -41229,7 +41229,7 @@
             </a:ln>
             <a:extLst>
               <a:ext uri="{91240B29-F687-4f45-9708-019B960494DF}">
-                <a14:hiddenLine xmlns:p14="http://schemas.microsoft.com/office/powerpoint/2010/main" xmlns:a14="http://schemas.microsoft.com/office/drawing/2010/main" xmlns:a16="http://schemas.microsoft.com/office/drawing/2014/main" xmlns="" w="9525">
+                <a14:hiddenLine xmlns="" xmlns:a16="http://schemas.microsoft.com/office/drawing/2014/main" xmlns:a14="http://schemas.microsoft.com/office/drawing/2010/main" xmlns:p14="http://schemas.microsoft.com/office/powerpoint/2010/main" w="9525">
                   <a:solidFill>
                     <a:srgbClr val="000000"/>
                   </a:solidFill>
@@ -41341,7 +41341,7 @@
             </a:ln>
             <a:extLst>
               <a:ext uri="{91240B29-F687-4f45-9708-019B960494DF}">
-                <a14:hiddenLine xmlns:p14="http://schemas.microsoft.com/office/powerpoint/2010/main" xmlns:a14="http://schemas.microsoft.com/office/drawing/2010/main" xmlns:a16="http://schemas.microsoft.com/office/drawing/2014/main" xmlns="" w="9525">
+                <a14:hiddenLine xmlns="" xmlns:a16="http://schemas.microsoft.com/office/drawing/2014/main" xmlns:a14="http://schemas.microsoft.com/office/drawing/2010/main" xmlns:p14="http://schemas.microsoft.com/office/powerpoint/2010/main" w="9525">
                   <a:solidFill>
                     <a:srgbClr val="000000"/>
                   </a:solidFill>
@@ -41425,7 +41425,7 @@
             </a:ln>
             <a:extLst>
               <a:ext uri="{91240B29-F687-4f45-9708-019B960494DF}">
-                <a14:hiddenLine xmlns:p14="http://schemas.microsoft.com/office/powerpoint/2010/main" xmlns:a14="http://schemas.microsoft.com/office/drawing/2010/main" xmlns:a16="http://schemas.microsoft.com/office/drawing/2014/main" xmlns="" w="9525">
+                <a14:hiddenLine xmlns="" xmlns:a16="http://schemas.microsoft.com/office/drawing/2014/main" xmlns:a14="http://schemas.microsoft.com/office/drawing/2010/main" xmlns:p14="http://schemas.microsoft.com/office/powerpoint/2010/main" w="9525">
                   <a:solidFill>
                     <a:srgbClr val="000000"/>
                   </a:solidFill>
@@ -41537,7 +41537,7 @@
             </a:ln>
             <a:extLst>
               <a:ext uri="{91240B29-F687-4f45-9708-019B960494DF}">
-                <a14:hiddenLine xmlns:p14="http://schemas.microsoft.com/office/powerpoint/2010/main" xmlns:a14="http://schemas.microsoft.com/office/drawing/2010/main" xmlns:a16="http://schemas.microsoft.com/office/drawing/2014/main" xmlns="" w="9525">
+                <a14:hiddenLine xmlns="" xmlns:a16="http://schemas.microsoft.com/office/drawing/2014/main" xmlns:a14="http://schemas.microsoft.com/office/drawing/2010/main" xmlns:p14="http://schemas.microsoft.com/office/powerpoint/2010/main" w="9525">
                   <a:solidFill>
                     <a:srgbClr val="000000"/>
                   </a:solidFill>
@@ -41593,7 +41593,7 @@
             </a:ln>
             <a:extLst>
               <a:ext uri="{91240B29-F687-4f45-9708-019B960494DF}">
-                <a14:hiddenLine xmlns:p14="http://schemas.microsoft.com/office/powerpoint/2010/main" xmlns:a14="http://schemas.microsoft.com/office/drawing/2010/main" xmlns:a16="http://schemas.microsoft.com/office/drawing/2014/main" xmlns="" w="9525">
+                <a14:hiddenLine xmlns="" xmlns:a16="http://schemas.microsoft.com/office/drawing/2014/main" xmlns:a14="http://schemas.microsoft.com/office/drawing/2010/main" xmlns:p14="http://schemas.microsoft.com/office/powerpoint/2010/main" w="9525">
                   <a:solidFill>
                     <a:srgbClr val="000000"/>
                   </a:solidFill>
@@ -41680,7 +41680,7 @@
             </a:ln>
             <a:extLst>
               <a:ext uri="{91240B29-F687-4f45-9708-019B960494DF}">
-                <a14:hiddenLine xmlns:p14="http://schemas.microsoft.com/office/powerpoint/2010/main" xmlns:a14="http://schemas.microsoft.com/office/drawing/2010/main" xmlns:a16="http://schemas.microsoft.com/office/drawing/2014/main" xmlns="" w="9525">
+                <a14:hiddenLine xmlns="" xmlns:a16="http://schemas.microsoft.com/office/drawing/2014/main" xmlns:a14="http://schemas.microsoft.com/office/drawing/2010/main" xmlns:p14="http://schemas.microsoft.com/office/powerpoint/2010/main" w="9525">
                   <a:solidFill>
                     <a:srgbClr val="000000"/>
                   </a:solidFill>
@@ -41792,7 +41792,7 @@
             </a:ln>
             <a:extLst>
               <a:ext uri="{91240B29-F687-4f45-9708-019B960494DF}">
-                <a14:hiddenLine xmlns:p14="http://schemas.microsoft.com/office/powerpoint/2010/main" xmlns:a14="http://schemas.microsoft.com/office/drawing/2010/main" xmlns:a16="http://schemas.microsoft.com/office/drawing/2014/main" xmlns="" w="9525">
+                <a14:hiddenLine xmlns="" xmlns:a16="http://schemas.microsoft.com/office/drawing/2014/main" xmlns:a14="http://schemas.microsoft.com/office/drawing/2010/main" xmlns:p14="http://schemas.microsoft.com/office/powerpoint/2010/main" w="9525">
                   <a:solidFill>
                     <a:srgbClr val="000000"/>
                   </a:solidFill>
@@ -41876,7 +41876,7 @@
             </a:ln>
             <a:extLst>
               <a:ext uri="{91240B29-F687-4f45-9708-019B960494DF}">
-                <a14:hiddenLine xmlns:p14="http://schemas.microsoft.com/office/powerpoint/2010/main" xmlns:a14="http://schemas.microsoft.com/office/drawing/2010/main" xmlns:a16="http://schemas.microsoft.com/office/drawing/2014/main" xmlns="" w="9525">
+                <a14:hiddenLine xmlns="" xmlns:a16="http://schemas.microsoft.com/office/drawing/2014/main" xmlns:a14="http://schemas.microsoft.com/office/drawing/2010/main" xmlns:p14="http://schemas.microsoft.com/office/powerpoint/2010/main" w="9525">
                   <a:solidFill>
                     <a:srgbClr val="000000"/>
                   </a:solidFill>
@@ -41988,7 +41988,7 @@
             </a:ln>
             <a:extLst>
               <a:ext uri="{91240B29-F687-4f45-9708-019B960494DF}">
-                <a14:hiddenLine xmlns:p14="http://schemas.microsoft.com/office/powerpoint/2010/main" xmlns:a14="http://schemas.microsoft.com/office/drawing/2010/main" xmlns:a16="http://schemas.microsoft.com/office/drawing/2014/main" xmlns="" w="9525">
+                <a14:hiddenLine xmlns="" xmlns:a16="http://schemas.microsoft.com/office/drawing/2014/main" xmlns:a14="http://schemas.microsoft.com/office/drawing/2010/main" xmlns:p14="http://schemas.microsoft.com/office/powerpoint/2010/main" w="9525">
                   <a:solidFill>
                     <a:srgbClr val="000000"/>
                   </a:solidFill>
@@ -42100,7 +42100,7 @@
             </a:ln>
             <a:extLst>
               <a:ext uri="{91240B29-F687-4f45-9708-019B960494DF}">
-                <a14:hiddenLine xmlns:p14="http://schemas.microsoft.com/office/powerpoint/2010/main" xmlns:a14="http://schemas.microsoft.com/office/drawing/2010/main" xmlns:a16="http://schemas.microsoft.com/office/drawing/2014/main" xmlns="" w="9525">
+                <a14:hiddenLine xmlns="" xmlns:a16="http://schemas.microsoft.com/office/drawing/2014/main" xmlns:a14="http://schemas.microsoft.com/office/drawing/2010/main" xmlns:p14="http://schemas.microsoft.com/office/powerpoint/2010/main" w="9525">
                   <a:solidFill>
                     <a:srgbClr val="000000"/>
                   </a:solidFill>
@@ -42187,7 +42187,7 @@
             </a:ln>
             <a:extLst>
               <a:ext uri="{91240B29-F687-4f45-9708-019B960494DF}">
-                <a14:hiddenLine xmlns:p14="http://schemas.microsoft.com/office/powerpoint/2010/main" xmlns:a14="http://schemas.microsoft.com/office/drawing/2010/main" xmlns:a16="http://schemas.microsoft.com/office/drawing/2014/main" xmlns="" w="9525">
+                <a14:hiddenLine xmlns="" xmlns:a16="http://schemas.microsoft.com/office/drawing/2014/main" xmlns:a14="http://schemas.microsoft.com/office/drawing/2010/main" xmlns:p14="http://schemas.microsoft.com/office/powerpoint/2010/main" w="9525">
                   <a:solidFill>
                     <a:srgbClr val="000000"/>
                   </a:solidFill>
@@ -42271,7 +42271,7 @@
             </a:ln>
             <a:extLst>
               <a:ext uri="{91240B29-F687-4f45-9708-019B960494DF}">
-                <a14:hiddenLine xmlns:p14="http://schemas.microsoft.com/office/powerpoint/2010/main" xmlns:a14="http://schemas.microsoft.com/office/drawing/2010/main" xmlns:a16="http://schemas.microsoft.com/office/drawing/2014/main" xmlns="" w="9525">
+                <a14:hiddenLine xmlns="" xmlns:a16="http://schemas.microsoft.com/office/drawing/2014/main" xmlns:a14="http://schemas.microsoft.com/office/drawing/2010/main" xmlns:p14="http://schemas.microsoft.com/office/powerpoint/2010/main" w="9525">
                   <a:solidFill>
                     <a:srgbClr val="000000"/>
                   </a:solidFill>
@@ -42383,7 +42383,7 @@
             </a:ln>
             <a:extLst>
               <a:ext uri="{91240B29-F687-4f45-9708-019B960494DF}">
-                <a14:hiddenLine xmlns:p14="http://schemas.microsoft.com/office/powerpoint/2010/main" xmlns:a14="http://schemas.microsoft.com/office/drawing/2010/main" xmlns:a16="http://schemas.microsoft.com/office/drawing/2014/main" xmlns="" w="9525">
+                <a14:hiddenLine xmlns="" xmlns:a16="http://schemas.microsoft.com/office/drawing/2014/main" xmlns:a14="http://schemas.microsoft.com/office/drawing/2010/main" xmlns:p14="http://schemas.microsoft.com/office/powerpoint/2010/main" w="9525">
                   <a:solidFill>
                     <a:srgbClr val="000000"/>
                   </a:solidFill>
@@ -42495,7 +42495,7 @@
             </a:ln>
             <a:extLst>
               <a:ext uri="{91240B29-F687-4f45-9708-019B960494DF}">
-                <a14:hiddenLine xmlns:p14="http://schemas.microsoft.com/office/powerpoint/2010/main" xmlns:a14="http://schemas.microsoft.com/office/drawing/2010/main" xmlns:a16="http://schemas.microsoft.com/office/drawing/2014/main" xmlns="" w="9525">
+                <a14:hiddenLine xmlns="" xmlns:a16="http://schemas.microsoft.com/office/drawing/2014/main" xmlns:a14="http://schemas.microsoft.com/office/drawing/2010/main" xmlns:p14="http://schemas.microsoft.com/office/powerpoint/2010/main" w="9525">
                   <a:solidFill>
                     <a:srgbClr val="000000"/>
                   </a:solidFill>
@@ -42579,7 +42579,7 @@
             </a:ln>
             <a:extLst>
               <a:ext uri="{91240B29-F687-4f45-9708-019B960494DF}">
-                <a14:hiddenLine xmlns:p14="http://schemas.microsoft.com/office/powerpoint/2010/main" xmlns:a14="http://schemas.microsoft.com/office/drawing/2010/main" xmlns:a16="http://schemas.microsoft.com/office/drawing/2014/main" xmlns="" w="9525">
+                <a14:hiddenLine xmlns="" xmlns:a16="http://schemas.microsoft.com/office/drawing/2014/main" xmlns:a14="http://schemas.microsoft.com/office/drawing/2010/main" xmlns:p14="http://schemas.microsoft.com/office/powerpoint/2010/main" w="9525">
                   <a:solidFill>
                     <a:srgbClr val="000000"/>
                   </a:solidFill>
@@ -42721,7 +42721,7 @@
             </a:ln>
             <a:extLst>
               <a:ext uri="{91240B29-F687-4f45-9708-019B960494DF}">
-                <a14:hiddenLine xmlns:p14="http://schemas.microsoft.com/office/powerpoint/2010/main" xmlns:a14="http://schemas.microsoft.com/office/drawing/2010/main" xmlns:a16="http://schemas.microsoft.com/office/drawing/2014/main" xmlns="" w="9525">
+                <a14:hiddenLine xmlns="" xmlns:a16="http://schemas.microsoft.com/office/drawing/2014/main" xmlns:a14="http://schemas.microsoft.com/office/drawing/2010/main" xmlns:p14="http://schemas.microsoft.com/office/powerpoint/2010/main" w="9525">
                   <a:solidFill>
                     <a:srgbClr val="000000"/>
                   </a:solidFill>
@@ -42811,7 +42811,7 @@
             </a:ln>
             <a:extLst>
               <a:ext uri="{91240B29-F687-4f45-9708-019B960494DF}">
-                <a14:hiddenLine xmlns:p14="http://schemas.microsoft.com/office/powerpoint/2010/main" xmlns:a14="http://schemas.microsoft.com/office/drawing/2010/main" xmlns:a16="http://schemas.microsoft.com/office/drawing/2014/main" xmlns="" w="9525">
+                <a14:hiddenLine xmlns="" xmlns:a16="http://schemas.microsoft.com/office/drawing/2014/main" xmlns:a14="http://schemas.microsoft.com/office/drawing/2010/main" xmlns:p14="http://schemas.microsoft.com/office/powerpoint/2010/main" w="9525">
                   <a:solidFill>
                     <a:srgbClr val="000000"/>
                   </a:solidFill>
@@ -42923,7 +42923,7 @@
             </a:ln>
             <a:extLst>
               <a:ext uri="{91240B29-F687-4f45-9708-019B960494DF}">
-                <a14:hiddenLine xmlns:p14="http://schemas.microsoft.com/office/powerpoint/2010/main" xmlns:a14="http://schemas.microsoft.com/office/drawing/2010/main" xmlns:a16="http://schemas.microsoft.com/office/drawing/2014/main" xmlns="" w="9525">
+                <a14:hiddenLine xmlns="" xmlns:a16="http://schemas.microsoft.com/office/drawing/2014/main" xmlns:a14="http://schemas.microsoft.com/office/drawing/2010/main" xmlns:p14="http://schemas.microsoft.com/office/powerpoint/2010/main" w="9525">
                   <a:solidFill>
                     <a:srgbClr val="000000"/>
                   </a:solidFill>
@@ -43087,7 +43087,7 @@
             <a:noFill/>
             <a:extLst>
               <a:ext uri="{909E8E84-426E-40dd-AFC4-6F175D3DCCD1}">
-                <a14:hiddenFill xmlns:p14="http://schemas.microsoft.com/office/powerpoint/2010/main" xmlns:a14="http://schemas.microsoft.com/office/drawing/2010/main" xmlns:a16="http://schemas.microsoft.com/office/drawing/2014/main" xmlns="">
+                <a14:hiddenFill xmlns="" xmlns:a16="http://schemas.microsoft.com/office/drawing/2014/main" xmlns:a14="http://schemas.microsoft.com/office/drawing/2010/main" xmlns:p14="http://schemas.microsoft.com/office/powerpoint/2010/main">
                   <a:solidFill>
                     <a:srgbClr val="FFFFFF"/>
                   </a:solidFill>

</xml_diff>